<commit_message>
update repl links to use replit.com
</commit_message>
<xml_diff>
--- a/Week03/MoreHtmlElements.pptx
+++ b/Week03/MoreHtmlElements.pptx
@@ -221,7 +221,7 @@
           <a:p>
             <a:fld id="{19104133-B5B0-4351-8158-4F0E5EB1E2BF}" type="datetimeFigureOut">
               <a:rPr lang="en-US" smtClean="0"/>
-              <a:t>3/20/2020</a:t>
+              <a:t>3/18/2022</a:t>
             </a:fld>
             <a:endParaRPr lang="en-US"/>
           </a:p>
@@ -285,38 +285,37 @@
           <a:p>
             <a:pPr lvl="0"/>
             <a:r>
-              <a:rPr lang="en-US" smtClean="0"/>
+              <a:rPr lang="en-US"/>
               <a:t>Edit Master text styles</a:t>
             </a:r>
           </a:p>
           <a:p>
             <a:pPr lvl="1"/>
             <a:r>
-              <a:rPr lang="en-US" smtClean="0"/>
+              <a:rPr lang="en-US"/>
               <a:t>Second level</a:t>
             </a:r>
           </a:p>
           <a:p>
             <a:pPr lvl="2"/>
             <a:r>
-              <a:rPr lang="en-US" smtClean="0"/>
+              <a:rPr lang="en-US"/>
               <a:t>Third level</a:t>
             </a:r>
           </a:p>
           <a:p>
             <a:pPr lvl="3"/>
             <a:r>
-              <a:rPr lang="en-US" smtClean="0"/>
+              <a:rPr lang="en-US"/>
               <a:t>Fourth level</a:t>
             </a:r>
           </a:p>
           <a:p>
             <a:pPr lvl="4"/>
             <a:r>
-              <a:rPr lang="en-US" smtClean="0"/>
+              <a:rPr lang="en-US"/>
               <a:t>Fifth level</a:t>
             </a:r>
-            <a:endParaRPr lang="en-US"/>
           </a:p>
         </p:txBody>
       </p:sp>
@@ -534,19 +533,19 @@
           <a:lstStyle/>
           <a:p>
             <a:r>
-              <a:rPr lang="en-US" dirty="0" smtClean="0"/>
+              <a:rPr lang="en-US" dirty="0"/>
               <a:t>Ask the students</a:t>
             </a:r>
             <a:r>
-              <a:rPr lang="en-US" baseline="0" dirty="0" smtClean="0"/>
+              <a:rPr lang="en-US" baseline="0" dirty="0"/>
               <a:t> what </a:t>
             </a:r>
             <a:r>
-              <a:rPr lang="en-US" b="1" baseline="0" dirty="0" err="1" smtClean="0"/>
+              <a:rPr lang="en-US" b="1" baseline="0" dirty="0" err="1"/>
               <a:t>href</a:t>
             </a:r>
             <a:r>
-              <a:rPr lang="en-US" baseline="0" dirty="0" smtClean="0"/>
+              <a:rPr lang="en-US" baseline="0" dirty="0"/>
               <a:t> does – it tells the link where to go when clicked!</a:t>
             </a:r>
             <a:endParaRPr lang="en-US" dirty="0"/>
@@ -634,19 +633,19 @@
           <a:lstStyle/>
           <a:p>
             <a:r>
-              <a:rPr lang="en-US" dirty="0" smtClean="0"/>
+              <a:rPr lang="en-US" dirty="0"/>
               <a:t>Visit the </a:t>
             </a:r>
             <a:r>
-              <a:rPr lang="en-US" dirty="0" err="1" smtClean="0"/>
+              <a:rPr lang="en-US" dirty="0" err="1"/>
               <a:t>Repl</a:t>
             </a:r>
             <a:r>
-              <a:rPr lang="en-US" dirty="0" smtClean="0"/>
+              <a:rPr lang="en-US" dirty="0"/>
               <a:t> to show inputs </a:t>
             </a:r>
             <a:r>
-              <a:rPr lang="en-US" smtClean="0"/>
+              <a:rPr lang="en-US"/>
               <a:t>in action</a:t>
             </a:r>
             <a:endParaRPr lang="en-US" dirty="0"/>
@@ -734,11 +733,11 @@
           <a:lstStyle/>
           <a:p>
             <a:r>
-              <a:rPr lang="en-US" dirty="0" smtClean="0"/>
+              <a:rPr lang="en-US" dirty="0"/>
               <a:t>Point out</a:t>
             </a:r>
             <a:r>
-              <a:rPr lang="en-US" baseline="0" dirty="0" smtClean="0"/>
+              <a:rPr lang="en-US" baseline="0" dirty="0"/>
               <a:t> each part of the attribute syntax</a:t>
             </a:r>
             <a:endParaRPr lang="en-US" dirty="0"/>
@@ -826,10 +825,9 @@
           <a:lstStyle/>
           <a:p>
             <a:r>
-              <a:rPr lang="en-US" dirty="0" smtClean="0"/>
+              <a:rPr lang="en-US" dirty="0"/>
               <a:t>Ask the students these questions</a:t>
             </a:r>
-            <a:endParaRPr lang="en-US" dirty="0"/>
           </a:p>
         </p:txBody>
       </p:sp>
@@ -914,39 +912,39 @@
           <a:lstStyle/>
           <a:p>
             <a:r>
-              <a:rPr lang="en-US" dirty="0" smtClean="0"/>
+              <a:rPr lang="en-US" dirty="0"/>
               <a:t>Visit the </a:t>
             </a:r>
             <a:r>
-              <a:rPr lang="en-US" dirty="0" err="1" smtClean="0"/>
+              <a:rPr lang="en-US" dirty="0" err="1"/>
               <a:t>Repl</a:t>
             </a:r>
             <a:r>
-              <a:rPr lang="en-US" dirty="0" smtClean="0"/>
+              <a:rPr lang="en-US" dirty="0"/>
               <a:t> to show attributes in action. Uncomment the commented lines of code to display</a:t>
             </a:r>
             <a:r>
-              <a:rPr lang="en-US" baseline="0" dirty="0" smtClean="0"/>
+              <a:rPr lang="en-US" baseline="0" dirty="0"/>
               <a:t> them. You should be able to use </a:t>
             </a:r>
             <a:r>
-              <a:rPr lang="en-US" b="1" baseline="0" dirty="0" smtClean="0"/>
+              <a:rPr lang="en-US" b="1" baseline="0" dirty="0"/>
               <a:t>Ctrl</a:t>
             </a:r>
             <a:r>
-              <a:rPr lang="en-US" baseline="0" dirty="0" smtClean="0"/>
+              <a:rPr lang="en-US" baseline="0" dirty="0"/>
               <a:t>+</a:t>
             </a:r>
             <a:r>
-              <a:rPr lang="en-US" b="1" baseline="0" dirty="0" smtClean="0"/>
+              <a:rPr lang="en-US" b="1" baseline="0" dirty="0"/>
               <a:t>/</a:t>
             </a:r>
             <a:r>
-              <a:rPr lang="en-US" baseline="0" dirty="0" smtClean="0"/>
+              <a:rPr lang="en-US" baseline="0" dirty="0"/>
               <a:t> to comment and uncomment code in </a:t>
             </a:r>
             <a:r>
-              <a:rPr lang="en-US" baseline="0" dirty="0" err="1" smtClean="0"/>
+              <a:rPr lang="en-US" baseline="0" dirty="0" err="1"/>
               <a:t>Repl</a:t>
             </a:r>
             <a:endParaRPr lang="en-US" dirty="0"/>
@@ -1038,11 +1036,11 @@
               <a:buChar char="-"/>
             </a:pPr>
             <a:r>
-              <a:rPr lang="en-US" dirty="0" smtClean="0"/>
+              <a:rPr lang="en-US" dirty="0"/>
               <a:t>The bullet points on this</a:t>
             </a:r>
             <a:r>
-              <a:rPr lang="en-US" baseline="0" dirty="0" smtClean="0"/>
+              <a:rPr lang="en-US" baseline="0" dirty="0"/>
               <a:t> slide are an unordered list!</a:t>
             </a:r>
           </a:p>
@@ -1052,7 +1050,7 @@
               <a:buChar char="-"/>
             </a:pPr>
             <a:r>
-              <a:rPr lang="en-US" baseline="0" dirty="0" smtClean="0"/>
+              <a:rPr lang="en-US" baseline="0" dirty="0"/>
               <a:t>An ordered list has numbers – for example, the MCU movies in release order</a:t>
             </a:r>
           </a:p>
@@ -1139,123 +1137,123 @@
           <a:lstStyle/>
           <a:p>
             <a:r>
-              <a:rPr lang="en-US" dirty="0" smtClean="0"/>
+              <a:rPr lang="en-US" dirty="0"/>
               <a:t>Explain nesting as a concept using geography.</a:t>
             </a:r>
           </a:p>
           <a:p>
-            <a:endParaRPr lang="en-US" dirty="0" smtClean="0"/>
-          </a:p>
-          <a:p>
-            <a:r>
-              <a:rPr lang="en-US" dirty="0" smtClean="0"/>
+            <a:endParaRPr lang="en-US" dirty="0"/>
+          </a:p>
+          <a:p>
+            <a:r>
+              <a:rPr lang="en-US" dirty="0"/>
               <a:t>Start</a:t>
             </a:r>
             <a:r>
-              <a:rPr lang="en-US" baseline="0" dirty="0" smtClean="0"/>
+              <a:rPr lang="en-US" baseline="0" dirty="0"/>
               <a:t> by writing the following on the whiteboard (leave a lot of space around the tags):</a:t>
             </a:r>
           </a:p>
           <a:p>
-            <a:endParaRPr lang="en-US" baseline="0" dirty="0" smtClean="0"/>
-          </a:p>
-          <a:p>
-            <a:r>
-              <a:rPr lang="en-US" b="1" baseline="0" dirty="0" smtClean="0"/>
+            <a:endParaRPr lang="en-US" baseline="0" dirty="0"/>
+          </a:p>
+          <a:p>
+            <a:r>
+              <a:rPr lang="en-US" b="1" baseline="0" dirty="0"/>
               <a:t>&lt;county name=“Cuyahoga”&gt;</a:t>
             </a:r>
           </a:p>
           <a:p>
-            <a:endParaRPr lang="en-US" b="1" baseline="0" dirty="0" smtClean="0"/>
-          </a:p>
-          <a:p>
-            <a:r>
-              <a:rPr lang="en-US" b="1" baseline="0" dirty="0" smtClean="0"/>
+            <a:endParaRPr lang="en-US" b="1" baseline="0" dirty="0"/>
+          </a:p>
+          <a:p>
+            <a:r>
+              <a:rPr lang="en-US" b="1" baseline="0" dirty="0"/>
               <a:t>&lt;/county&gt;</a:t>
             </a:r>
           </a:p>
           <a:p>
-            <a:endParaRPr lang="en-US" baseline="0" dirty="0" smtClean="0"/>
-          </a:p>
-          <a:p>
-            <a:r>
-              <a:rPr lang="en-US" b="0" baseline="0" dirty="0" smtClean="0"/>
+            <a:endParaRPr lang="en-US" baseline="0" dirty="0"/>
+          </a:p>
+          <a:p>
+            <a:r>
+              <a:rPr lang="en-US" b="0" baseline="0" dirty="0"/>
               <a:t>Ask what goes within a county – a city! Add that to the code:</a:t>
             </a:r>
           </a:p>
           <a:p>
-            <a:endParaRPr lang="en-US" b="0" baseline="0" dirty="0" smtClean="0"/>
-          </a:p>
-          <a:p>
-            <a:r>
-              <a:rPr lang="en-US" b="1" baseline="0" dirty="0" smtClean="0"/>
+            <a:endParaRPr lang="en-US" b="0" baseline="0" dirty="0"/>
+          </a:p>
+          <a:p>
+            <a:r>
+              <a:rPr lang="en-US" b="1" baseline="0" dirty="0"/>
               <a:t>&lt;county name=“Cuyahoga”&gt;</a:t>
             </a:r>
           </a:p>
           <a:p>
             <a:r>
-              <a:rPr lang="en-US" b="1" baseline="0" dirty="0" smtClean="0"/>
+              <a:rPr lang="en-US" b="1" baseline="0" dirty="0"/>
               <a:t>    &lt;city name=“Westlake”&gt;&lt;/city&gt;</a:t>
             </a:r>
           </a:p>
           <a:p>
             <a:r>
-              <a:rPr lang="en-US" b="1" baseline="0" dirty="0" smtClean="0"/>
+              <a:rPr lang="en-US" b="1" baseline="0" dirty="0"/>
               <a:t>&lt;/county&gt;</a:t>
             </a:r>
           </a:p>
           <a:p>
-            <a:endParaRPr lang="en-US" b="1" baseline="0" dirty="0" smtClean="0"/>
-          </a:p>
-          <a:p>
-            <a:r>
-              <a:rPr lang="en-US" b="0" baseline="0" dirty="0" smtClean="0"/>
+            <a:endParaRPr lang="en-US" b="1" baseline="0" dirty="0"/>
+          </a:p>
+          <a:p>
+            <a:r>
+              <a:rPr lang="en-US" b="0" baseline="0" dirty="0"/>
               <a:t>Ask what goes around a county – a state! Add that to the code:</a:t>
             </a:r>
           </a:p>
           <a:p>
-            <a:endParaRPr lang="en-US" b="0" baseline="0" dirty="0" smtClean="0"/>
-          </a:p>
-          <a:p>
-            <a:r>
-              <a:rPr lang="en-US" b="1" baseline="0" dirty="0" smtClean="0"/>
+            <a:endParaRPr lang="en-US" b="0" baseline="0" dirty="0"/>
+          </a:p>
+          <a:p>
+            <a:r>
+              <a:rPr lang="en-US" b="1" baseline="0" dirty="0"/>
               <a:t>&lt;state name=“Ohio”&gt;</a:t>
             </a:r>
           </a:p>
           <a:p>
             <a:r>
-              <a:rPr lang="en-US" b="1" baseline="0" dirty="0" smtClean="0"/>
+              <a:rPr lang="en-US" b="1" baseline="0" dirty="0"/>
               <a:t>    &lt;county name=“Cuyahoga”&gt;</a:t>
             </a:r>
           </a:p>
           <a:p>
             <a:r>
-              <a:rPr lang="en-US" b="1" baseline="0" dirty="0" smtClean="0"/>
+              <a:rPr lang="en-US" b="1" baseline="0" dirty="0"/>
               <a:t>        &lt;city name=“Westlake”&gt;&lt;/city&gt;</a:t>
             </a:r>
           </a:p>
           <a:p>
             <a:r>
-              <a:rPr lang="en-US" b="1" baseline="0" dirty="0" smtClean="0"/>
+              <a:rPr lang="en-US" b="1" baseline="0" dirty="0"/>
               <a:t>    &lt;/county&gt;</a:t>
             </a:r>
           </a:p>
           <a:p>
             <a:r>
-              <a:rPr lang="en-US" b="1" baseline="0" dirty="0" smtClean="0"/>
+              <a:rPr lang="en-US" b="1" baseline="0" dirty="0"/>
               <a:t>&lt;/state&gt;</a:t>
             </a:r>
-            <a:endParaRPr lang="en-US" b="0" baseline="0" dirty="0" smtClean="0"/>
-          </a:p>
-          <a:p>
-            <a:endParaRPr lang="en-US" b="0" baseline="0" dirty="0" smtClean="0"/>
-          </a:p>
-          <a:p>
-            <a:r>
-              <a:rPr lang="en-US" b="0" baseline="0" dirty="0" smtClean="0"/>
+            <a:endParaRPr lang="en-US" b="0" baseline="0" dirty="0"/>
+          </a:p>
+          <a:p>
+            <a:endParaRPr lang="en-US" b="0" baseline="0" dirty="0"/>
+          </a:p>
+          <a:p>
+            <a:r>
+              <a:rPr lang="en-US" b="0" baseline="0" dirty="0"/>
               <a:t>Use this concept to explain nesting. Explain parent/child relationships. The next slide has an example using lists.</a:t>
             </a:r>
-            <a:endParaRPr lang="en-US" b="1" baseline="0" dirty="0" smtClean="0"/>
+            <a:endParaRPr lang="en-US" b="1" baseline="0" dirty="0"/>
           </a:p>
         </p:txBody>
       </p:sp>
@@ -1340,15 +1338,15 @@
           <a:lstStyle/>
           <a:p>
             <a:r>
-              <a:rPr lang="en-US" dirty="0" smtClean="0"/>
+              <a:rPr lang="en-US" dirty="0"/>
               <a:t>Visit the </a:t>
             </a:r>
             <a:r>
-              <a:rPr lang="en-US" dirty="0" err="1" smtClean="0"/>
+              <a:rPr lang="en-US" dirty="0" err="1"/>
               <a:t>Repl</a:t>
             </a:r>
             <a:r>
-              <a:rPr lang="en-US" dirty="0" smtClean="0"/>
+              <a:rPr lang="en-US" dirty="0"/>
               <a:t> to show lists in action.</a:t>
             </a:r>
           </a:p>
@@ -1358,7 +1356,7 @@
               <a:buChar char="-"/>
             </a:pPr>
             <a:r>
-              <a:rPr lang="en-US" dirty="0" smtClean="0"/>
+              <a:rPr lang="en-US" dirty="0"/>
               <a:t>Here we really want to emphasize the hierarchical structure of HTML</a:t>
             </a:r>
           </a:p>
@@ -1368,26 +1366,17 @@
               <a:buChar char="-"/>
             </a:pPr>
             <a:r>
-              <a:rPr lang="en-US" dirty="0" smtClean="0"/>
-              <a:t>Also show switching from &lt;</a:t>
-            </a:r>
-            <a:r>
-              <a:rPr lang="en-US" dirty="0" err="1" smtClean="0"/>
-              <a:t>ul</a:t>
-            </a:r>
-            <a:r>
-              <a:rPr lang="en-US" dirty="0" smtClean="0"/>
-              <a:t>&gt; to &lt;</a:t>
-            </a:r>
-            <a:r>
-              <a:rPr lang="en-US" dirty="0" err="1" smtClean="0"/>
+              <a:rPr lang="en-US" dirty="0"/>
+              <a:t>Also show the difference between </a:t>
+            </a:r>
+            <a:r>
+              <a:rPr lang="en-US" dirty="0" err="1"/>
               <a:t>ol</a:t>
             </a:r>
             <a:r>
-              <a:rPr lang="en-US" dirty="0" smtClean="0"/>
-              <a:t>&gt;</a:t>
-            </a:r>
-            <a:endParaRPr lang="en-US" dirty="0"/>
+              <a:rPr lang="en-US" dirty="0"/>
+              <a:t> and ul</a:t>
+            </a:r>
           </a:p>
         </p:txBody>
       </p:sp>
@@ -1476,11 +1465,11 @@
               <a:buChar char="-"/>
             </a:pPr>
             <a:r>
-              <a:rPr lang="en-US" dirty="0" smtClean="0"/>
+              <a:rPr lang="en-US" dirty="0"/>
               <a:t>Ask the students to</a:t>
             </a:r>
             <a:r>
-              <a:rPr lang="en-US" baseline="0" dirty="0" smtClean="0"/>
+              <a:rPr lang="en-US" baseline="0" dirty="0"/>
               <a:t> guess how each of these input types might appear</a:t>
             </a:r>
           </a:p>
@@ -1570,7 +1559,7 @@
               <a:buFontTx/>
               <a:buNone/>
             </a:pPr>
-            <a:endParaRPr lang="en-US" baseline="0" dirty="0" smtClean="0"/>
+            <a:endParaRPr lang="en-US" baseline="0" dirty="0"/>
           </a:p>
         </p:txBody>
       </p:sp>
@@ -1750,15 +1739,7 @@
           <a:p>
             <a:r>
               <a:rPr lang="en-US" dirty="0"/>
-              <a:t>Click to edit Master </a:t>
-            </a:r>
-            <a:r>
-              <a:rPr lang="en-US" dirty="0" smtClean="0"/>
-              <a:t>subtitle </a:t>
-            </a:r>
-            <a:r>
-              <a:rPr lang="en-US" dirty="0"/>
-              <a:t>style</a:t>
+              <a:t>Click to edit Master subtitle style</a:t>
             </a:r>
           </a:p>
         </p:txBody>
@@ -1800,7 +1781,7 @@
             <a:fld id="{1C2D31DE-C454-491C-B5C3-F097855E3DF7}" type="datetime4">
               <a:rPr lang="en-US" smtClean="0"/>
               <a:pPr/>
-              <a:t>March 20, 2020</a:t>
+              <a:t>March 18, 2022</a:t>
             </a:fld>
             <a:endParaRPr lang="en-US" dirty="0"/>
           </a:p>
@@ -4874,17 +4855,16 @@
           <a:p>
             <a:pPr lvl="0"/>
             <a:r>
-              <a:rPr lang="en-US" dirty="0" smtClean="0"/>
+              <a:rPr lang="en-US" dirty="0"/>
               <a:t>Presenter Name</a:t>
             </a:r>
             <a:br>
-              <a:rPr lang="en-US" dirty="0" smtClean="0"/>
+              <a:rPr lang="en-US" dirty="0"/>
             </a:br>
             <a:r>
-              <a:rPr lang="en-US" dirty="0" smtClean="0"/>
+              <a:rPr lang="en-US" dirty="0"/>
               <a:t>Presenter Title</a:t>
             </a:r>
-            <a:endParaRPr lang="en-US" dirty="0"/>
           </a:p>
         </p:txBody>
       </p:sp>
@@ -4901,13 +4881,6 @@
   <p:transition>
     <p:fade/>
   </p:transition>
-  <p:timing>
-    <p:tnLst>
-      <p:par>
-        <p:cTn id="1" dur="indefinite" restart="never" nodeType="tmRoot"/>
-      </p:par>
-    </p:tnLst>
-  </p:timing>
   <p:hf sldNum="0" hdr="0" ftr="0"/>
 </p:sldLayout>
 </file>
@@ -5200,7 +5173,7 @@
           <a:p>
             <a:fld id="{5958763E-B898-436D-883D-03711491D54A}" type="datetimeFigureOut">
               <a:rPr lang="en-US" smtClean="0"/>
-              <a:t>3/20/2020</a:t>
+              <a:t>3/18/2022</a:t>
             </a:fld>
             <a:endParaRPr lang="en-US"/>
           </a:p>
@@ -5273,13 +5246,6 @@
   <p:transition>
     <p:fade/>
   </p:transition>
-  <p:timing>
-    <p:tnLst>
-      <p:par>
-        <p:cTn id="1" dur="indefinite" restart="never" nodeType="tmRoot"/>
-      </p:par>
-    </p:tnLst>
-  </p:timing>
 </p:sldLayout>
 </file>
 
@@ -5328,10 +5294,9 @@
           </a:lstStyle>
           <a:p>
             <a:r>
-              <a:rPr lang="en-US" dirty="0" smtClean="0"/>
+              <a:rPr lang="en-US" dirty="0"/>
               <a:t>Click icon to add picture</a:t>
             </a:r>
-            <a:endParaRPr lang="en-US" dirty="0"/>
           </a:p>
         </p:txBody>
       </p:sp>
@@ -5401,7 +5366,7 @@
           <a:p>
             <a:fld id="{5958763E-B898-436D-883D-03711491D54A}" type="datetimeFigureOut">
               <a:rPr lang="en-US" smtClean="0"/>
-              <a:t>3/20/2020</a:t>
+              <a:t>3/18/2022</a:t>
             </a:fld>
             <a:endParaRPr lang="en-US"/>
           </a:p>
@@ -5474,13 +5439,6 @@
   <p:transition>
     <p:fade/>
   </p:transition>
-  <p:timing>
-    <p:tnLst>
-      <p:par>
-        <p:cTn id="1" dur="indefinite" restart="never" nodeType="tmRoot"/>
-      </p:par>
-    </p:tnLst>
-  </p:timing>
 </p:sldLayout>
 </file>
 
@@ -5658,7 +5616,7 @@
           <a:p>
             <a:fld id="{5958763E-B898-436D-883D-03711491D54A}" type="datetimeFigureOut">
               <a:rPr lang="en-US" smtClean="0"/>
-              <a:t>3/20/2020</a:t>
+              <a:t>3/18/2022</a:t>
             </a:fld>
             <a:endParaRPr lang="en-US"/>
           </a:p>
@@ -5731,13 +5689,6 @@
   <p:transition>
     <p:fade/>
   </p:transition>
-  <p:timing>
-    <p:tnLst>
-      <p:par>
-        <p:cTn id="1" dur="indefinite" restart="never" nodeType="tmRoot"/>
-      </p:par>
-    </p:tnLst>
-  </p:timing>
 </p:sldLayout>
 </file>
 
@@ -6013,7 +5964,7 @@
           <a:p>
             <a:fld id="{5958763E-B898-436D-883D-03711491D54A}" type="datetimeFigureOut">
               <a:rPr lang="en-US" smtClean="0"/>
-              <a:t>3/20/2020</a:t>
+              <a:t>3/18/2022</a:t>
             </a:fld>
             <a:endParaRPr lang="en-US"/>
           </a:p>
@@ -6074,13 +6025,6 @@
   <p:transition>
     <p:fade/>
   </p:transition>
-  <p:timing>
-    <p:tnLst>
-      <p:par>
-        <p:cTn id="1" dur="indefinite" restart="never" nodeType="tmRoot"/>
-      </p:par>
-    </p:tnLst>
-  </p:timing>
 </p:sldLayout>
 </file>
 
@@ -6436,7 +6380,7 @@
           <a:p>
             <a:fld id="{5958763E-B898-436D-883D-03711491D54A}" type="datetimeFigureOut">
               <a:rPr lang="en-US" smtClean="0"/>
-              <a:t>3/20/2020</a:t>
+              <a:t>3/18/2022</a:t>
             </a:fld>
             <a:endParaRPr lang="en-US"/>
           </a:p>
@@ -6497,13 +6441,6 @@
   <p:transition>
     <p:fade/>
   </p:transition>
-  <p:timing>
-    <p:tnLst>
-      <p:par>
-        <p:cTn id="1" dur="indefinite" restart="never" nodeType="tmRoot"/>
-      </p:par>
-    </p:tnLst>
-  </p:timing>
 </p:sldLayout>
 </file>
 
@@ -6944,7 +6881,7 @@
           <a:p>
             <a:fld id="{5958763E-B898-436D-883D-03711491D54A}" type="datetimeFigureOut">
               <a:rPr lang="en-US" smtClean="0"/>
-              <a:t>3/20/2020</a:t>
+              <a:t>3/18/2022</a:t>
             </a:fld>
             <a:endParaRPr lang="en-US"/>
           </a:p>
@@ -7005,13 +6942,6 @@
   <p:transition>
     <p:fade/>
   </p:transition>
-  <p:timing>
-    <p:tnLst>
-      <p:par>
-        <p:cTn id="1" dur="indefinite" restart="never" nodeType="tmRoot"/>
-      </p:par>
-    </p:tnLst>
-  </p:timing>
 </p:sldLayout>
 </file>
 
@@ -7402,7 +7332,7 @@
           <a:p>
             <a:fld id="{5958763E-B898-436D-883D-03711491D54A}" type="datetimeFigureOut">
               <a:rPr lang="en-US" smtClean="0"/>
-              <a:t>3/20/2020</a:t>
+              <a:t>3/18/2022</a:t>
             </a:fld>
             <a:endParaRPr lang="en-US"/>
           </a:p>
@@ -7463,13 +7393,6 @@
   <p:transition>
     <p:fade/>
   </p:transition>
-  <p:timing>
-    <p:tnLst>
-      <p:par>
-        <p:cTn id="1" dur="indefinite" restart="never" nodeType="tmRoot"/>
-      </p:par>
-    </p:tnLst>
-  </p:timing>
 </p:sldLayout>
 </file>
 
@@ -8020,7 +7943,7 @@
           <a:p>
             <a:fld id="{5958763E-B898-436D-883D-03711491D54A}" type="datetimeFigureOut">
               <a:rPr lang="en-US" smtClean="0"/>
-              <a:t>3/20/2020</a:t>
+              <a:t>3/18/2022</a:t>
             </a:fld>
             <a:endParaRPr lang="en-US"/>
           </a:p>
@@ -8081,13 +8004,6 @@
   <p:transition>
     <p:fade/>
   </p:transition>
-  <p:timing>
-    <p:tnLst>
-      <p:par>
-        <p:cTn id="1" dur="indefinite" restart="never" nodeType="tmRoot"/>
-      </p:par>
-    </p:tnLst>
-  </p:timing>
 </p:sldLayout>
 </file>
 
@@ -8798,7 +8714,7 @@
           <a:p>
             <a:fld id="{5958763E-B898-436D-883D-03711491D54A}" type="datetimeFigureOut">
               <a:rPr lang="en-US" smtClean="0"/>
-              <a:t>3/20/2020</a:t>
+              <a:t>3/18/2022</a:t>
             </a:fld>
             <a:endParaRPr lang="en-US"/>
           </a:p>
@@ -8859,13 +8775,6 @@
   <p:transition>
     <p:fade/>
   </p:transition>
-  <p:timing>
-    <p:tnLst>
-      <p:par>
-        <p:cTn id="1" dur="indefinite" restart="never" nodeType="tmRoot"/>
-      </p:par>
-    </p:tnLst>
-  </p:timing>
 </p:sldLayout>
 </file>
 
@@ -8909,7 +8818,7 @@
           <a:p>
             <a:fld id="{5958763E-B898-436D-883D-03711491D54A}" type="datetimeFigureOut">
               <a:rPr lang="en-US" smtClean="0"/>
-              <a:t>3/20/2020</a:t>
+              <a:t>3/18/2022</a:t>
             </a:fld>
             <a:endParaRPr lang="en-US"/>
           </a:p>
@@ -8982,13 +8891,6 @@
   <p:transition>
     <p:fade/>
   </p:transition>
-  <p:timing>
-    <p:tnLst>
-      <p:par>
-        <p:cTn id="1" dur="indefinite" restart="never" nodeType="tmRoot"/>
-      </p:par>
-    </p:tnLst>
-  </p:timing>
 </p:sldLayout>
 </file>
 
@@ -9068,7 +8970,7 @@
                 <a:spcPct val="0"/>
               </a:spcAft>
             </a:pPr>
-            <a:endParaRPr lang="en-US" sz="2400" dirty="0" err="1" smtClean="0">
+            <a:endParaRPr lang="en-US" sz="2400" dirty="0" err="1">
               <a:gradFill>
                 <a:gsLst>
                   <a:gs pos="0">
@@ -9201,15 +9103,7 @@
           <a:p>
             <a:r>
               <a:rPr lang="en-US" dirty="0"/>
-              <a:t>Click to edit Master </a:t>
-            </a:r>
-            <a:r>
-              <a:rPr lang="en-US" dirty="0" smtClean="0"/>
-              <a:t>subtitle </a:t>
-            </a:r>
-            <a:r>
-              <a:rPr lang="en-US" dirty="0"/>
-              <a:t>style</a:t>
+              <a:t>Click to edit Master subtitle style</a:t>
             </a:r>
           </a:p>
         </p:txBody>
@@ -9251,7 +9145,7 @@
             <a:fld id="{1C2D31DE-C454-491C-B5C3-F097855E3DF7}" type="datetime4">
               <a:rPr lang="en-US" smtClean="0"/>
               <a:pPr/>
-              <a:t>March 20, 2020</a:t>
+              <a:t>March 18, 2022</a:t>
             </a:fld>
             <a:endParaRPr lang="en-US" dirty="0"/>
           </a:p>
@@ -12325,17 +12219,16 @@
           <a:p>
             <a:pPr lvl="0"/>
             <a:r>
-              <a:rPr lang="en-US" dirty="0" smtClean="0"/>
+              <a:rPr lang="en-US" dirty="0"/>
               <a:t>Presenter Name</a:t>
             </a:r>
             <a:br>
-              <a:rPr lang="en-US" dirty="0" smtClean="0"/>
+              <a:rPr lang="en-US" dirty="0"/>
             </a:br>
             <a:r>
-              <a:rPr lang="en-US" dirty="0" smtClean="0"/>
+              <a:rPr lang="en-US" dirty="0"/>
               <a:t>Presenter Title</a:t>
             </a:r>
-            <a:endParaRPr lang="en-US" dirty="0"/>
           </a:p>
         </p:txBody>
       </p:sp>
@@ -12352,13 +12245,6 @@
   <p:transition>
     <p:fade/>
   </p:transition>
-  <p:timing>
-    <p:tnLst>
-      <p:par>
-        <p:cTn id="1" dur="indefinite" restart="never" nodeType="tmRoot"/>
-      </p:par>
-    </p:tnLst>
-  </p:timing>
   <p:hf sldNum="0" hdr="0" ftr="0"/>
 </p:sldLayout>
 </file>
@@ -12411,7 +12297,7 @@
           <a:p>
             <a:fld id="{5958763E-B898-436D-883D-03711491D54A}" type="datetimeFigureOut">
               <a:rPr lang="en-US" smtClean="0"/>
-              <a:t>3/20/2020</a:t>
+              <a:t>3/18/2022</a:t>
             </a:fld>
             <a:endParaRPr lang="en-US"/>
           </a:p>
@@ -12484,13 +12370,6 @@
   <p:transition>
     <p:fade/>
   </p:transition>
-  <p:timing>
-    <p:tnLst>
-      <p:par>
-        <p:cTn id="1" dur="indefinite" restart="never" nodeType="tmRoot"/>
-      </p:par>
-    </p:tnLst>
-  </p:timing>
 </p:sldLayout>
 </file>
 
@@ -12542,7 +12421,7 @@
           <a:p>
             <a:fld id="{5958763E-B898-436D-883D-03711491D54A}" type="datetimeFigureOut">
               <a:rPr lang="en-US" smtClean="0"/>
-              <a:t>3/20/2020</a:t>
+              <a:t>3/18/2022</a:t>
             </a:fld>
             <a:endParaRPr lang="en-US"/>
           </a:p>
@@ -12615,13 +12494,6 @@
   <p:transition>
     <p:fade/>
   </p:transition>
-  <p:timing>
-    <p:tnLst>
-      <p:par>
-        <p:cTn id="1" dur="indefinite" restart="never" nodeType="tmRoot"/>
-      </p:par>
-    </p:tnLst>
-  </p:timing>
 </p:sldLayout>
 </file>
 
@@ -12673,7 +12545,7 @@
           <a:p>
             <a:fld id="{5958763E-B898-436D-883D-03711491D54A}" type="datetimeFigureOut">
               <a:rPr lang="en-US" smtClean="0"/>
-              <a:t>3/20/2020</a:t>
+              <a:t>3/18/2022</a:t>
             </a:fld>
             <a:endParaRPr lang="en-US"/>
           </a:p>
@@ -12746,13 +12618,6 @@
   <p:transition>
     <p:fade/>
   </p:transition>
-  <p:timing>
-    <p:tnLst>
-      <p:par>
-        <p:cTn id="1" dur="indefinite" restart="never" nodeType="tmRoot"/>
-      </p:par>
-    </p:tnLst>
-  </p:timing>
 </p:sldLayout>
 </file>
 
@@ -12804,7 +12669,7 @@
           <a:p>
             <a:fld id="{5958763E-B898-436D-883D-03711491D54A}" type="datetimeFigureOut">
               <a:rPr lang="en-US" smtClean="0"/>
-              <a:t>3/20/2020</a:t>
+              <a:t>3/18/2022</a:t>
             </a:fld>
             <a:endParaRPr lang="en-US"/>
           </a:p>
@@ -12877,13 +12742,6 @@
   <p:transition>
     <p:fade/>
   </p:transition>
-  <p:timing>
-    <p:tnLst>
-      <p:par>
-        <p:cTn id="1" dur="indefinite" restart="never" nodeType="tmRoot"/>
-      </p:par>
-    </p:tnLst>
-  </p:timing>
 </p:sldLayout>
 </file>
 
@@ -12935,7 +12793,7 @@
           <a:p>
             <a:fld id="{5958763E-B898-436D-883D-03711491D54A}" type="datetimeFigureOut">
               <a:rPr lang="en-US" smtClean="0"/>
-              <a:t>3/20/2020</a:t>
+              <a:t>3/18/2022</a:t>
             </a:fld>
             <a:endParaRPr lang="en-US"/>
           </a:p>
@@ -13008,13 +12866,6 @@
   <p:transition>
     <p:fade/>
   </p:transition>
-  <p:timing>
-    <p:tnLst>
-      <p:par>
-        <p:cTn id="1" dur="indefinite" restart="never" nodeType="tmRoot"/>
-      </p:par>
-    </p:tnLst>
-  </p:timing>
 </p:sldLayout>
 </file>
 
@@ -13066,7 +12917,7 @@
           <a:p>
             <a:fld id="{5958763E-B898-436D-883D-03711491D54A}" type="datetimeFigureOut">
               <a:rPr lang="en-US" smtClean="0"/>
-              <a:t>3/20/2020</a:t>
+              <a:t>3/18/2022</a:t>
             </a:fld>
             <a:endParaRPr lang="en-US"/>
           </a:p>
@@ -13139,13 +12990,6 @@
   <p:transition>
     <p:fade/>
   </p:transition>
-  <p:timing>
-    <p:tnLst>
-      <p:par>
-        <p:cTn id="1" dur="indefinite" restart="never" nodeType="tmRoot"/>
-      </p:par>
-    </p:tnLst>
-  </p:timing>
 </p:sldLayout>
 </file>
 
@@ -13197,7 +13041,7 @@
           <a:p>
             <a:fld id="{5958763E-B898-436D-883D-03711491D54A}" type="datetimeFigureOut">
               <a:rPr lang="en-US" smtClean="0"/>
-              <a:t>3/20/2020</a:t>
+              <a:t>3/18/2022</a:t>
             </a:fld>
             <a:endParaRPr lang="en-US"/>
           </a:p>
@@ -13270,13 +13114,6 @@
   <p:transition>
     <p:fade/>
   </p:transition>
-  <p:timing>
-    <p:tnLst>
-      <p:par>
-        <p:cTn id="1" dur="indefinite" restart="never" nodeType="tmRoot"/>
-      </p:par>
-    </p:tnLst>
-  </p:timing>
 </p:sldLayout>
 </file>
 
@@ -13328,7 +13165,7 @@
           <a:p>
             <a:fld id="{5958763E-B898-436D-883D-03711491D54A}" type="datetimeFigureOut">
               <a:rPr lang="en-US" smtClean="0"/>
-              <a:t>3/20/2020</a:t>
+              <a:t>3/18/2022</a:t>
             </a:fld>
             <a:endParaRPr lang="en-US"/>
           </a:p>
@@ -13401,13 +13238,6 @@
   <p:transition>
     <p:fade/>
   </p:transition>
-  <p:timing>
-    <p:tnLst>
-      <p:par>
-        <p:cTn id="1" dur="indefinite" restart="never" nodeType="tmRoot"/>
-      </p:par>
-    </p:tnLst>
-  </p:timing>
 </p:sldLayout>
 </file>
 
@@ -13468,7 +13298,7 @@
           <a:p>
             <a:fld id="{5958763E-B898-436D-883D-03711491D54A}" type="datetimeFigureOut">
               <a:rPr lang="en-US" smtClean="0"/>
-              <a:t>3/20/2020</a:t>
+              <a:t>3/18/2022</a:t>
             </a:fld>
             <a:endParaRPr lang="en-US"/>
           </a:p>
@@ -13541,13 +13371,6 @@
   <p:transition>
     <p:fade/>
   </p:transition>
-  <p:timing>
-    <p:tnLst>
-      <p:par>
-        <p:cTn id="1" dur="indefinite" restart="never" nodeType="tmRoot"/>
-      </p:par>
-    </p:tnLst>
-  </p:timing>
 </p:sldLayout>
 </file>
 
@@ -16549,13 +16372,6 @@
   <p:transition>
     <p:fade/>
   </p:transition>
-  <p:timing>
-    <p:tnLst>
-      <p:par>
-        <p:cTn id="1" dur="indefinite" restart="never" nodeType="tmRoot"/>
-      </p:par>
-    </p:tnLst>
-  </p:timing>
 </p:sldLayout>
 </file>
 
@@ -16643,7 +16459,7 @@
                 <a:spcPct val="0"/>
               </a:spcAft>
             </a:pPr>
-            <a:endParaRPr lang="en-US" sz="2400" dirty="0" err="1" smtClean="0">
+            <a:endParaRPr lang="en-US" sz="2400" dirty="0" err="1">
               <a:gradFill>
                 <a:gsLst>
                   <a:gs pos="0">
@@ -16779,15 +16595,7 @@
           <a:p>
             <a:r>
               <a:rPr lang="en-US" dirty="0"/>
-              <a:t>Click to edit Master </a:t>
-            </a:r>
-            <a:r>
-              <a:rPr lang="en-US" dirty="0" smtClean="0"/>
-              <a:t>subtitle </a:t>
-            </a:r>
-            <a:r>
-              <a:rPr lang="en-US" dirty="0"/>
-              <a:t>style</a:t>
+              <a:t>Click to edit Master subtitle style</a:t>
             </a:r>
           </a:p>
         </p:txBody>
@@ -16829,7 +16637,7 @@
             <a:fld id="{1C2D31DE-C454-491C-B5C3-F097855E3DF7}" type="datetime4">
               <a:rPr lang="en-US" smtClean="0"/>
               <a:pPr/>
-              <a:t>March 20, 2020</a:t>
+              <a:t>March 18, 2022</a:t>
             </a:fld>
             <a:endParaRPr lang="en-US" dirty="0"/>
           </a:p>
@@ -19911,17 +19719,16 @@
           <a:p>
             <a:pPr lvl="0"/>
             <a:r>
-              <a:rPr lang="en-US" dirty="0" smtClean="0"/>
+              <a:rPr lang="en-US" dirty="0"/>
               <a:t>Presenter Name</a:t>
             </a:r>
             <a:br>
-              <a:rPr lang="en-US" dirty="0" smtClean="0"/>
+              <a:rPr lang="en-US" dirty="0"/>
             </a:br>
             <a:r>
-              <a:rPr lang="en-US" dirty="0" smtClean="0"/>
+              <a:rPr lang="en-US" dirty="0"/>
               <a:t>Presenter Title</a:t>
             </a:r>
-            <a:endParaRPr lang="en-US" dirty="0"/>
           </a:p>
         </p:txBody>
       </p:sp>
@@ -19938,13 +19745,6 @@
   <p:transition>
     <p:fade/>
   </p:transition>
-  <p:timing>
-    <p:tnLst>
-      <p:par>
-        <p:cTn id="1" dur="indefinite" restart="never" nodeType="tmRoot"/>
-      </p:par>
-    </p:tnLst>
-  </p:timing>
   <p:hf sldNum="0" hdr="0" ftr="0"/>
 </p:sldLayout>
 </file>
@@ -27454,10 +27254,9 @@
           <a:p>
             <a:pPr lvl="0"/>
             <a:r>
-              <a:rPr lang="en-US" dirty="0" smtClean="0"/>
+              <a:rPr lang="en-US" dirty="0"/>
               <a:t>&lt;Call to action&gt;</a:t>
             </a:r>
-            <a:endParaRPr lang="en-US" dirty="0"/>
           </a:p>
         </p:txBody>
       </p:sp>
@@ -29074,7 +28873,7 @@
           <a:p>
             <a:fld id="{5958763E-B898-436D-883D-03711491D54A}" type="datetimeFigureOut">
               <a:rPr lang="en-US" smtClean="0"/>
-              <a:t>3/20/2020</a:t>
+              <a:t>3/18/2022</a:t>
             </a:fld>
             <a:endParaRPr lang="en-US"/>
           </a:p>
@@ -29201,7 +29000,7 @@
                 <a:spcPct val="0"/>
               </a:spcAft>
             </a:pPr>
-            <a:endParaRPr lang="en-US" sz="2400" dirty="0" err="1" smtClean="0">
+            <a:endParaRPr lang="en-US" sz="2400" dirty="0" err="1">
               <a:gradFill>
                 <a:gsLst>
                   <a:gs pos="0">
@@ -29232,13 +29031,6 @@
   <p:transition>
     <p:fade/>
   </p:transition>
-  <p:timing>
-    <p:tnLst>
-      <p:par>
-        <p:cTn id="1" dur="indefinite" restart="never" nodeType="tmRoot"/>
-      </p:par>
-    </p:tnLst>
-  </p:timing>
 </p:sldLayout>
 </file>
 
@@ -29483,7 +29275,7 @@
           <a:p>
             <a:fld id="{5958763E-B898-436D-883D-03711491D54A}" type="datetimeFigureOut">
               <a:rPr lang="en-US" smtClean="0"/>
-              <a:t>3/20/2020</a:t>
+              <a:t>3/18/2022</a:t>
             </a:fld>
             <a:endParaRPr lang="en-US"/>
           </a:p>
@@ -29556,13 +29348,6 @@
   <p:transition>
     <p:fade/>
   </p:transition>
-  <p:timing>
-    <p:tnLst>
-      <p:par>
-        <p:cTn id="1" dur="indefinite" restart="never" nodeType="tmRoot"/>
-      </p:par>
-    </p:tnLst>
-  </p:timing>
 </p:sldLayout>
 </file>
 
@@ -29784,7 +29569,7 @@
           <a:p>
             <a:fld id="{5958763E-B898-436D-883D-03711491D54A}" type="datetimeFigureOut">
               <a:rPr lang="en-US" smtClean="0"/>
-              <a:t>3/20/2020</a:t>
+              <a:t>3/18/2022</a:t>
             </a:fld>
             <a:endParaRPr lang="en-US"/>
           </a:p>
@@ -29857,13 +29642,6 @@
   <p:transition>
     <p:fade/>
   </p:transition>
-  <p:timing>
-    <p:tnLst>
-      <p:par>
-        <p:cTn id="1" dur="indefinite" restart="never" nodeType="tmRoot"/>
-      </p:par>
-    </p:tnLst>
-  </p:timing>
 </p:sldLayout>
 </file>
 
@@ -29992,7 +29770,7 @@
           <a:p>
             <a:fld id="{5958763E-B898-436D-883D-03711491D54A}" type="datetimeFigureOut">
               <a:rPr lang="en-US" smtClean="0"/>
-              <a:t>3/20/2020</a:t>
+              <a:t>3/18/2022</a:t>
             </a:fld>
             <a:endParaRPr lang="en-US"/>
           </a:p>
@@ -30115,13 +29893,6 @@
   <p:transition>
     <p:fade/>
   </p:transition>
-  <p:timing>
-    <p:tnLst>
-      <p:par>
-        <p:cTn id="1" dur="indefinite" restart="never" nodeType="tmRoot"/>
-      </p:par>
-    </p:tnLst>
-  </p:timing>
 </p:sldLayout>
 </file>
 
@@ -30260,7 +30031,7 @@
           <a:p>
             <a:fld id="{5958763E-B898-436D-883D-03711491D54A}" type="datetimeFigureOut">
               <a:rPr lang="en-US" smtClean="0"/>
-              <a:t>3/20/2020</a:t>
+              <a:t>3/18/2022</a:t>
             </a:fld>
             <a:endParaRPr lang="en-US"/>
           </a:p>
@@ -30387,13 +30158,6 @@
   <p:transition>
     <p:fade/>
   </p:transition>
-  <p:timing>
-    <p:tnLst>
-      <p:par>
-        <p:cTn id="1" dur="indefinite" restart="never" nodeType="tmRoot"/>
-      </p:par>
-    </p:tnLst>
-  </p:timing>
 </p:sldLayout>
 </file>
 
@@ -30555,7 +30319,7 @@
                 <a:spcPct val="0"/>
               </a:spcAft>
             </a:pPr>
-            <a:endParaRPr lang="en-US" sz="2400" dirty="0" err="1" smtClean="0">
+            <a:endParaRPr lang="en-US" sz="2400" dirty="0" err="1">
               <a:gradFill>
                 <a:gsLst>
                   <a:gs pos="0">
@@ -30606,10 +30370,9 @@
           </a:lstStyle>
           <a:p>
             <a:r>
-              <a:rPr lang="en-US" dirty="0" smtClean="0"/>
+              <a:rPr lang="en-US" dirty="0"/>
               <a:t>Type “Agenda”</a:t>
             </a:r>
-            <a:endParaRPr lang="en-US" dirty="0"/>
           </a:p>
         </p:txBody>
       </p:sp>
@@ -30733,24 +30496,23 @@
           <a:p>
             <a:pPr lvl="0"/>
             <a:r>
-              <a:rPr lang="en-US" dirty="0" smtClean="0"/>
+              <a:rPr lang="en-US" dirty="0"/>
               <a:t>Item 1</a:t>
             </a:r>
           </a:p>
           <a:p>
             <a:pPr lvl="0"/>
             <a:r>
-              <a:rPr lang="en-US" dirty="0" smtClean="0"/>
+              <a:rPr lang="en-US" dirty="0"/>
               <a:t>Item 2</a:t>
             </a:r>
           </a:p>
           <a:p>
             <a:pPr lvl="0"/>
             <a:r>
-              <a:rPr lang="en-US" dirty="0" smtClean="0"/>
+              <a:rPr lang="en-US" dirty="0"/>
               <a:t>Item 3</a:t>
             </a:r>
-            <a:endParaRPr lang="en-US" dirty="0"/>
           </a:p>
         </p:txBody>
       </p:sp>
@@ -30777,7 +30539,7 @@
           <a:p>
             <a:fld id="{5958763E-B898-436D-883D-03711491D54A}" type="datetimeFigureOut">
               <a:rPr lang="en-US" smtClean="0"/>
-              <a:t>3/20/2020</a:t>
+              <a:t>3/18/2022</a:t>
             </a:fld>
             <a:endParaRPr lang="en-US"/>
           </a:p>
@@ -30884,13 +30646,6 @@
   <p:transition>
     <p:fade/>
   </p:transition>
-  <p:timing>
-    <p:tnLst>
-      <p:par>
-        <p:cTn id="1" dur="indefinite" restart="never" nodeType="tmRoot"/>
-      </p:par>
-    </p:tnLst>
-  </p:timing>
 </p:sldLayout>
 </file>
 
@@ -31052,7 +30807,7 @@
                 <a:spcPct val="0"/>
               </a:spcAft>
             </a:pPr>
-            <a:endParaRPr lang="en-US" sz="2400" dirty="0" err="1" smtClean="0">
+            <a:endParaRPr lang="en-US" sz="2400" dirty="0" err="1">
               <a:gradFill>
                 <a:gsLst>
                   <a:gs pos="0">
@@ -31105,10 +30860,9 @@
           </a:lstStyle>
           <a:p>
             <a:r>
-              <a:rPr lang="en-US" dirty="0" smtClean="0"/>
+              <a:rPr lang="en-US" dirty="0"/>
               <a:t>Notable Quote</a:t>
             </a:r>
-            <a:endParaRPr lang="en-US" dirty="0"/>
           </a:p>
         </p:txBody>
       </p:sp>
@@ -31235,10 +30989,9 @@
           <a:p>
             <a:pPr lvl="0"/>
             <a:r>
-              <a:rPr lang="en-US" dirty="0" smtClean="0"/>
+              <a:rPr lang="en-US" dirty="0"/>
               <a:t>– Attribution</a:t>
             </a:r>
-            <a:endParaRPr lang="en-US" dirty="0"/>
           </a:p>
         </p:txBody>
       </p:sp>
@@ -31265,7 +31018,7 @@
           <a:p>
             <a:fld id="{5958763E-B898-436D-883D-03711491D54A}" type="datetimeFigureOut">
               <a:rPr lang="en-US" smtClean="0"/>
-              <a:t>3/20/2020</a:t>
+              <a:t>3/18/2022</a:t>
             </a:fld>
             <a:endParaRPr lang="en-US"/>
           </a:p>
@@ -32013,13 +31766,6 @@
   <p:transition>
     <p:fade/>
   </p:transition>
-  <p:timing>
-    <p:tnLst>
-      <p:par>
-        <p:cTn id="1" dur="indefinite" restart="never" nodeType="tmRoot"/>
-      </p:par>
-    </p:tnLst>
-  </p:timing>
 </p:sldLayout>
 </file>
 
@@ -32091,7 +31837,7 @@
           <a:p>
             <a:fld id="{5958763E-B898-436D-883D-03711491D54A}" type="datetimeFigureOut">
               <a:rPr lang="en-US" smtClean="0"/>
-              <a:t>3/20/2020</a:t>
+              <a:t>3/18/2022</a:t>
             </a:fld>
             <a:endParaRPr lang="en-US"/>
           </a:p>
@@ -32164,13 +31910,6 @@
   <p:transition>
     <p:fade/>
   </p:transition>
-  <p:timing>
-    <p:tnLst>
-      <p:par>
-        <p:cTn id="1" dur="indefinite" restart="never" nodeType="tmRoot"/>
-      </p:par>
-    </p:tnLst>
-  </p:timing>
 </p:sldLayout>
 </file>
 
@@ -32299,7 +32038,7 @@
           <a:p>
             <a:fld id="{5958763E-B898-436D-883D-03711491D54A}" type="datetimeFigureOut">
               <a:rPr lang="en-US" smtClean="0"/>
-              <a:t>3/20/2020</a:t>
+              <a:t>3/18/2022</a:t>
             </a:fld>
             <a:endParaRPr lang="en-US"/>
           </a:p>
@@ -32422,13 +32161,6 @@
   <p:transition>
     <p:fade/>
   </p:transition>
-  <p:timing>
-    <p:tnLst>
-      <p:par>
-        <p:cTn id="1" dur="indefinite" restart="never" nodeType="tmRoot"/>
-      </p:par>
-    </p:tnLst>
-  </p:timing>
 </p:sldLayout>
 </file>
 
@@ -32641,7 +32373,7 @@
           <a:p>
             <a:fld id="{5958763E-B898-436D-883D-03711491D54A}" type="datetimeFigureOut">
               <a:rPr lang="en-US" smtClean="0"/>
-              <a:t>3/20/2020</a:t>
+              <a:t>3/18/2022</a:t>
             </a:fld>
             <a:endParaRPr lang="en-US"/>
           </a:p>
@@ -32714,13 +32446,6 @@
   <p:transition>
     <p:fade/>
   </p:transition>
-  <p:timing>
-    <p:tnLst>
-      <p:par>
-        <p:cTn id="1" dur="indefinite" restart="never" nodeType="tmRoot"/>
-      </p:par>
-    </p:tnLst>
-  </p:timing>
 </p:sldLayout>
 </file>
 
@@ -32878,7 +32603,7 @@
           <a:p>
             <a:fld id="{5958763E-B898-436D-883D-03711491D54A}" type="datetimeFigureOut">
               <a:rPr lang="en-US" smtClean="0"/>
-              <a:t>3/20/2020</a:t>
+              <a:t>3/18/2022</a:t>
             </a:fld>
             <a:endParaRPr lang="en-US"/>
           </a:p>
@@ -32951,13 +32676,6 @@
   <p:transition>
     <p:fade/>
   </p:transition>
-  <p:timing>
-    <p:tnLst>
-      <p:par>
-        <p:cTn id="1" dur="indefinite" restart="never" nodeType="tmRoot"/>
-      </p:par>
-    </p:tnLst>
-  </p:timing>
 </p:sldLayout>
 </file>
 
@@ -33129,7 +32847,7 @@
           <a:p>
             <a:fld id="{5958763E-B898-436D-883D-03711491D54A}" type="datetimeFigureOut">
               <a:rPr lang="en-US" smtClean="0"/>
-              <a:t>3/20/2020</a:t>
+              <a:t>3/18/2022</a:t>
             </a:fld>
             <a:endParaRPr lang="en-US"/>
           </a:p>
@@ -33275,13 +32993,6 @@
   <p:transition>
     <p:fade/>
   </p:transition>
-  <p:timing>
-    <p:tnLst>
-      <p:par>
-        <p:cTn id="1" dur="indefinite" restart="never" nodeType="tmRoot"/>
-      </p:par>
-    </p:tnLst>
-  </p:timing>
   <p:txStyles>
     <p:titleStyle>
       <a:lvl1pPr algn="l" defTabSz="914400" rtl="0" eaLnBrk="1" latinLnBrk="0" hangingPunct="1">
@@ -33586,7 +33297,7 @@
       </a:lvl9pPr>
     </p:otherStyle>
   </p:txStyles>
-  <p:extLst mod="1">
+  <p:extLst>
     <p:ext uri="{27BBF7A9-308A-43DC-89C8-2F10F3537804}">
       <p15:sldGuideLst xmlns:p15="http://schemas.microsoft.com/office/powerpoint/2012/main">
         <p15:guide id="1" orient="horz" pos="2160" userDrawn="1">
@@ -33665,10 +33376,9 @@
           <a:lstStyle/>
           <a:p>
             <a:r>
-              <a:rPr lang="en-US" sz="6600" dirty="0" smtClean="0"/>
+              <a:rPr lang="en-US" sz="6600" dirty="0"/>
               <a:t>More HTML Elements</a:t>
             </a:r>
-            <a:endParaRPr lang="en-US" sz="6600" dirty="0"/>
           </a:p>
         </p:txBody>
       </p:sp>
@@ -33693,10 +33403,9 @@
           <a:lstStyle/>
           <a:p>
             <a:r>
-              <a:rPr lang="en-US" dirty="0" smtClean="0"/>
+              <a:rPr lang="en-US" dirty="0"/>
               <a:t>Hy-Tech Club: Web 101</a:t>
             </a:r>
-            <a:endParaRPr lang="en-US" dirty="0"/>
           </a:p>
         </p:txBody>
       </p:sp>
@@ -36681,13 +36390,6 @@
   <p:transition>
     <p:fade/>
   </p:transition>
-  <p:timing>
-    <p:tnLst>
-      <p:par>
-        <p:cTn id="1" dur="indefinite" restart="never" nodeType="tmRoot"/>
-      </p:par>
-    </p:tnLst>
-  </p:timing>
 </p:sld>
 </file>
 
@@ -36724,10 +36426,9 @@
           <a:lstStyle/>
           <a:p>
             <a:r>
-              <a:rPr lang="en-US" dirty="0" smtClean="0"/>
+              <a:rPr lang="en-US" dirty="0"/>
               <a:t>Nesting activity</a:t>
             </a:r>
-            <a:endParaRPr lang="en-US" dirty="0"/>
           </a:p>
         </p:txBody>
       </p:sp>
@@ -36785,13 +36486,6 @@
   <p:transition>
     <p:fade/>
   </p:transition>
-  <p:timing>
-    <p:tnLst>
-      <p:par>
-        <p:cTn id="1" dur="indefinite" restart="never" nodeType="tmRoot"/>
-      </p:par>
-    </p:tnLst>
-  </p:timing>
 </p:sld>
 </file>
 
@@ -36828,10 +36522,9 @@
           <a:lstStyle/>
           <a:p>
             <a:r>
-              <a:rPr lang="en-US" dirty="0" smtClean="0"/>
+              <a:rPr lang="en-US" dirty="0"/>
               <a:t>List Example</a:t>
             </a:r>
-            <a:endParaRPr lang="en-US" dirty="0"/>
           </a:p>
         </p:txBody>
       </p:sp>
@@ -36859,7 +36552,7 @@
               <a:rPr lang="en-US" sz="11500" dirty="0">
                 <a:hlinkClick r:id="rId3"/>
               </a:rPr>
-              <a:t>https://repl.it/repls/HuskyIcyBuckets</a:t>
+              <a:t>https://replit.com/@HylandOutreach/ListExample</a:t>
             </a:r>
             <a:endParaRPr lang="en-US" sz="13800" dirty="0"/>
           </a:p>
@@ -36878,13 +36571,6 @@
   <p:transition>
     <p:fade/>
   </p:transition>
-  <p:timing>
-    <p:tnLst>
-      <p:par>
-        <p:cTn id="1" dur="indefinite" restart="never" nodeType="tmRoot"/>
-      </p:par>
-    </p:tnLst>
-  </p:timing>
 </p:sld>
 </file>
 
@@ -36931,7 +36617,7 @@
           <a:lstStyle/>
           <a:p>
             <a:r>
-              <a:rPr lang="en-US" dirty="0" smtClean="0">
+              <a:rPr lang="en-US" dirty="0">
                 <a:solidFill>
                   <a:schemeClr val="accent6"/>
                 </a:solidFill>
@@ -36939,7 +36625,7 @@
               <a:t>The </a:t>
             </a:r>
             <a:r>
-              <a:rPr lang="en-US" sz="4000" cap="none" dirty="0" smtClean="0">
+              <a:rPr lang="en-US" sz="4000" cap="none" dirty="0">
                 <a:solidFill>
                   <a:schemeClr val="accent1">
                     <a:lumMod val="60000"/>
@@ -36951,7 +36637,7 @@
               <a:t>input</a:t>
             </a:r>
             <a:r>
-              <a:rPr lang="en-US" dirty="0" smtClean="0">
+              <a:rPr lang="en-US" dirty="0">
                 <a:solidFill>
                   <a:schemeClr val="accent6"/>
                 </a:solidFill>
@@ -36992,7 +36678,7 @@
           <a:lstStyle/>
           <a:p>
             <a:r>
-              <a:rPr lang="en-US" sz="3200" b="1" dirty="0" smtClean="0">
+              <a:rPr lang="en-US" sz="3200" b="1" dirty="0">
                 <a:solidFill>
                   <a:schemeClr val="accent1">
                     <a:lumMod val="60000"/>
@@ -37004,7 +36690,7 @@
               <a:t>input</a:t>
             </a:r>
             <a:r>
-              <a:rPr lang="en-US" dirty="0" smtClean="0">
+              <a:rPr lang="en-US" dirty="0">
                 <a:solidFill>
                   <a:schemeClr val="bg1"/>
                 </a:solidFill>
@@ -37014,7 +36700,7 @@
           </a:p>
           <a:p>
             <a:r>
-              <a:rPr lang="en-US" dirty="0" smtClean="0">
+              <a:rPr lang="en-US" dirty="0">
                 <a:solidFill>
                   <a:schemeClr val="bg1"/>
                 </a:solidFill>
@@ -37022,7 +36708,7 @@
               <a:t>The </a:t>
             </a:r>
             <a:r>
-              <a:rPr lang="en-US" sz="3200" b="1" dirty="0" smtClean="0">
+              <a:rPr lang="en-US" sz="3200" b="1" dirty="0">
                 <a:solidFill>
                   <a:schemeClr val="accent1">
                     <a:lumMod val="60000"/>
@@ -37034,7 +36720,7 @@
               <a:t>type</a:t>
             </a:r>
             <a:r>
-              <a:rPr lang="en-US" dirty="0" smtClean="0">
+              <a:rPr lang="en-US" dirty="0">
                 <a:solidFill>
                   <a:schemeClr val="bg1"/>
                 </a:solidFill>
@@ -37042,7 +36728,7 @@
               <a:t> attribute determines how the </a:t>
             </a:r>
             <a:r>
-              <a:rPr lang="en-US" sz="3200" b="1" dirty="0" smtClean="0">
+              <a:rPr lang="en-US" sz="3200" b="1" dirty="0">
                 <a:solidFill>
                   <a:schemeClr val="accent1">
                     <a:lumMod val="60000"/>
@@ -37054,7 +36740,7 @@
               <a:t>input</a:t>
             </a:r>
             <a:r>
-              <a:rPr lang="en-US" dirty="0" smtClean="0">
+              <a:rPr lang="en-US" dirty="0">
                 <a:solidFill>
                   <a:schemeClr val="bg1"/>
                 </a:solidFill>
@@ -37064,7 +36750,7 @@
           </a:p>
           <a:p>
             <a:r>
-              <a:rPr lang="en-US" dirty="0" smtClean="0">
+              <a:rPr lang="en-US" dirty="0">
                 <a:solidFill>
                   <a:schemeClr val="bg1"/>
                 </a:solidFill>
@@ -37072,7 +36758,7 @@
               <a:t>It is a </a:t>
             </a:r>
             <a:r>
-              <a:rPr lang="en-US" i="1" dirty="0" smtClean="0">
+              <a:rPr lang="en-US" i="1" dirty="0">
                 <a:solidFill>
                   <a:schemeClr val="bg1"/>
                 </a:solidFill>
@@ -37915,7 +37601,7 @@
           <a:lstStyle/>
           <a:p>
             <a:r>
-              <a:rPr lang="en-US" dirty="0" smtClean="0">
+              <a:rPr lang="en-US" dirty="0">
                 <a:solidFill>
                   <a:schemeClr val="accent6"/>
                 </a:solidFill>
@@ -37956,7 +37642,7 @@
           <a:lstStyle/>
           <a:p>
             <a:r>
-              <a:rPr lang="en-US" sz="3200" b="1" dirty="0" err="1" smtClean="0">
+              <a:rPr lang="en-US" sz="3200" b="1" dirty="0" err="1">
                 <a:solidFill>
                   <a:schemeClr val="accent1">
                     <a:lumMod val="60000"/>
@@ -37968,7 +37654,7 @@
               <a:t>textarea</a:t>
             </a:r>
             <a:r>
-              <a:rPr lang="en-US" dirty="0" smtClean="0">
+              <a:rPr lang="en-US" dirty="0">
                 <a:solidFill>
                   <a:schemeClr val="bg1"/>
                 </a:solidFill>
@@ -37978,7 +37664,7 @@
           </a:p>
           <a:p>
             <a:r>
-              <a:rPr lang="en-US" sz="3200" b="1" dirty="0" smtClean="0">
+              <a:rPr lang="en-US" sz="3200" b="1" dirty="0">
                 <a:solidFill>
                   <a:schemeClr val="accent1">
                     <a:lumMod val="60000"/>
@@ -37990,7 +37676,7 @@
               <a:t>select</a:t>
             </a:r>
             <a:r>
-              <a:rPr lang="en-US" dirty="0" smtClean="0">
+              <a:rPr lang="en-US" dirty="0">
                 <a:solidFill>
                   <a:schemeClr val="bg1"/>
                 </a:solidFill>
@@ -37998,7 +37684,7 @@
               <a:t> and </a:t>
             </a:r>
             <a:r>
-              <a:rPr lang="en-US" sz="3200" b="1" dirty="0" smtClean="0">
+              <a:rPr lang="en-US" sz="3200" b="1" dirty="0">
                 <a:solidFill>
                   <a:srgbClr val="54C8E8">
                     <a:lumMod val="60000"/>
@@ -38015,21 +37701,8 @@
                   <a:schemeClr val="bg1"/>
                 </a:solidFill>
               </a:rPr>
-              <a:t> </a:t>
-            </a:r>
-            <a:r>
-              <a:rPr lang="en-US" dirty="0" smtClean="0">
-                <a:solidFill>
-                  <a:schemeClr val="bg1"/>
-                </a:solidFill>
-              </a:rPr>
-              <a:t>are used to create a dropdown list</a:t>
-            </a:r>
-            <a:endParaRPr lang="en-US" dirty="0">
-              <a:solidFill>
-                <a:schemeClr val="bg1"/>
-              </a:solidFill>
-            </a:endParaRPr>
+              <a:t> are used to create a dropdown list</a:t>
+            </a:r>
           </a:p>
         </p:txBody>
       </p:sp>
@@ -38617,7 +38290,7 @@
           <a:lstStyle/>
           <a:p>
             <a:r>
-              <a:rPr lang="en-US" smtClean="0"/>
+              <a:rPr lang="en-US"/>
               <a:t>input Examples</a:t>
             </a:r>
             <a:endParaRPr lang="en-US" dirty="0"/>
@@ -38648,7 +38321,13 @@
               <a:rPr lang="en-US" sz="11500" dirty="0">
                 <a:hlinkClick r:id="rId3"/>
               </a:rPr>
-              <a:t>https://repl.it/repls/RowdyPowerlessPreprocessor</a:t>
+              <a:t>https://replit.com/@HylandOutreach</a:t>
+            </a:r>
+            <a:r>
+              <a:rPr lang="en-US" sz="11500">
+                <a:hlinkClick r:id="rId3"/>
+              </a:rPr>
+              <a:t>/InputExamples</a:t>
             </a:r>
             <a:endParaRPr lang="en-US" sz="16600" dirty="0"/>
           </a:p>
@@ -38667,13 +38346,6 @@
   <p:transition>
     <p:fade/>
   </p:transition>
-  <p:timing>
-    <p:tnLst>
-      <p:par>
-        <p:cTn id="1" dur="indefinite" restart="never" nodeType="tmRoot"/>
-      </p:par>
-    </p:tnLst>
-  </p:timing>
 </p:sld>
 </file>
 
@@ -38710,10 +38382,9 @@
           <a:lstStyle/>
           <a:p>
             <a:r>
-              <a:rPr lang="en-US" dirty="0" smtClean="0"/>
+              <a:rPr lang="en-US" dirty="0"/>
               <a:t>Agenda</a:t>
             </a:r>
-            <a:endParaRPr lang="en-US" dirty="0"/>
           </a:p>
         </p:txBody>
       </p:sp>
@@ -38733,16 +38404,15 @@
           <a:lstStyle/>
           <a:p>
             <a:r>
-              <a:rPr lang="en-US" dirty="0" smtClean="0"/>
+              <a:rPr lang="en-US" dirty="0"/>
               <a:t>HTML Attributes</a:t>
             </a:r>
           </a:p>
           <a:p>
             <a:r>
-              <a:rPr lang="en-US" dirty="0" smtClean="0"/>
+              <a:rPr lang="en-US" dirty="0"/>
               <a:t>HTML Lists &amp; Inputs</a:t>
             </a:r>
-            <a:endParaRPr lang="en-US" dirty="0"/>
           </a:p>
         </p:txBody>
       </p:sp>
@@ -38759,13 +38429,6 @@
   <p:transition>
     <p:fade/>
   </p:transition>
-  <p:timing>
-    <p:tnLst>
-      <p:par>
-        <p:cTn id="1" dur="indefinite" restart="never" nodeType="tmRoot"/>
-      </p:par>
-    </p:tnLst>
-  </p:timing>
 </p:sld>
 </file>
 
@@ -38802,10 +38465,9 @@
           <a:lstStyle/>
           <a:p>
             <a:r>
-              <a:rPr lang="en-US" dirty="0" smtClean="0"/>
+              <a:rPr lang="en-US" dirty="0"/>
               <a:t>HTML Attributes</a:t>
             </a:r>
-            <a:endParaRPr lang="en-US" dirty="0"/>
           </a:p>
         </p:txBody>
       </p:sp>
@@ -38861,13 +38523,6 @@
   <p:transition>
     <p:fade/>
   </p:transition>
-  <p:timing>
-    <p:tnLst>
-      <p:par>
-        <p:cTn id="1" dur="indefinite" restart="never" nodeType="tmRoot"/>
-      </p:par>
-    </p:tnLst>
-  </p:timing>
 </p:sld>
 </file>
 
@@ -38914,10 +38569,9 @@
           <a:lstStyle/>
           <a:p>
             <a:r>
-              <a:rPr lang="en-US" dirty="0" smtClean="0"/>
+              <a:rPr lang="en-US" dirty="0"/>
               <a:t>Attribute example: The anchor element</a:t>
             </a:r>
-            <a:endParaRPr lang="en-US" dirty="0"/>
           </a:p>
         </p:txBody>
       </p:sp>
@@ -38946,7 +38600,7 @@
             <a:pPr marL="57150" indent="0" algn="ctr">
               <a:buNone/>
             </a:pPr>
-            <a:endParaRPr lang="en-US" sz="3600" dirty="0" smtClean="0">
+            <a:endParaRPr lang="en-US" sz="3600" dirty="0">
               <a:solidFill>
                 <a:srgbClr val="808080"/>
               </a:solidFill>
@@ -38958,7 +38612,7 @@
               <a:buNone/>
             </a:pPr>
             <a:r>
-              <a:rPr lang="en-US" sz="3600" dirty="0" smtClean="0">
+              <a:rPr lang="en-US" sz="3600" dirty="0">
                 <a:solidFill>
                   <a:srgbClr val="808080"/>
                 </a:solidFill>
@@ -39009,19 +38663,10 @@
                 </a:solidFill>
                 <a:latin typeface="Consolas" panose="020B0609020204030204" pitchFamily="49" charset="0"/>
               </a:rPr>
-              <a:t>"</a:t>
-            </a:r>
-            <a:r>
-              <a:rPr lang="en-US" sz="3600" dirty="0" smtClean="0">
-                <a:solidFill>
-                  <a:srgbClr val="CE9178"/>
-                </a:solidFill>
-                <a:latin typeface="Consolas" panose="020B0609020204030204" pitchFamily="49" charset="0"/>
-              </a:rPr>
-              <a:t>http://wikipedia.org/"</a:t>
-            </a:r>
-            <a:r>
-              <a:rPr lang="en-US" sz="3600" dirty="0" smtClean="0">
+              <a:t>"http://wikipedia.org/"</a:t>
+            </a:r>
+            <a:r>
+              <a:rPr lang="en-US" sz="3600" dirty="0">
                 <a:solidFill>
                   <a:srgbClr val="808080"/>
                 </a:solidFill>
@@ -39057,7 +38702,7 @@
               <a:t>a</a:t>
             </a:r>
             <a:r>
-              <a:rPr lang="en-US" sz="3600" dirty="0" smtClean="0">
+              <a:rPr lang="en-US" sz="3600" dirty="0">
                 <a:solidFill>
                   <a:srgbClr val="808080"/>
                 </a:solidFill>
@@ -39137,7 +38782,7 @@
                 <a:spcPct val="0"/>
               </a:spcAft>
             </a:pPr>
-            <a:endParaRPr lang="en-US" sz="2400" dirty="0" err="1" smtClean="0">
+            <a:endParaRPr lang="en-US" sz="2400" dirty="0" err="1">
               <a:gradFill>
                 <a:gsLst>
                   <a:gs pos="0">
@@ -39186,7 +38831,7 @@
               </a:spcAft>
             </a:pPr>
             <a:r>
-              <a:rPr lang="en-US" sz="4000" b="1" dirty="0" smtClean="0">
+              <a:rPr lang="en-US" sz="4000" b="1" dirty="0">
                 <a:solidFill>
                   <a:schemeClr val="accent6"/>
                 </a:solidFill>
@@ -39194,7 +38839,7 @@
               <a:t>Q:</a:t>
             </a:r>
             <a:r>
-              <a:rPr lang="en-US" sz="4000" dirty="0" smtClean="0">
+              <a:rPr lang="en-US" sz="4000" dirty="0">
                 <a:solidFill>
                   <a:schemeClr val="accent6"/>
                 </a:solidFill>
@@ -39211,7 +38856,7 @@
               <a:t>href</a:t>
             </a:r>
             <a:r>
-              <a:rPr lang="en-US" sz="4000" dirty="0" smtClean="0">
+              <a:rPr lang="en-US" sz="4000" dirty="0">
                 <a:solidFill>
                   <a:schemeClr val="accent6"/>
                 </a:solidFill>
@@ -39252,7 +38897,7 @@
               </a:spcAft>
             </a:pPr>
             <a:r>
-              <a:rPr lang="en-US" sz="4000" b="1" dirty="0" smtClean="0">
+              <a:rPr lang="en-US" sz="4000" b="1" dirty="0">
                 <a:solidFill>
                   <a:schemeClr val="accent6"/>
                 </a:solidFill>
@@ -39260,7 +38905,7 @@
               <a:t>A: </a:t>
             </a:r>
             <a:r>
-              <a:rPr lang="en-US" sz="4000" dirty="0" smtClean="0">
+              <a:rPr lang="en-US" sz="4000" dirty="0">
                 <a:solidFill>
                   <a:schemeClr val="accent6"/>
                 </a:solidFill>
@@ -39277,7 +38922,7 @@
               <a:t>href</a:t>
             </a:r>
             <a:r>
-              <a:rPr lang="en-US" sz="4000" dirty="0" smtClean="0">
+              <a:rPr lang="en-US" sz="4000" dirty="0">
                 <a:solidFill>
                   <a:schemeClr val="accent6"/>
                 </a:solidFill>
@@ -39285,7 +38930,7 @@
               <a:t> </a:t>
             </a:r>
             <a:r>
-              <a:rPr lang="en-US" sz="4000" i="1" dirty="0" smtClean="0">
+              <a:rPr lang="en-US" sz="4000" i="1" dirty="0">
                 <a:solidFill>
                   <a:schemeClr val="accent6"/>
                 </a:solidFill>
@@ -39293,7 +38938,7 @@
               <a:t>attribute</a:t>
             </a:r>
             <a:r>
-              <a:rPr lang="en-US" sz="4000" dirty="0" smtClean="0">
+              <a:rPr lang="en-US" sz="4000" dirty="0">
                 <a:solidFill>
                   <a:schemeClr val="accent6"/>
                 </a:solidFill>
@@ -39528,10 +39173,9 @@
           <a:lstStyle/>
           <a:p>
             <a:r>
-              <a:rPr lang="en-US" dirty="0" smtClean="0"/>
+              <a:rPr lang="en-US" dirty="0"/>
               <a:t>What are attributes?</a:t>
             </a:r>
-            <a:endParaRPr lang="en-US" dirty="0"/>
           </a:p>
         </p:txBody>
       </p:sp>
@@ -39553,14 +39197,14 @@
           <a:lstStyle/>
           <a:p>
             <a:r>
-              <a:rPr lang="en-US" dirty="0" smtClean="0"/>
+              <a:rPr lang="en-US" dirty="0"/>
               <a:t>Attributes add extra information to HTML elements</a:t>
             </a:r>
           </a:p>
           <a:p>
             <a:pPr lvl="1"/>
             <a:r>
-              <a:rPr lang="en-US" dirty="0" smtClean="0"/>
+              <a:rPr lang="en-US" dirty="0"/>
               <a:t>They allow developers to customize the behavior of elements</a:t>
             </a:r>
           </a:p>
@@ -39570,15 +39214,15 @@
           </a:p>
           <a:p>
             <a:r>
-              <a:rPr lang="en-US" dirty="0" smtClean="0"/>
+              <a:rPr lang="en-US" dirty="0"/>
               <a:t>Attributes go inside of the </a:t>
             </a:r>
             <a:r>
-              <a:rPr lang="en-US" i="1" dirty="0" smtClean="0"/>
+              <a:rPr lang="en-US" i="1" dirty="0"/>
               <a:t>opening tag</a:t>
             </a:r>
             <a:r>
-              <a:rPr lang="en-US" dirty="0" smtClean="0"/>
+              <a:rPr lang="en-US" dirty="0"/>
               <a:t> of an HTML element</a:t>
             </a:r>
           </a:p>
@@ -39647,7 +39291,7 @@
               <a:t> </a:t>
             </a:r>
             <a:r>
-              <a:rPr lang="en-US" sz="5400" dirty="0" smtClean="0">
+              <a:rPr lang="en-US" sz="5400" dirty="0">
                 <a:solidFill>
                   <a:srgbClr val="800000"/>
                 </a:solidFill>
@@ -39663,20 +39307,19 @@
             </a:endParaRPr>
           </a:p>
           <a:p>
-            <a:endParaRPr lang="en-US" dirty="0" smtClean="0"/>
-          </a:p>
-          <a:p>
-            <a:r>
-              <a:rPr lang="en-US" dirty="0" smtClean="0"/>
+            <a:endParaRPr lang="en-US" dirty="0"/>
+          </a:p>
+          <a:p>
+            <a:r>
+              <a:rPr lang="en-US" dirty="0"/>
               <a:t>Attribute name, equals sign, quotation marks, attribute value</a:t>
             </a:r>
-            <a:endParaRPr lang="en-US" dirty="0"/>
           </a:p>
           <a:p>
             <a:pPr marL="57150" indent="0">
               <a:buNone/>
             </a:pPr>
-            <a:endParaRPr lang="en-US" dirty="0" smtClean="0"/>
+            <a:endParaRPr lang="en-US" dirty="0"/>
           </a:p>
           <a:p>
             <a:endParaRPr lang="en-US" dirty="0"/>
@@ -39685,7 +39328,7 @@
             <a:pPr marL="57150" indent="0">
               <a:buNone/>
             </a:pPr>
-            <a:endParaRPr lang="en-US" dirty="0" smtClean="0"/>
+            <a:endParaRPr lang="en-US" dirty="0"/>
           </a:p>
         </p:txBody>
       </p:sp>
@@ -40058,10 +39701,9 @@
           <a:lstStyle/>
           <a:p>
             <a:r>
-              <a:rPr lang="en-US" dirty="0" smtClean="0"/>
+              <a:rPr lang="en-US" dirty="0"/>
               <a:t>Mini-quiz</a:t>
             </a:r>
-            <a:endParaRPr lang="en-US" dirty="0"/>
           </a:p>
         </p:txBody>
       </p:sp>
@@ -40084,7 +39726,7 @@
               <a:buNone/>
             </a:pPr>
             <a:r>
-              <a:rPr lang="en-US" sz="4800" dirty="0" smtClean="0">
+              <a:rPr lang="en-US" sz="4800" dirty="0">
                 <a:solidFill>
                   <a:srgbClr val="800000"/>
                 </a:solidFill>
@@ -40120,7 +39762,7 @@
               <a:t>src</a:t>
             </a:r>
             <a:r>
-              <a:rPr lang="en-US" sz="4800" dirty="0" smtClean="0">
+              <a:rPr lang="en-US" sz="4800" dirty="0">
                 <a:solidFill>
                   <a:srgbClr val="000000"/>
                 </a:solidFill>
@@ -40129,7 +39771,7 @@
               <a:t>=</a:t>
             </a:r>
             <a:r>
-              <a:rPr lang="en-US" sz="4800" dirty="0" smtClean="0">
+              <a:rPr lang="en-US" sz="4800" dirty="0">
                 <a:solidFill>
                   <a:srgbClr val="0000FF"/>
                 </a:solidFill>
@@ -40147,7 +39789,7 @@
               <a:t> </a:t>
             </a:r>
             <a:r>
-              <a:rPr lang="en-US" sz="4800" dirty="0" smtClean="0">
+              <a:rPr lang="en-US" sz="4800" dirty="0">
                 <a:solidFill>
                   <a:srgbClr val="800000"/>
                 </a:solidFill>
@@ -40162,7 +39804,7 @@
                 <a:srgbClr val="98989A"/>
               </a:buClr>
             </a:pPr>
-            <a:endParaRPr lang="en-US" dirty="0" smtClean="0">
+            <a:endParaRPr lang="en-US" dirty="0">
               <a:solidFill>
                 <a:srgbClr val="56565A"/>
               </a:solidFill>
@@ -40176,7 +39818,7 @@
               <a:buNone/>
             </a:pPr>
             <a:r>
-              <a:rPr lang="en-US" sz="4000" dirty="0" smtClean="0">
+              <a:rPr lang="en-US" sz="4000" dirty="0">
                 <a:solidFill>
                   <a:srgbClr val="56565A"/>
                 </a:solidFill>
@@ -40184,7 +39826,7 @@
               <a:t>What is the </a:t>
             </a:r>
             <a:r>
-              <a:rPr lang="en-US" sz="4000" i="1" dirty="0" smtClean="0">
+              <a:rPr lang="en-US" sz="4000" i="1" dirty="0">
                 <a:solidFill>
                   <a:srgbClr val="56565A"/>
                 </a:solidFill>
@@ -40192,7 +39834,7 @@
               <a:t>attribute name</a:t>
             </a:r>
             <a:r>
-              <a:rPr lang="en-US" sz="4000" dirty="0" smtClean="0">
+              <a:rPr lang="en-US" sz="4000" dirty="0">
                 <a:solidFill>
                   <a:srgbClr val="56565A"/>
                 </a:solidFill>
@@ -40216,7 +39858,7 @@
               </a:rPr>
               <a:t>src</a:t>
             </a:r>
-            <a:endParaRPr lang="en-US" sz="4800" dirty="0" smtClean="0">
+            <a:endParaRPr lang="en-US" sz="4800" dirty="0">
               <a:solidFill>
                 <a:srgbClr val="56565A"/>
               </a:solidFill>
@@ -40230,7 +39872,7 @@
               <a:buNone/>
             </a:pPr>
             <a:r>
-              <a:rPr lang="en-US" sz="4000" dirty="0" smtClean="0">
+              <a:rPr lang="en-US" sz="4000" dirty="0">
                 <a:solidFill>
                   <a:srgbClr val="56565A"/>
                 </a:solidFill>
@@ -40238,7 +39880,7 @@
               <a:t>What is the </a:t>
             </a:r>
             <a:r>
-              <a:rPr lang="en-US" sz="4000" i="1" dirty="0" smtClean="0">
+              <a:rPr lang="en-US" sz="4000" i="1" dirty="0">
                 <a:solidFill>
                   <a:srgbClr val="56565A"/>
                 </a:solidFill>
@@ -40246,7 +39888,7 @@
               <a:t>attribute value</a:t>
             </a:r>
             <a:r>
-              <a:rPr lang="en-US" sz="4000" dirty="0" smtClean="0">
+              <a:rPr lang="en-US" sz="4000" dirty="0">
                 <a:solidFill>
                   <a:srgbClr val="56565A"/>
                 </a:solidFill>
@@ -40270,7 +39912,7 @@
               </a:rPr>
               <a:t>dog.png</a:t>
             </a:r>
-            <a:endParaRPr lang="en-US" sz="4800" dirty="0" smtClean="0">
+            <a:endParaRPr lang="en-US" sz="4800" dirty="0">
               <a:solidFill>
                 <a:srgbClr val="56565A"/>
               </a:solidFill>
@@ -40280,7 +39922,7 @@
             <a:pPr marL="57150" indent="0" algn="ctr">
               <a:buNone/>
             </a:pPr>
-            <a:endParaRPr lang="en-US" sz="4800" dirty="0" smtClean="0">
+            <a:endParaRPr lang="en-US" sz="4800" dirty="0">
               <a:solidFill>
                 <a:srgbClr val="800000"/>
               </a:solidFill>
@@ -40693,10 +40335,9 @@
           <a:lstStyle/>
           <a:p>
             <a:r>
-              <a:rPr lang="en-US" dirty="0" smtClean="0"/>
+              <a:rPr lang="en-US" dirty="0"/>
               <a:t>Attributes Examples</a:t>
             </a:r>
-            <a:endParaRPr lang="en-US" dirty="0"/>
           </a:p>
         </p:txBody>
       </p:sp>
@@ -40713,7 +40354,7 @@
         <p:spPr/>
         <p:txBody>
           <a:bodyPr>
-            <a:normAutofit/>
+            <a:normAutofit fontScale="92500"/>
           </a:bodyPr>
           <a:lstStyle/>
           <a:p>
@@ -40724,7 +40365,7 @@
               <a:rPr lang="en-US" sz="11500" dirty="0">
                 <a:hlinkClick r:id="rId3"/>
               </a:rPr>
-              <a:t>https://repl.it/repls/CharmingMotionlessUtility</a:t>
+              <a:t>https://replit.com/@HylandOutreach/AttributesExample</a:t>
             </a:r>
             <a:endParaRPr lang="en-US" sz="11500" dirty="0"/>
           </a:p>
@@ -40743,13 +40384,6 @@
   <p:transition>
     <p:fade/>
   </p:transition>
-  <p:timing>
-    <p:tnLst>
-      <p:par>
-        <p:cTn id="1" dur="indefinite" restart="never" nodeType="tmRoot"/>
-      </p:par>
-    </p:tnLst>
-  </p:timing>
 </p:sld>
 </file>
 
@@ -40791,10 +40425,9 @@
           <a:lstStyle/>
           <a:p>
             <a:r>
-              <a:rPr lang="en-US" dirty="0" smtClean="0"/>
+              <a:rPr lang="en-US" dirty="0"/>
               <a:t>More HTML Elements</a:t>
             </a:r>
-            <a:endParaRPr lang="en-US" dirty="0"/>
           </a:p>
         </p:txBody>
       </p:sp>
@@ -40841,13 +40474,6 @@
   <p:transition>
     <p:fade/>
   </p:transition>
-  <p:timing>
-    <p:tnLst>
-      <p:par>
-        <p:cTn id="1" dur="indefinite" restart="never" nodeType="tmRoot"/>
-      </p:par>
-    </p:tnLst>
-  </p:timing>
 </p:sld>
 </file>
 
@@ -40894,7 +40520,7 @@
           <a:lstStyle/>
           <a:p>
             <a:r>
-              <a:rPr lang="en-US" dirty="0" smtClean="0">
+              <a:rPr lang="en-US" dirty="0">
                 <a:solidFill>
                   <a:schemeClr val="accent6"/>
                 </a:solidFill>
@@ -40902,7 +40528,7 @@
               <a:t>The list elements: </a:t>
             </a:r>
             <a:r>
-              <a:rPr lang="en-US" sz="4000" cap="none" dirty="0" err="1" smtClean="0">
+              <a:rPr lang="en-US" sz="4000" cap="none" dirty="0" err="1">
                 <a:solidFill>
                   <a:schemeClr val="accent1">
                     <a:lumMod val="60000"/>
@@ -40914,7 +40540,7 @@
               <a:t>ul</a:t>
             </a:r>
             <a:r>
-              <a:rPr lang="en-US" dirty="0" smtClean="0">
+              <a:rPr lang="en-US" dirty="0">
                 <a:solidFill>
                   <a:schemeClr val="accent6"/>
                 </a:solidFill>
@@ -40922,7 +40548,7 @@
               <a:t> and </a:t>
             </a:r>
             <a:r>
-              <a:rPr lang="en-US" sz="4000" cap="none" dirty="0" err="1" smtClean="0">
+              <a:rPr lang="en-US" sz="4000" cap="none" dirty="0" err="1">
                 <a:solidFill>
                   <a:schemeClr val="accent1">
                     <a:lumMod val="60000"/>
@@ -40960,7 +40586,7 @@
           <a:lstStyle/>
           <a:p>
             <a:r>
-              <a:rPr lang="en-US" dirty="0" smtClean="0">
+              <a:rPr lang="en-US" dirty="0">
                 <a:solidFill>
                   <a:schemeClr val="bg1"/>
                 </a:solidFill>
@@ -40970,7 +40596,7 @@
           </a:p>
           <a:p>
             <a:r>
-              <a:rPr lang="en-US" dirty="0" smtClean="0">
+              <a:rPr lang="en-US" dirty="0">
                 <a:solidFill>
                   <a:schemeClr val="bg1"/>
                 </a:solidFill>
@@ -40980,7 +40606,7 @@
           </a:p>
           <a:p>
             <a:r>
-              <a:rPr lang="en-US" dirty="0" smtClean="0">
+              <a:rPr lang="en-US" dirty="0">
                 <a:solidFill>
                   <a:schemeClr val="bg1"/>
                 </a:solidFill>
@@ -40988,7 +40614,7 @@
               <a:t>Each item is its own HTML element: </a:t>
             </a:r>
             <a:r>
-              <a:rPr lang="en-US" dirty="0" smtClean="0">
+              <a:rPr lang="en-US" dirty="0">
                 <a:solidFill>
                   <a:schemeClr val="accent1">
                     <a:lumMod val="20000"/>
@@ -41002,7 +40628,7 @@
           </a:p>
           <a:p>
             <a:r>
-              <a:rPr lang="en-US" dirty="0" smtClean="0">
+              <a:rPr lang="en-US" dirty="0">
                 <a:solidFill>
                   <a:schemeClr val="bg1"/>
                 </a:solidFill>
@@ -41010,7 +40636,7 @@
               <a:t>The list items are </a:t>
             </a:r>
             <a:r>
-              <a:rPr lang="en-US" i="1" dirty="0" smtClean="0">
+              <a:rPr lang="en-US" i="1" dirty="0">
                 <a:solidFill>
                   <a:schemeClr val="bg1"/>
                 </a:solidFill>
@@ -41018,7 +40644,7 @@
               <a:t>children</a:t>
             </a:r>
             <a:r>
-              <a:rPr lang="en-US" dirty="0" smtClean="0">
+              <a:rPr lang="en-US" dirty="0">
                 <a:solidFill>
                   <a:schemeClr val="bg1"/>
                 </a:solidFill>
@@ -41026,14 +40652,14 @@
               <a:t> and the list elements are the </a:t>
             </a:r>
             <a:r>
-              <a:rPr lang="en-US" i="1" dirty="0" smtClean="0">
+              <a:rPr lang="en-US" i="1" dirty="0">
                 <a:solidFill>
                   <a:schemeClr val="bg1"/>
                 </a:solidFill>
               </a:rPr>
               <a:t>parents</a:t>
             </a:r>
-            <a:endParaRPr lang="en-US" dirty="0" smtClean="0">
+            <a:endParaRPr lang="en-US" dirty="0">
               <a:solidFill>
                 <a:schemeClr val="bg1"/>
               </a:solidFill>
@@ -41277,7 +40903,7 @@
               <a:t>ul</a:t>
             </a:r>
             <a:r>
-              <a:rPr lang="it-IT" sz="3600" dirty="0" smtClean="0">
+              <a:rPr lang="it-IT" sz="3600" dirty="0">
                 <a:solidFill>
                   <a:srgbClr val="808080"/>
                 </a:solidFill>
@@ -41317,7 +40943,7 @@
           <a:lstStyle/>
           <a:p>
             <a:r>
-              <a:rPr lang="it-IT" sz="3600" dirty="0" smtClean="0">
+              <a:rPr lang="it-IT" sz="3600" dirty="0">
                 <a:solidFill>
                   <a:srgbClr val="808080"/>
                 </a:solidFill>
@@ -41332,16 +40958,7 @@
                 </a:solidFill>
                 <a:latin typeface="Consolas" panose="020B0609020204030204" pitchFamily="49" charset="0"/>
               </a:rPr>
-              <a:t>o</a:t>
-            </a:r>
-            <a:r>
-              <a:rPr lang="it-IT" sz="3600" dirty="0" smtClean="0">
-                <a:solidFill>
-                  <a:srgbClr val="569CD6"/>
-                </a:solidFill>
-                <a:latin typeface="Consolas" panose="020B0609020204030204" pitchFamily="49" charset="0"/>
-              </a:rPr>
-              <a:t>l</a:t>
+              <a:t>ol</a:t>
             </a:r>
             <a:r>
               <a:rPr lang="it-IT" sz="3600" dirty="0">
@@ -41370,49 +40987,13 @@
               <a:t>    </a:t>
             </a:r>
             <a:r>
-              <a:rPr lang="it-IT" sz="3600" dirty="0" smtClean="0">
+              <a:rPr lang="it-IT" sz="3600" dirty="0">
                 <a:solidFill>
                   <a:srgbClr val="808080"/>
                 </a:solidFill>
                 <a:latin typeface="Consolas" panose="020B0609020204030204" pitchFamily="49" charset="0"/>
               </a:rPr>
               <a:t>&lt;</a:t>
-            </a:r>
-            <a:r>
-              <a:rPr lang="it-IT" sz="3600" dirty="0" smtClean="0">
-                <a:solidFill>
-                  <a:srgbClr val="569CD6"/>
-                </a:solidFill>
-                <a:latin typeface="Consolas" panose="020B0609020204030204" pitchFamily="49" charset="0"/>
-              </a:rPr>
-              <a:t>li</a:t>
-            </a:r>
-            <a:r>
-              <a:rPr lang="it-IT" sz="3600" dirty="0" smtClean="0">
-                <a:solidFill>
-                  <a:srgbClr val="808080"/>
-                </a:solidFill>
-                <a:latin typeface="Consolas" panose="020B0609020204030204" pitchFamily="49" charset="0"/>
-              </a:rPr>
-              <a:t>&gt;</a:t>
-            </a:r>
-            <a:r>
-              <a:rPr lang="it-IT" sz="3600" dirty="0" smtClean="0">
-                <a:solidFill>
-                  <a:srgbClr val="D4D4D4"/>
-                </a:solidFill>
-                <a:latin typeface="Consolas" panose="020B0609020204030204" pitchFamily="49" charset="0"/>
-              </a:rPr>
-              <a:t>Iron Man</a:t>
-            </a:r>
-            <a:r>
-              <a:rPr lang="it-IT" sz="3600" dirty="0" smtClean="0">
-                <a:solidFill>
-                  <a:srgbClr val="808080"/>
-                </a:solidFill>
-                <a:latin typeface="Consolas" panose="020B0609020204030204" pitchFamily="49" charset="0"/>
-              </a:rPr>
-              <a:t>&lt;/</a:t>
             </a:r>
             <a:r>
               <a:rPr lang="it-IT" sz="3600" dirty="0">
@@ -41432,6 +41013,42 @@
               </a:rPr>
               <a:t>&gt;</a:t>
             </a:r>
+            <a:r>
+              <a:rPr lang="it-IT" sz="3600" dirty="0">
+                <a:solidFill>
+                  <a:srgbClr val="D4D4D4"/>
+                </a:solidFill>
+                <a:latin typeface="Consolas" panose="020B0609020204030204" pitchFamily="49" charset="0"/>
+              </a:rPr>
+              <a:t>Iron Man</a:t>
+            </a:r>
+            <a:r>
+              <a:rPr lang="it-IT" sz="3600" dirty="0">
+                <a:solidFill>
+                  <a:srgbClr val="808080"/>
+                </a:solidFill>
+                <a:latin typeface="Consolas" panose="020B0609020204030204" pitchFamily="49" charset="0"/>
+              </a:rPr>
+              <a:t>&lt;/</a:t>
+            </a:r>
+            <a:r>
+              <a:rPr lang="it-IT" sz="3600" dirty="0">
+                <a:solidFill>
+                  <a:srgbClr val="569CD6"/>
+                </a:solidFill>
+                <a:latin typeface="Consolas" panose="020B0609020204030204" pitchFamily="49" charset="0"/>
+              </a:rPr>
+              <a:t>li</a:t>
+            </a:r>
+            <a:r>
+              <a:rPr lang="it-IT" sz="3600" dirty="0">
+                <a:solidFill>
+                  <a:srgbClr val="808080"/>
+                </a:solidFill>
+                <a:latin typeface="Consolas" panose="020B0609020204030204" pitchFamily="49" charset="0"/>
+              </a:rPr>
+              <a:t>&gt;</a:t>
+            </a:r>
             <a:endParaRPr lang="it-IT" sz="3600" dirty="0">
               <a:solidFill>
                 <a:srgbClr val="D4D4D4"/>
@@ -41459,42 +41076,6 @@
               <a:t>&lt;</a:t>
             </a:r>
             <a:r>
-              <a:rPr lang="it-IT" sz="3600" dirty="0" smtClean="0">
-                <a:solidFill>
-                  <a:srgbClr val="569CD6"/>
-                </a:solidFill>
-                <a:latin typeface="Consolas" panose="020B0609020204030204" pitchFamily="49" charset="0"/>
-              </a:rPr>
-              <a:t>li</a:t>
-            </a:r>
-            <a:r>
-              <a:rPr lang="it-IT" sz="3600" dirty="0" smtClean="0">
-                <a:solidFill>
-                  <a:srgbClr val="808080"/>
-                </a:solidFill>
-                <a:latin typeface="Consolas" panose="020B0609020204030204" pitchFamily="49" charset="0"/>
-              </a:rPr>
-              <a:t>&gt;</a:t>
-            </a:r>
-            <a:r>
-              <a:rPr lang="it-IT" sz="3600" dirty="0" smtClean="0">
-                <a:solidFill>
-                  <a:srgbClr val="D4D4D4"/>
-                </a:solidFill>
-                <a:latin typeface="Consolas" panose="020B0609020204030204" pitchFamily="49" charset="0"/>
-              </a:rPr>
-              <a:t>The Hulk</a:t>
-            </a:r>
-            <a:r>
-              <a:rPr lang="it-IT" sz="3600" dirty="0" smtClean="0">
-                <a:solidFill>
-                  <a:srgbClr val="808080"/>
-                </a:solidFill>
-                <a:latin typeface="Consolas" panose="020B0609020204030204" pitchFamily="49" charset="0"/>
-              </a:rPr>
-              <a:t>&lt;/</a:t>
-            </a:r>
-            <a:r>
               <a:rPr lang="it-IT" sz="3600" dirty="0">
                 <a:solidFill>
                   <a:srgbClr val="569CD6"/>
@@ -41512,6 +41093,42 @@
               </a:rPr>
               <a:t>&gt;</a:t>
             </a:r>
+            <a:r>
+              <a:rPr lang="it-IT" sz="3600" dirty="0">
+                <a:solidFill>
+                  <a:srgbClr val="D4D4D4"/>
+                </a:solidFill>
+                <a:latin typeface="Consolas" panose="020B0609020204030204" pitchFamily="49" charset="0"/>
+              </a:rPr>
+              <a:t>The Hulk</a:t>
+            </a:r>
+            <a:r>
+              <a:rPr lang="it-IT" sz="3600" dirty="0">
+                <a:solidFill>
+                  <a:srgbClr val="808080"/>
+                </a:solidFill>
+                <a:latin typeface="Consolas" panose="020B0609020204030204" pitchFamily="49" charset="0"/>
+              </a:rPr>
+              <a:t>&lt;/</a:t>
+            </a:r>
+            <a:r>
+              <a:rPr lang="it-IT" sz="3600" dirty="0">
+                <a:solidFill>
+                  <a:srgbClr val="569CD6"/>
+                </a:solidFill>
+                <a:latin typeface="Consolas" panose="020B0609020204030204" pitchFamily="49" charset="0"/>
+              </a:rPr>
+              <a:t>li</a:t>
+            </a:r>
+            <a:r>
+              <a:rPr lang="it-IT" sz="3600" dirty="0">
+                <a:solidFill>
+                  <a:srgbClr val="808080"/>
+                </a:solidFill>
+                <a:latin typeface="Consolas" panose="020B0609020204030204" pitchFamily="49" charset="0"/>
+              </a:rPr>
+              <a:t>&gt;</a:t>
+            </a:r>
             <a:endParaRPr lang="it-IT" sz="3600" dirty="0">
               <a:solidFill>
                 <a:srgbClr val="D4D4D4"/>
@@ -41521,7 +41138,7 @@
           </a:p>
           <a:p>
             <a:r>
-              <a:rPr lang="it-IT" sz="3600" dirty="0" smtClean="0">
+              <a:rPr lang="it-IT" sz="3600" dirty="0">
                 <a:solidFill>
                   <a:srgbClr val="808080"/>
                 </a:solidFill>
@@ -41530,7 +41147,7 @@
               <a:t>&lt;/</a:t>
             </a:r>
             <a:r>
-              <a:rPr lang="it-IT" sz="3600" dirty="0" smtClean="0">
+              <a:rPr lang="it-IT" sz="3600" dirty="0">
                 <a:solidFill>
                   <a:srgbClr val="569CD6"/>
                 </a:solidFill>
@@ -41539,7 +41156,7 @@
               <a:t>ol</a:t>
             </a:r>
             <a:r>
-              <a:rPr lang="it-IT" sz="3600" dirty="0" smtClean="0">
+              <a:rPr lang="it-IT" sz="3600" dirty="0">
                 <a:solidFill>
                   <a:srgbClr val="808080"/>
                 </a:solidFill>

</xml_diff>

<commit_message>
Update gitbook 2022-03-18 16:19:51
</commit_message>
<xml_diff>
--- a/Week03/MoreHtmlElements.pptx
+++ b/Week03/MoreHtmlElements.pptx
@@ -221,7 +221,7 @@
           <a:p>
             <a:fld id="{19104133-B5B0-4351-8158-4F0E5EB1E2BF}" type="datetimeFigureOut">
               <a:rPr lang="en-US" smtClean="0"/>
-              <a:t>3/20/2020</a:t>
+              <a:t>3/18/2022</a:t>
             </a:fld>
             <a:endParaRPr lang="en-US"/>
           </a:p>
@@ -285,38 +285,37 @@
           <a:p>
             <a:pPr lvl="0"/>
             <a:r>
-              <a:rPr lang="en-US" smtClean="0"/>
+              <a:rPr lang="en-US"/>
               <a:t>Edit Master text styles</a:t>
             </a:r>
           </a:p>
           <a:p>
             <a:pPr lvl="1"/>
             <a:r>
-              <a:rPr lang="en-US" smtClean="0"/>
+              <a:rPr lang="en-US"/>
               <a:t>Second level</a:t>
             </a:r>
           </a:p>
           <a:p>
             <a:pPr lvl="2"/>
             <a:r>
-              <a:rPr lang="en-US" smtClean="0"/>
+              <a:rPr lang="en-US"/>
               <a:t>Third level</a:t>
             </a:r>
           </a:p>
           <a:p>
             <a:pPr lvl="3"/>
             <a:r>
-              <a:rPr lang="en-US" smtClean="0"/>
+              <a:rPr lang="en-US"/>
               <a:t>Fourth level</a:t>
             </a:r>
           </a:p>
           <a:p>
             <a:pPr lvl="4"/>
             <a:r>
-              <a:rPr lang="en-US" smtClean="0"/>
+              <a:rPr lang="en-US"/>
               <a:t>Fifth level</a:t>
             </a:r>
-            <a:endParaRPr lang="en-US"/>
           </a:p>
         </p:txBody>
       </p:sp>
@@ -534,19 +533,19 @@
           <a:lstStyle/>
           <a:p>
             <a:r>
-              <a:rPr lang="en-US" dirty="0" smtClean="0"/>
+              <a:rPr lang="en-US" dirty="0"/>
               <a:t>Ask the students</a:t>
             </a:r>
             <a:r>
-              <a:rPr lang="en-US" baseline="0" dirty="0" smtClean="0"/>
+              <a:rPr lang="en-US" baseline="0" dirty="0"/>
               <a:t> what </a:t>
             </a:r>
             <a:r>
-              <a:rPr lang="en-US" b="1" baseline="0" dirty="0" err="1" smtClean="0"/>
+              <a:rPr lang="en-US" b="1" baseline="0" dirty="0" err="1"/>
               <a:t>href</a:t>
             </a:r>
             <a:r>
-              <a:rPr lang="en-US" baseline="0" dirty="0" smtClean="0"/>
+              <a:rPr lang="en-US" baseline="0" dirty="0"/>
               <a:t> does – it tells the link where to go when clicked!</a:t>
             </a:r>
             <a:endParaRPr lang="en-US" dirty="0"/>
@@ -634,19 +633,19 @@
           <a:lstStyle/>
           <a:p>
             <a:r>
-              <a:rPr lang="en-US" dirty="0" smtClean="0"/>
+              <a:rPr lang="en-US" dirty="0"/>
               <a:t>Visit the </a:t>
             </a:r>
             <a:r>
-              <a:rPr lang="en-US" dirty="0" err="1" smtClean="0"/>
+              <a:rPr lang="en-US" dirty="0" err="1"/>
               <a:t>Repl</a:t>
             </a:r>
             <a:r>
-              <a:rPr lang="en-US" dirty="0" smtClean="0"/>
+              <a:rPr lang="en-US" dirty="0"/>
               <a:t> to show inputs </a:t>
             </a:r>
             <a:r>
-              <a:rPr lang="en-US" smtClean="0"/>
+              <a:rPr lang="en-US"/>
               <a:t>in action</a:t>
             </a:r>
             <a:endParaRPr lang="en-US" dirty="0"/>
@@ -734,11 +733,11 @@
           <a:lstStyle/>
           <a:p>
             <a:r>
-              <a:rPr lang="en-US" dirty="0" smtClean="0"/>
+              <a:rPr lang="en-US" dirty="0"/>
               <a:t>Point out</a:t>
             </a:r>
             <a:r>
-              <a:rPr lang="en-US" baseline="0" dirty="0" smtClean="0"/>
+              <a:rPr lang="en-US" baseline="0" dirty="0"/>
               <a:t> each part of the attribute syntax</a:t>
             </a:r>
             <a:endParaRPr lang="en-US" dirty="0"/>
@@ -826,10 +825,9 @@
           <a:lstStyle/>
           <a:p>
             <a:r>
-              <a:rPr lang="en-US" dirty="0" smtClean="0"/>
+              <a:rPr lang="en-US" dirty="0"/>
               <a:t>Ask the students these questions</a:t>
             </a:r>
-            <a:endParaRPr lang="en-US" dirty="0"/>
           </a:p>
         </p:txBody>
       </p:sp>
@@ -914,39 +912,39 @@
           <a:lstStyle/>
           <a:p>
             <a:r>
-              <a:rPr lang="en-US" dirty="0" smtClean="0"/>
+              <a:rPr lang="en-US" dirty="0"/>
               <a:t>Visit the </a:t>
             </a:r>
             <a:r>
-              <a:rPr lang="en-US" dirty="0" err="1" smtClean="0"/>
+              <a:rPr lang="en-US" dirty="0" err="1"/>
               <a:t>Repl</a:t>
             </a:r>
             <a:r>
-              <a:rPr lang="en-US" dirty="0" smtClean="0"/>
+              <a:rPr lang="en-US" dirty="0"/>
               <a:t> to show attributes in action. Uncomment the commented lines of code to display</a:t>
             </a:r>
             <a:r>
-              <a:rPr lang="en-US" baseline="0" dirty="0" smtClean="0"/>
+              <a:rPr lang="en-US" baseline="0" dirty="0"/>
               <a:t> them. You should be able to use </a:t>
             </a:r>
             <a:r>
-              <a:rPr lang="en-US" b="1" baseline="0" dirty="0" smtClean="0"/>
+              <a:rPr lang="en-US" b="1" baseline="0" dirty="0"/>
               <a:t>Ctrl</a:t>
             </a:r>
             <a:r>
-              <a:rPr lang="en-US" baseline="0" dirty="0" smtClean="0"/>
+              <a:rPr lang="en-US" baseline="0" dirty="0"/>
               <a:t>+</a:t>
             </a:r>
             <a:r>
-              <a:rPr lang="en-US" b="1" baseline="0" dirty="0" smtClean="0"/>
+              <a:rPr lang="en-US" b="1" baseline="0" dirty="0"/>
               <a:t>/</a:t>
             </a:r>
             <a:r>
-              <a:rPr lang="en-US" baseline="0" dirty="0" smtClean="0"/>
+              <a:rPr lang="en-US" baseline="0" dirty="0"/>
               <a:t> to comment and uncomment code in </a:t>
             </a:r>
             <a:r>
-              <a:rPr lang="en-US" baseline="0" dirty="0" err="1" smtClean="0"/>
+              <a:rPr lang="en-US" baseline="0" dirty="0" err="1"/>
               <a:t>Repl</a:t>
             </a:r>
             <a:endParaRPr lang="en-US" dirty="0"/>
@@ -1038,11 +1036,11 @@
               <a:buChar char="-"/>
             </a:pPr>
             <a:r>
-              <a:rPr lang="en-US" dirty="0" smtClean="0"/>
+              <a:rPr lang="en-US" dirty="0"/>
               <a:t>The bullet points on this</a:t>
             </a:r>
             <a:r>
-              <a:rPr lang="en-US" baseline="0" dirty="0" smtClean="0"/>
+              <a:rPr lang="en-US" baseline="0" dirty="0"/>
               <a:t> slide are an unordered list!</a:t>
             </a:r>
           </a:p>
@@ -1052,7 +1050,7 @@
               <a:buChar char="-"/>
             </a:pPr>
             <a:r>
-              <a:rPr lang="en-US" baseline="0" dirty="0" smtClean="0"/>
+              <a:rPr lang="en-US" baseline="0" dirty="0"/>
               <a:t>An ordered list has numbers – for example, the MCU movies in release order</a:t>
             </a:r>
           </a:p>
@@ -1139,123 +1137,123 @@
           <a:lstStyle/>
           <a:p>
             <a:r>
-              <a:rPr lang="en-US" dirty="0" smtClean="0"/>
+              <a:rPr lang="en-US" dirty="0"/>
               <a:t>Explain nesting as a concept using geography.</a:t>
             </a:r>
           </a:p>
           <a:p>
-            <a:endParaRPr lang="en-US" dirty="0" smtClean="0"/>
-          </a:p>
-          <a:p>
-            <a:r>
-              <a:rPr lang="en-US" dirty="0" smtClean="0"/>
+            <a:endParaRPr lang="en-US" dirty="0"/>
+          </a:p>
+          <a:p>
+            <a:r>
+              <a:rPr lang="en-US" dirty="0"/>
               <a:t>Start</a:t>
             </a:r>
             <a:r>
-              <a:rPr lang="en-US" baseline="0" dirty="0" smtClean="0"/>
+              <a:rPr lang="en-US" baseline="0" dirty="0"/>
               <a:t> by writing the following on the whiteboard (leave a lot of space around the tags):</a:t>
             </a:r>
           </a:p>
           <a:p>
-            <a:endParaRPr lang="en-US" baseline="0" dirty="0" smtClean="0"/>
-          </a:p>
-          <a:p>
-            <a:r>
-              <a:rPr lang="en-US" b="1" baseline="0" dirty="0" smtClean="0"/>
+            <a:endParaRPr lang="en-US" baseline="0" dirty="0"/>
+          </a:p>
+          <a:p>
+            <a:r>
+              <a:rPr lang="en-US" b="1" baseline="0" dirty="0"/>
               <a:t>&lt;county name=“Cuyahoga”&gt;</a:t>
             </a:r>
           </a:p>
           <a:p>
-            <a:endParaRPr lang="en-US" b="1" baseline="0" dirty="0" smtClean="0"/>
-          </a:p>
-          <a:p>
-            <a:r>
-              <a:rPr lang="en-US" b="1" baseline="0" dirty="0" smtClean="0"/>
+            <a:endParaRPr lang="en-US" b="1" baseline="0" dirty="0"/>
+          </a:p>
+          <a:p>
+            <a:r>
+              <a:rPr lang="en-US" b="1" baseline="0" dirty="0"/>
               <a:t>&lt;/county&gt;</a:t>
             </a:r>
           </a:p>
           <a:p>
-            <a:endParaRPr lang="en-US" baseline="0" dirty="0" smtClean="0"/>
-          </a:p>
-          <a:p>
-            <a:r>
-              <a:rPr lang="en-US" b="0" baseline="0" dirty="0" smtClean="0"/>
+            <a:endParaRPr lang="en-US" baseline="0" dirty="0"/>
+          </a:p>
+          <a:p>
+            <a:r>
+              <a:rPr lang="en-US" b="0" baseline="0" dirty="0"/>
               <a:t>Ask what goes within a county – a city! Add that to the code:</a:t>
             </a:r>
           </a:p>
           <a:p>
-            <a:endParaRPr lang="en-US" b="0" baseline="0" dirty="0" smtClean="0"/>
-          </a:p>
-          <a:p>
-            <a:r>
-              <a:rPr lang="en-US" b="1" baseline="0" dirty="0" smtClean="0"/>
+            <a:endParaRPr lang="en-US" b="0" baseline="0" dirty="0"/>
+          </a:p>
+          <a:p>
+            <a:r>
+              <a:rPr lang="en-US" b="1" baseline="0" dirty="0"/>
               <a:t>&lt;county name=“Cuyahoga”&gt;</a:t>
             </a:r>
           </a:p>
           <a:p>
             <a:r>
-              <a:rPr lang="en-US" b="1" baseline="0" dirty="0" smtClean="0"/>
+              <a:rPr lang="en-US" b="1" baseline="0" dirty="0"/>
               <a:t>    &lt;city name=“Westlake”&gt;&lt;/city&gt;</a:t>
             </a:r>
           </a:p>
           <a:p>
             <a:r>
-              <a:rPr lang="en-US" b="1" baseline="0" dirty="0" smtClean="0"/>
+              <a:rPr lang="en-US" b="1" baseline="0" dirty="0"/>
               <a:t>&lt;/county&gt;</a:t>
             </a:r>
           </a:p>
           <a:p>
-            <a:endParaRPr lang="en-US" b="1" baseline="0" dirty="0" smtClean="0"/>
-          </a:p>
-          <a:p>
-            <a:r>
-              <a:rPr lang="en-US" b="0" baseline="0" dirty="0" smtClean="0"/>
+            <a:endParaRPr lang="en-US" b="1" baseline="0" dirty="0"/>
+          </a:p>
+          <a:p>
+            <a:r>
+              <a:rPr lang="en-US" b="0" baseline="0" dirty="0"/>
               <a:t>Ask what goes around a county – a state! Add that to the code:</a:t>
             </a:r>
           </a:p>
           <a:p>
-            <a:endParaRPr lang="en-US" b="0" baseline="0" dirty="0" smtClean="0"/>
-          </a:p>
-          <a:p>
-            <a:r>
-              <a:rPr lang="en-US" b="1" baseline="0" dirty="0" smtClean="0"/>
+            <a:endParaRPr lang="en-US" b="0" baseline="0" dirty="0"/>
+          </a:p>
+          <a:p>
+            <a:r>
+              <a:rPr lang="en-US" b="1" baseline="0" dirty="0"/>
               <a:t>&lt;state name=“Ohio”&gt;</a:t>
             </a:r>
           </a:p>
           <a:p>
             <a:r>
-              <a:rPr lang="en-US" b="1" baseline="0" dirty="0" smtClean="0"/>
+              <a:rPr lang="en-US" b="1" baseline="0" dirty="0"/>
               <a:t>    &lt;county name=“Cuyahoga”&gt;</a:t>
             </a:r>
           </a:p>
           <a:p>
             <a:r>
-              <a:rPr lang="en-US" b="1" baseline="0" dirty="0" smtClean="0"/>
+              <a:rPr lang="en-US" b="1" baseline="0" dirty="0"/>
               <a:t>        &lt;city name=“Westlake”&gt;&lt;/city&gt;</a:t>
             </a:r>
           </a:p>
           <a:p>
             <a:r>
-              <a:rPr lang="en-US" b="1" baseline="0" dirty="0" smtClean="0"/>
+              <a:rPr lang="en-US" b="1" baseline="0" dirty="0"/>
               <a:t>    &lt;/county&gt;</a:t>
             </a:r>
           </a:p>
           <a:p>
             <a:r>
-              <a:rPr lang="en-US" b="1" baseline="0" dirty="0" smtClean="0"/>
+              <a:rPr lang="en-US" b="1" baseline="0" dirty="0"/>
               <a:t>&lt;/state&gt;</a:t>
             </a:r>
-            <a:endParaRPr lang="en-US" b="0" baseline="0" dirty="0" smtClean="0"/>
-          </a:p>
-          <a:p>
-            <a:endParaRPr lang="en-US" b="0" baseline="0" dirty="0" smtClean="0"/>
-          </a:p>
-          <a:p>
-            <a:r>
-              <a:rPr lang="en-US" b="0" baseline="0" dirty="0" smtClean="0"/>
+            <a:endParaRPr lang="en-US" b="0" baseline="0" dirty="0"/>
+          </a:p>
+          <a:p>
+            <a:endParaRPr lang="en-US" b="0" baseline="0" dirty="0"/>
+          </a:p>
+          <a:p>
+            <a:r>
+              <a:rPr lang="en-US" b="0" baseline="0" dirty="0"/>
               <a:t>Use this concept to explain nesting. Explain parent/child relationships. The next slide has an example using lists.</a:t>
             </a:r>
-            <a:endParaRPr lang="en-US" b="1" baseline="0" dirty="0" smtClean="0"/>
+            <a:endParaRPr lang="en-US" b="1" baseline="0" dirty="0"/>
           </a:p>
         </p:txBody>
       </p:sp>
@@ -1340,15 +1338,15 @@
           <a:lstStyle/>
           <a:p>
             <a:r>
-              <a:rPr lang="en-US" dirty="0" smtClean="0"/>
+              <a:rPr lang="en-US" dirty="0"/>
               <a:t>Visit the </a:t>
             </a:r>
             <a:r>
-              <a:rPr lang="en-US" dirty="0" err="1" smtClean="0"/>
+              <a:rPr lang="en-US" dirty="0" err="1"/>
               <a:t>Repl</a:t>
             </a:r>
             <a:r>
-              <a:rPr lang="en-US" dirty="0" smtClean="0"/>
+              <a:rPr lang="en-US" dirty="0"/>
               <a:t> to show lists in action.</a:t>
             </a:r>
           </a:p>
@@ -1358,7 +1356,7 @@
               <a:buChar char="-"/>
             </a:pPr>
             <a:r>
-              <a:rPr lang="en-US" dirty="0" smtClean="0"/>
+              <a:rPr lang="en-US" dirty="0"/>
               <a:t>Here we really want to emphasize the hierarchical structure of HTML</a:t>
             </a:r>
           </a:p>
@@ -1368,26 +1366,17 @@
               <a:buChar char="-"/>
             </a:pPr>
             <a:r>
-              <a:rPr lang="en-US" dirty="0" smtClean="0"/>
-              <a:t>Also show switching from &lt;</a:t>
-            </a:r>
-            <a:r>
-              <a:rPr lang="en-US" dirty="0" err="1" smtClean="0"/>
-              <a:t>ul</a:t>
-            </a:r>
-            <a:r>
-              <a:rPr lang="en-US" dirty="0" smtClean="0"/>
-              <a:t>&gt; to &lt;</a:t>
-            </a:r>
-            <a:r>
-              <a:rPr lang="en-US" dirty="0" err="1" smtClean="0"/>
+              <a:rPr lang="en-US" dirty="0"/>
+              <a:t>Also show the difference between </a:t>
+            </a:r>
+            <a:r>
+              <a:rPr lang="en-US" dirty="0" err="1"/>
               <a:t>ol</a:t>
             </a:r>
             <a:r>
-              <a:rPr lang="en-US" dirty="0" smtClean="0"/>
-              <a:t>&gt;</a:t>
-            </a:r>
-            <a:endParaRPr lang="en-US" dirty="0"/>
+              <a:rPr lang="en-US" dirty="0"/>
+              <a:t> and ul</a:t>
+            </a:r>
           </a:p>
         </p:txBody>
       </p:sp>
@@ -1476,11 +1465,11 @@
               <a:buChar char="-"/>
             </a:pPr>
             <a:r>
-              <a:rPr lang="en-US" dirty="0" smtClean="0"/>
+              <a:rPr lang="en-US" dirty="0"/>
               <a:t>Ask the students to</a:t>
             </a:r>
             <a:r>
-              <a:rPr lang="en-US" baseline="0" dirty="0" smtClean="0"/>
+              <a:rPr lang="en-US" baseline="0" dirty="0"/>
               <a:t> guess how each of these input types might appear</a:t>
             </a:r>
           </a:p>
@@ -1570,7 +1559,7 @@
               <a:buFontTx/>
               <a:buNone/>
             </a:pPr>
-            <a:endParaRPr lang="en-US" baseline="0" dirty="0" smtClean="0"/>
+            <a:endParaRPr lang="en-US" baseline="0" dirty="0"/>
           </a:p>
         </p:txBody>
       </p:sp>
@@ -1750,15 +1739,7 @@
           <a:p>
             <a:r>
               <a:rPr lang="en-US" dirty="0"/>
-              <a:t>Click to edit Master </a:t>
-            </a:r>
-            <a:r>
-              <a:rPr lang="en-US" dirty="0" smtClean="0"/>
-              <a:t>subtitle </a:t>
-            </a:r>
-            <a:r>
-              <a:rPr lang="en-US" dirty="0"/>
-              <a:t>style</a:t>
+              <a:t>Click to edit Master subtitle style</a:t>
             </a:r>
           </a:p>
         </p:txBody>
@@ -1800,7 +1781,7 @@
             <a:fld id="{1C2D31DE-C454-491C-B5C3-F097855E3DF7}" type="datetime4">
               <a:rPr lang="en-US" smtClean="0"/>
               <a:pPr/>
-              <a:t>March 20, 2020</a:t>
+              <a:t>March 18, 2022</a:t>
             </a:fld>
             <a:endParaRPr lang="en-US" dirty="0"/>
           </a:p>
@@ -4874,17 +4855,16 @@
           <a:p>
             <a:pPr lvl="0"/>
             <a:r>
-              <a:rPr lang="en-US" dirty="0" smtClean="0"/>
+              <a:rPr lang="en-US" dirty="0"/>
               <a:t>Presenter Name</a:t>
             </a:r>
             <a:br>
-              <a:rPr lang="en-US" dirty="0" smtClean="0"/>
+              <a:rPr lang="en-US" dirty="0"/>
             </a:br>
             <a:r>
-              <a:rPr lang="en-US" dirty="0" smtClean="0"/>
+              <a:rPr lang="en-US" dirty="0"/>
               <a:t>Presenter Title</a:t>
             </a:r>
-            <a:endParaRPr lang="en-US" dirty="0"/>
           </a:p>
         </p:txBody>
       </p:sp>
@@ -4901,13 +4881,6 @@
   <p:transition>
     <p:fade/>
   </p:transition>
-  <p:timing>
-    <p:tnLst>
-      <p:par>
-        <p:cTn id="1" dur="indefinite" restart="never" nodeType="tmRoot"/>
-      </p:par>
-    </p:tnLst>
-  </p:timing>
   <p:hf sldNum="0" hdr="0" ftr="0"/>
 </p:sldLayout>
 </file>
@@ -5200,7 +5173,7 @@
           <a:p>
             <a:fld id="{5958763E-B898-436D-883D-03711491D54A}" type="datetimeFigureOut">
               <a:rPr lang="en-US" smtClean="0"/>
-              <a:t>3/20/2020</a:t>
+              <a:t>3/18/2022</a:t>
             </a:fld>
             <a:endParaRPr lang="en-US"/>
           </a:p>
@@ -5273,13 +5246,6 @@
   <p:transition>
     <p:fade/>
   </p:transition>
-  <p:timing>
-    <p:tnLst>
-      <p:par>
-        <p:cTn id="1" dur="indefinite" restart="never" nodeType="tmRoot"/>
-      </p:par>
-    </p:tnLst>
-  </p:timing>
 </p:sldLayout>
 </file>
 
@@ -5328,10 +5294,9 @@
           </a:lstStyle>
           <a:p>
             <a:r>
-              <a:rPr lang="en-US" dirty="0" smtClean="0"/>
+              <a:rPr lang="en-US" dirty="0"/>
               <a:t>Click icon to add picture</a:t>
             </a:r>
-            <a:endParaRPr lang="en-US" dirty="0"/>
           </a:p>
         </p:txBody>
       </p:sp>
@@ -5401,7 +5366,7 @@
           <a:p>
             <a:fld id="{5958763E-B898-436D-883D-03711491D54A}" type="datetimeFigureOut">
               <a:rPr lang="en-US" smtClean="0"/>
-              <a:t>3/20/2020</a:t>
+              <a:t>3/18/2022</a:t>
             </a:fld>
             <a:endParaRPr lang="en-US"/>
           </a:p>
@@ -5474,13 +5439,6 @@
   <p:transition>
     <p:fade/>
   </p:transition>
-  <p:timing>
-    <p:tnLst>
-      <p:par>
-        <p:cTn id="1" dur="indefinite" restart="never" nodeType="tmRoot"/>
-      </p:par>
-    </p:tnLst>
-  </p:timing>
 </p:sldLayout>
 </file>
 
@@ -5658,7 +5616,7 @@
           <a:p>
             <a:fld id="{5958763E-B898-436D-883D-03711491D54A}" type="datetimeFigureOut">
               <a:rPr lang="en-US" smtClean="0"/>
-              <a:t>3/20/2020</a:t>
+              <a:t>3/18/2022</a:t>
             </a:fld>
             <a:endParaRPr lang="en-US"/>
           </a:p>
@@ -5731,13 +5689,6 @@
   <p:transition>
     <p:fade/>
   </p:transition>
-  <p:timing>
-    <p:tnLst>
-      <p:par>
-        <p:cTn id="1" dur="indefinite" restart="never" nodeType="tmRoot"/>
-      </p:par>
-    </p:tnLst>
-  </p:timing>
 </p:sldLayout>
 </file>
 
@@ -6013,7 +5964,7 @@
           <a:p>
             <a:fld id="{5958763E-B898-436D-883D-03711491D54A}" type="datetimeFigureOut">
               <a:rPr lang="en-US" smtClean="0"/>
-              <a:t>3/20/2020</a:t>
+              <a:t>3/18/2022</a:t>
             </a:fld>
             <a:endParaRPr lang="en-US"/>
           </a:p>
@@ -6074,13 +6025,6 @@
   <p:transition>
     <p:fade/>
   </p:transition>
-  <p:timing>
-    <p:tnLst>
-      <p:par>
-        <p:cTn id="1" dur="indefinite" restart="never" nodeType="tmRoot"/>
-      </p:par>
-    </p:tnLst>
-  </p:timing>
 </p:sldLayout>
 </file>
 
@@ -6436,7 +6380,7 @@
           <a:p>
             <a:fld id="{5958763E-B898-436D-883D-03711491D54A}" type="datetimeFigureOut">
               <a:rPr lang="en-US" smtClean="0"/>
-              <a:t>3/20/2020</a:t>
+              <a:t>3/18/2022</a:t>
             </a:fld>
             <a:endParaRPr lang="en-US"/>
           </a:p>
@@ -6497,13 +6441,6 @@
   <p:transition>
     <p:fade/>
   </p:transition>
-  <p:timing>
-    <p:tnLst>
-      <p:par>
-        <p:cTn id="1" dur="indefinite" restart="never" nodeType="tmRoot"/>
-      </p:par>
-    </p:tnLst>
-  </p:timing>
 </p:sldLayout>
 </file>
 
@@ -6944,7 +6881,7 @@
           <a:p>
             <a:fld id="{5958763E-B898-436D-883D-03711491D54A}" type="datetimeFigureOut">
               <a:rPr lang="en-US" smtClean="0"/>
-              <a:t>3/20/2020</a:t>
+              <a:t>3/18/2022</a:t>
             </a:fld>
             <a:endParaRPr lang="en-US"/>
           </a:p>
@@ -7005,13 +6942,6 @@
   <p:transition>
     <p:fade/>
   </p:transition>
-  <p:timing>
-    <p:tnLst>
-      <p:par>
-        <p:cTn id="1" dur="indefinite" restart="never" nodeType="tmRoot"/>
-      </p:par>
-    </p:tnLst>
-  </p:timing>
 </p:sldLayout>
 </file>
 
@@ -7402,7 +7332,7 @@
           <a:p>
             <a:fld id="{5958763E-B898-436D-883D-03711491D54A}" type="datetimeFigureOut">
               <a:rPr lang="en-US" smtClean="0"/>
-              <a:t>3/20/2020</a:t>
+              <a:t>3/18/2022</a:t>
             </a:fld>
             <a:endParaRPr lang="en-US"/>
           </a:p>
@@ -7463,13 +7393,6 @@
   <p:transition>
     <p:fade/>
   </p:transition>
-  <p:timing>
-    <p:tnLst>
-      <p:par>
-        <p:cTn id="1" dur="indefinite" restart="never" nodeType="tmRoot"/>
-      </p:par>
-    </p:tnLst>
-  </p:timing>
 </p:sldLayout>
 </file>
 
@@ -8020,7 +7943,7 @@
           <a:p>
             <a:fld id="{5958763E-B898-436D-883D-03711491D54A}" type="datetimeFigureOut">
               <a:rPr lang="en-US" smtClean="0"/>
-              <a:t>3/20/2020</a:t>
+              <a:t>3/18/2022</a:t>
             </a:fld>
             <a:endParaRPr lang="en-US"/>
           </a:p>
@@ -8081,13 +8004,6 @@
   <p:transition>
     <p:fade/>
   </p:transition>
-  <p:timing>
-    <p:tnLst>
-      <p:par>
-        <p:cTn id="1" dur="indefinite" restart="never" nodeType="tmRoot"/>
-      </p:par>
-    </p:tnLst>
-  </p:timing>
 </p:sldLayout>
 </file>
 
@@ -8798,7 +8714,7 @@
           <a:p>
             <a:fld id="{5958763E-B898-436D-883D-03711491D54A}" type="datetimeFigureOut">
               <a:rPr lang="en-US" smtClean="0"/>
-              <a:t>3/20/2020</a:t>
+              <a:t>3/18/2022</a:t>
             </a:fld>
             <a:endParaRPr lang="en-US"/>
           </a:p>
@@ -8859,13 +8775,6 @@
   <p:transition>
     <p:fade/>
   </p:transition>
-  <p:timing>
-    <p:tnLst>
-      <p:par>
-        <p:cTn id="1" dur="indefinite" restart="never" nodeType="tmRoot"/>
-      </p:par>
-    </p:tnLst>
-  </p:timing>
 </p:sldLayout>
 </file>
 
@@ -8909,7 +8818,7 @@
           <a:p>
             <a:fld id="{5958763E-B898-436D-883D-03711491D54A}" type="datetimeFigureOut">
               <a:rPr lang="en-US" smtClean="0"/>
-              <a:t>3/20/2020</a:t>
+              <a:t>3/18/2022</a:t>
             </a:fld>
             <a:endParaRPr lang="en-US"/>
           </a:p>
@@ -8982,13 +8891,6 @@
   <p:transition>
     <p:fade/>
   </p:transition>
-  <p:timing>
-    <p:tnLst>
-      <p:par>
-        <p:cTn id="1" dur="indefinite" restart="never" nodeType="tmRoot"/>
-      </p:par>
-    </p:tnLst>
-  </p:timing>
 </p:sldLayout>
 </file>
 
@@ -9068,7 +8970,7 @@
                 <a:spcPct val="0"/>
               </a:spcAft>
             </a:pPr>
-            <a:endParaRPr lang="en-US" sz="2400" dirty="0" err="1" smtClean="0">
+            <a:endParaRPr lang="en-US" sz="2400" dirty="0" err="1">
               <a:gradFill>
                 <a:gsLst>
                   <a:gs pos="0">
@@ -9201,15 +9103,7 @@
           <a:p>
             <a:r>
               <a:rPr lang="en-US" dirty="0"/>
-              <a:t>Click to edit Master </a:t>
-            </a:r>
-            <a:r>
-              <a:rPr lang="en-US" dirty="0" smtClean="0"/>
-              <a:t>subtitle </a:t>
-            </a:r>
-            <a:r>
-              <a:rPr lang="en-US" dirty="0"/>
-              <a:t>style</a:t>
+              <a:t>Click to edit Master subtitle style</a:t>
             </a:r>
           </a:p>
         </p:txBody>
@@ -9251,7 +9145,7 @@
             <a:fld id="{1C2D31DE-C454-491C-B5C3-F097855E3DF7}" type="datetime4">
               <a:rPr lang="en-US" smtClean="0"/>
               <a:pPr/>
-              <a:t>March 20, 2020</a:t>
+              <a:t>March 18, 2022</a:t>
             </a:fld>
             <a:endParaRPr lang="en-US" dirty="0"/>
           </a:p>
@@ -12325,17 +12219,16 @@
           <a:p>
             <a:pPr lvl="0"/>
             <a:r>
-              <a:rPr lang="en-US" dirty="0" smtClean="0"/>
+              <a:rPr lang="en-US" dirty="0"/>
               <a:t>Presenter Name</a:t>
             </a:r>
             <a:br>
-              <a:rPr lang="en-US" dirty="0" smtClean="0"/>
+              <a:rPr lang="en-US" dirty="0"/>
             </a:br>
             <a:r>
-              <a:rPr lang="en-US" dirty="0" smtClean="0"/>
+              <a:rPr lang="en-US" dirty="0"/>
               <a:t>Presenter Title</a:t>
             </a:r>
-            <a:endParaRPr lang="en-US" dirty="0"/>
           </a:p>
         </p:txBody>
       </p:sp>
@@ -12352,13 +12245,6 @@
   <p:transition>
     <p:fade/>
   </p:transition>
-  <p:timing>
-    <p:tnLst>
-      <p:par>
-        <p:cTn id="1" dur="indefinite" restart="never" nodeType="tmRoot"/>
-      </p:par>
-    </p:tnLst>
-  </p:timing>
   <p:hf sldNum="0" hdr="0" ftr="0"/>
 </p:sldLayout>
 </file>
@@ -12411,7 +12297,7 @@
           <a:p>
             <a:fld id="{5958763E-B898-436D-883D-03711491D54A}" type="datetimeFigureOut">
               <a:rPr lang="en-US" smtClean="0"/>
-              <a:t>3/20/2020</a:t>
+              <a:t>3/18/2022</a:t>
             </a:fld>
             <a:endParaRPr lang="en-US"/>
           </a:p>
@@ -12484,13 +12370,6 @@
   <p:transition>
     <p:fade/>
   </p:transition>
-  <p:timing>
-    <p:tnLst>
-      <p:par>
-        <p:cTn id="1" dur="indefinite" restart="never" nodeType="tmRoot"/>
-      </p:par>
-    </p:tnLst>
-  </p:timing>
 </p:sldLayout>
 </file>
 
@@ -12542,7 +12421,7 @@
           <a:p>
             <a:fld id="{5958763E-B898-436D-883D-03711491D54A}" type="datetimeFigureOut">
               <a:rPr lang="en-US" smtClean="0"/>
-              <a:t>3/20/2020</a:t>
+              <a:t>3/18/2022</a:t>
             </a:fld>
             <a:endParaRPr lang="en-US"/>
           </a:p>
@@ -12615,13 +12494,6 @@
   <p:transition>
     <p:fade/>
   </p:transition>
-  <p:timing>
-    <p:tnLst>
-      <p:par>
-        <p:cTn id="1" dur="indefinite" restart="never" nodeType="tmRoot"/>
-      </p:par>
-    </p:tnLst>
-  </p:timing>
 </p:sldLayout>
 </file>
 
@@ -12673,7 +12545,7 @@
           <a:p>
             <a:fld id="{5958763E-B898-436D-883D-03711491D54A}" type="datetimeFigureOut">
               <a:rPr lang="en-US" smtClean="0"/>
-              <a:t>3/20/2020</a:t>
+              <a:t>3/18/2022</a:t>
             </a:fld>
             <a:endParaRPr lang="en-US"/>
           </a:p>
@@ -12746,13 +12618,6 @@
   <p:transition>
     <p:fade/>
   </p:transition>
-  <p:timing>
-    <p:tnLst>
-      <p:par>
-        <p:cTn id="1" dur="indefinite" restart="never" nodeType="tmRoot"/>
-      </p:par>
-    </p:tnLst>
-  </p:timing>
 </p:sldLayout>
 </file>
 
@@ -12804,7 +12669,7 @@
           <a:p>
             <a:fld id="{5958763E-B898-436D-883D-03711491D54A}" type="datetimeFigureOut">
               <a:rPr lang="en-US" smtClean="0"/>
-              <a:t>3/20/2020</a:t>
+              <a:t>3/18/2022</a:t>
             </a:fld>
             <a:endParaRPr lang="en-US"/>
           </a:p>
@@ -12877,13 +12742,6 @@
   <p:transition>
     <p:fade/>
   </p:transition>
-  <p:timing>
-    <p:tnLst>
-      <p:par>
-        <p:cTn id="1" dur="indefinite" restart="never" nodeType="tmRoot"/>
-      </p:par>
-    </p:tnLst>
-  </p:timing>
 </p:sldLayout>
 </file>
 
@@ -12935,7 +12793,7 @@
           <a:p>
             <a:fld id="{5958763E-B898-436D-883D-03711491D54A}" type="datetimeFigureOut">
               <a:rPr lang="en-US" smtClean="0"/>
-              <a:t>3/20/2020</a:t>
+              <a:t>3/18/2022</a:t>
             </a:fld>
             <a:endParaRPr lang="en-US"/>
           </a:p>
@@ -13008,13 +12866,6 @@
   <p:transition>
     <p:fade/>
   </p:transition>
-  <p:timing>
-    <p:tnLst>
-      <p:par>
-        <p:cTn id="1" dur="indefinite" restart="never" nodeType="tmRoot"/>
-      </p:par>
-    </p:tnLst>
-  </p:timing>
 </p:sldLayout>
 </file>
 
@@ -13066,7 +12917,7 @@
           <a:p>
             <a:fld id="{5958763E-B898-436D-883D-03711491D54A}" type="datetimeFigureOut">
               <a:rPr lang="en-US" smtClean="0"/>
-              <a:t>3/20/2020</a:t>
+              <a:t>3/18/2022</a:t>
             </a:fld>
             <a:endParaRPr lang="en-US"/>
           </a:p>
@@ -13139,13 +12990,6 @@
   <p:transition>
     <p:fade/>
   </p:transition>
-  <p:timing>
-    <p:tnLst>
-      <p:par>
-        <p:cTn id="1" dur="indefinite" restart="never" nodeType="tmRoot"/>
-      </p:par>
-    </p:tnLst>
-  </p:timing>
 </p:sldLayout>
 </file>
 
@@ -13197,7 +13041,7 @@
           <a:p>
             <a:fld id="{5958763E-B898-436D-883D-03711491D54A}" type="datetimeFigureOut">
               <a:rPr lang="en-US" smtClean="0"/>
-              <a:t>3/20/2020</a:t>
+              <a:t>3/18/2022</a:t>
             </a:fld>
             <a:endParaRPr lang="en-US"/>
           </a:p>
@@ -13270,13 +13114,6 @@
   <p:transition>
     <p:fade/>
   </p:transition>
-  <p:timing>
-    <p:tnLst>
-      <p:par>
-        <p:cTn id="1" dur="indefinite" restart="never" nodeType="tmRoot"/>
-      </p:par>
-    </p:tnLst>
-  </p:timing>
 </p:sldLayout>
 </file>
 
@@ -13328,7 +13165,7 @@
           <a:p>
             <a:fld id="{5958763E-B898-436D-883D-03711491D54A}" type="datetimeFigureOut">
               <a:rPr lang="en-US" smtClean="0"/>
-              <a:t>3/20/2020</a:t>
+              <a:t>3/18/2022</a:t>
             </a:fld>
             <a:endParaRPr lang="en-US"/>
           </a:p>
@@ -13401,13 +13238,6 @@
   <p:transition>
     <p:fade/>
   </p:transition>
-  <p:timing>
-    <p:tnLst>
-      <p:par>
-        <p:cTn id="1" dur="indefinite" restart="never" nodeType="tmRoot"/>
-      </p:par>
-    </p:tnLst>
-  </p:timing>
 </p:sldLayout>
 </file>
 
@@ -13468,7 +13298,7 @@
           <a:p>
             <a:fld id="{5958763E-B898-436D-883D-03711491D54A}" type="datetimeFigureOut">
               <a:rPr lang="en-US" smtClean="0"/>
-              <a:t>3/20/2020</a:t>
+              <a:t>3/18/2022</a:t>
             </a:fld>
             <a:endParaRPr lang="en-US"/>
           </a:p>
@@ -13541,13 +13371,6 @@
   <p:transition>
     <p:fade/>
   </p:transition>
-  <p:timing>
-    <p:tnLst>
-      <p:par>
-        <p:cTn id="1" dur="indefinite" restart="never" nodeType="tmRoot"/>
-      </p:par>
-    </p:tnLst>
-  </p:timing>
 </p:sldLayout>
 </file>
 
@@ -16549,13 +16372,6 @@
   <p:transition>
     <p:fade/>
   </p:transition>
-  <p:timing>
-    <p:tnLst>
-      <p:par>
-        <p:cTn id="1" dur="indefinite" restart="never" nodeType="tmRoot"/>
-      </p:par>
-    </p:tnLst>
-  </p:timing>
 </p:sldLayout>
 </file>
 
@@ -16643,7 +16459,7 @@
                 <a:spcPct val="0"/>
               </a:spcAft>
             </a:pPr>
-            <a:endParaRPr lang="en-US" sz="2400" dirty="0" err="1" smtClean="0">
+            <a:endParaRPr lang="en-US" sz="2400" dirty="0" err="1">
               <a:gradFill>
                 <a:gsLst>
                   <a:gs pos="0">
@@ -16779,15 +16595,7 @@
           <a:p>
             <a:r>
               <a:rPr lang="en-US" dirty="0"/>
-              <a:t>Click to edit Master </a:t>
-            </a:r>
-            <a:r>
-              <a:rPr lang="en-US" dirty="0" smtClean="0"/>
-              <a:t>subtitle </a:t>
-            </a:r>
-            <a:r>
-              <a:rPr lang="en-US" dirty="0"/>
-              <a:t>style</a:t>
+              <a:t>Click to edit Master subtitle style</a:t>
             </a:r>
           </a:p>
         </p:txBody>
@@ -16829,7 +16637,7 @@
             <a:fld id="{1C2D31DE-C454-491C-B5C3-F097855E3DF7}" type="datetime4">
               <a:rPr lang="en-US" smtClean="0"/>
               <a:pPr/>
-              <a:t>March 20, 2020</a:t>
+              <a:t>March 18, 2022</a:t>
             </a:fld>
             <a:endParaRPr lang="en-US" dirty="0"/>
           </a:p>
@@ -19911,17 +19719,16 @@
           <a:p>
             <a:pPr lvl="0"/>
             <a:r>
-              <a:rPr lang="en-US" dirty="0" smtClean="0"/>
+              <a:rPr lang="en-US" dirty="0"/>
               <a:t>Presenter Name</a:t>
             </a:r>
             <a:br>
-              <a:rPr lang="en-US" dirty="0" smtClean="0"/>
+              <a:rPr lang="en-US" dirty="0"/>
             </a:br>
             <a:r>
-              <a:rPr lang="en-US" dirty="0" smtClean="0"/>
+              <a:rPr lang="en-US" dirty="0"/>
               <a:t>Presenter Title</a:t>
             </a:r>
-            <a:endParaRPr lang="en-US" dirty="0"/>
           </a:p>
         </p:txBody>
       </p:sp>
@@ -19938,13 +19745,6 @@
   <p:transition>
     <p:fade/>
   </p:transition>
-  <p:timing>
-    <p:tnLst>
-      <p:par>
-        <p:cTn id="1" dur="indefinite" restart="never" nodeType="tmRoot"/>
-      </p:par>
-    </p:tnLst>
-  </p:timing>
   <p:hf sldNum="0" hdr="0" ftr="0"/>
 </p:sldLayout>
 </file>
@@ -27454,10 +27254,9 @@
           <a:p>
             <a:pPr lvl="0"/>
             <a:r>
-              <a:rPr lang="en-US" dirty="0" smtClean="0"/>
+              <a:rPr lang="en-US" dirty="0"/>
               <a:t>&lt;Call to action&gt;</a:t>
             </a:r>
-            <a:endParaRPr lang="en-US" dirty="0"/>
           </a:p>
         </p:txBody>
       </p:sp>
@@ -29074,7 +28873,7 @@
           <a:p>
             <a:fld id="{5958763E-B898-436D-883D-03711491D54A}" type="datetimeFigureOut">
               <a:rPr lang="en-US" smtClean="0"/>
-              <a:t>3/20/2020</a:t>
+              <a:t>3/18/2022</a:t>
             </a:fld>
             <a:endParaRPr lang="en-US"/>
           </a:p>
@@ -29201,7 +29000,7 @@
                 <a:spcPct val="0"/>
               </a:spcAft>
             </a:pPr>
-            <a:endParaRPr lang="en-US" sz="2400" dirty="0" err="1" smtClean="0">
+            <a:endParaRPr lang="en-US" sz="2400" dirty="0" err="1">
               <a:gradFill>
                 <a:gsLst>
                   <a:gs pos="0">
@@ -29232,13 +29031,6 @@
   <p:transition>
     <p:fade/>
   </p:transition>
-  <p:timing>
-    <p:tnLst>
-      <p:par>
-        <p:cTn id="1" dur="indefinite" restart="never" nodeType="tmRoot"/>
-      </p:par>
-    </p:tnLst>
-  </p:timing>
 </p:sldLayout>
 </file>
 
@@ -29483,7 +29275,7 @@
           <a:p>
             <a:fld id="{5958763E-B898-436D-883D-03711491D54A}" type="datetimeFigureOut">
               <a:rPr lang="en-US" smtClean="0"/>
-              <a:t>3/20/2020</a:t>
+              <a:t>3/18/2022</a:t>
             </a:fld>
             <a:endParaRPr lang="en-US"/>
           </a:p>
@@ -29556,13 +29348,6 @@
   <p:transition>
     <p:fade/>
   </p:transition>
-  <p:timing>
-    <p:tnLst>
-      <p:par>
-        <p:cTn id="1" dur="indefinite" restart="never" nodeType="tmRoot"/>
-      </p:par>
-    </p:tnLst>
-  </p:timing>
 </p:sldLayout>
 </file>
 
@@ -29784,7 +29569,7 @@
           <a:p>
             <a:fld id="{5958763E-B898-436D-883D-03711491D54A}" type="datetimeFigureOut">
               <a:rPr lang="en-US" smtClean="0"/>
-              <a:t>3/20/2020</a:t>
+              <a:t>3/18/2022</a:t>
             </a:fld>
             <a:endParaRPr lang="en-US"/>
           </a:p>
@@ -29857,13 +29642,6 @@
   <p:transition>
     <p:fade/>
   </p:transition>
-  <p:timing>
-    <p:tnLst>
-      <p:par>
-        <p:cTn id="1" dur="indefinite" restart="never" nodeType="tmRoot"/>
-      </p:par>
-    </p:tnLst>
-  </p:timing>
 </p:sldLayout>
 </file>
 
@@ -29992,7 +29770,7 @@
           <a:p>
             <a:fld id="{5958763E-B898-436D-883D-03711491D54A}" type="datetimeFigureOut">
               <a:rPr lang="en-US" smtClean="0"/>
-              <a:t>3/20/2020</a:t>
+              <a:t>3/18/2022</a:t>
             </a:fld>
             <a:endParaRPr lang="en-US"/>
           </a:p>
@@ -30115,13 +29893,6 @@
   <p:transition>
     <p:fade/>
   </p:transition>
-  <p:timing>
-    <p:tnLst>
-      <p:par>
-        <p:cTn id="1" dur="indefinite" restart="never" nodeType="tmRoot"/>
-      </p:par>
-    </p:tnLst>
-  </p:timing>
 </p:sldLayout>
 </file>
 
@@ -30260,7 +30031,7 @@
           <a:p>
             <a:fld id="{5958763E-B898-436D-883D-03711491D54A}" type="datetimeFigureOut">
               <a:rPr lang="en-US" smtClean="0"/>
-              <a:t>3/20/2020</a:t>
+              <a:t>3/18/2022</a:t>
             </a:fld>
             <a:endParaRPr lang="en-US"/>
           </a:p>
@@ -30387,13 +30158,6 @@
   <p:transition>
     <p:fade/>
   </p:transition>
-  <p:timing>
-    <p:tnLst>
-      <p:par>
-        <p:cTn id="1" dur="indefinite" restart="never" nodeType="tmRoot"/>
-      </p:par>
-    </p:tnLst>
-  </p:timing>
 </p:sldLayout>
 </file>
 
@@ -30555,7 +30319,7 @@
                 <a:spcPct val="0"/>
               </a:spcAft>
             </a:pPr>
-            <a:endParaRPr lang="en-US" sz="2400" dirty="0" err="1" smtClean="0">
+            <a:endParaRPr lang="en-US" sz="2400" dirty="0" err="1">
               <a:gradFill>
                 <a:gsLst>
                   <a:gs pos="0">
@@ -30606,10 +30370,9 @@
           </a:lstStyle>
           <a:p>
             <a:r>
-              <a:rPr lang="en-US" dirty="0" smtClean="0"/>
+              <a:rPr lang="en-US" dirty="0"/>
               <a:t>Type “Agenda”</a:t>
             </a:r>
-            <a:endParaRPr lang="en-US" dirty="0"/>
           </a:p>
         </p:txBody>
       </p:sp>
@@ -30733,24 +30496,23 @@
           <a:p>
             <a:pPr lvl="0"/>
             <a:r>
-              <a:rPr lang="en-US" dirty="0" smtClean="0"/>
+              <a:rPr lang="en-US" dirty="0"/>
               <a:t>Item 1</a:t>
             </a:r>
           </a:p>
           <a:p>
             <a:pPr lvl="0"/>
             <a:r>
-              <a:rPr lang="en-US" dirty="0" smtClean="0"/>
+              <a:rPr lang="en-US" dirty="0"/>
               <a:t>Item 2</a:t>
             </a:r>
           </a:p>
           <a:p>
             <a:pPr lvl="0"/>
             <a:r>
-              <a:rPr lang="en-US" dirty="0" smtClean="0"/>
+              <a:rPr lang="en-US" dirty="0"/>
               <a:t>Item 3</a:t>
             </a:r>
-            <a:endParaRPr lang="en-US" dirty="0"/>
           </a:p>
         </p:txBody>
       </p:sp>
@@ -30777,7 +30539,7 @@
           <a:p>
             <a:fld id="{5958763E-B898-436D-883D-03711491D54A}" type="datetimeFigureOut">
               <a:rPr lang="en-US" smtClean="0"/>
-              <a:t>3/20/2020</a:t>
+              <a:t>3/18/2022</a:t>
             </a:fld>
             <a:endParaRPr lang="en-US"/>
           </a:p>
@@ -30884,13 +30646,6 @@
   <p:transition>
     <p:fade/>
   </p:transition>
-  <p:timing>
-    <p:tnLst>
-      <p:par>
-        <p:cTn id="1" dur="indefinite" restart="never" nodeType="tmRoot"/>
-      </p:par>
-    </p:tnLst>
-  </p:timing>
 </p:sldLayout>
 </file>
 
@@ -31052,7 +30807,7 @@
                 <a:spcPct val="0"/>
               </a:spcAft>
             </a:pPr>
-            <a:endParaRPr lang="en-US" sz="2400" dirty="0" err="1" smtClean="0">
+            <a:endParaRPr lang="en-US" sz="2400" dirty="0" err="1">
               <a:gradFill>
                 <a:gsLst>
                   <a:gs pos="0">
@@ -31105,10 +30860,9 @@
           </a:lstStyle>
           <a:p>
             <a:r>
-              <a:rPr lang="en-US" dirty="0" smtClean="0"/>
+              <a:rPr lang="en-US" dirty="0"/>
               <a:t>Notable Quote</a:t>
             </a:r>
-            <a:endParaRPr lang="en-US" dirty="0"/>
           </a:p>
         </p:txBody>
       </p:sp>
@@ -31235,10 +30989,9 @@
           <a:p>
             <a:pPr lvl="0"/>
             <a:r>
-              <a:rPr lang="en-US" dirty="0" smtClean="0"/>
+              <a:rPr lang="en-US" dirty="0"/>
               <a:t>– Attribution</a:t>
             </a:r>
-            <a:endParaRPr lang="en-US" dirty="0"/>
           </a:p>
         </p:txBody>
       </p:sp>
@@ -31265,7 +31018,7 @@
           <a:p>
             <a:fld id="{5958763E-B898-436D-883D-03711491D54A}" type="datetimeFigureOut">
               <a:rPr lang="en-US" smtClean="0"/>
-              <a:t>3/20/2020</a:t>
+              <a:t>3/18/2022</a:t>
             </a:fld>
             <a:endParaRPr lang="en-US"/>
           </a:p>
@@ -32013,13 +31766,6 @@
   <p:transition>
     <p:fade/>
   </p:transition>
-  <p:timing>
-    <p:tnLst>
-      <p:par>
-        <p:cTn id="1" dur="indefinite" restart="never" nodeType="tmRoot"/>
-      </p:par>
-    </p:tnLst>
-  </p:timing>
 </p:sldLayout>
 </file>
 
@@ -32091,7 +31837,7 @@
           <a:p>
             <a:fld id="{5958763E-B898-436D-883D-03711491D54A}" type="datetimeFigureOut">
               <a:rPr lang="en-US" smtClean="0"/>
-              <a:t>3/20/2020</a:t>
+              <a:t>3/18/2022</a:t>
             </a:fld>
             <a:endParaRPr lang="en-US"/>
           </a:p>
@@ -32164,13 +31910,6 @@
   <p:transition>
     <p:fade/>
   </p:transition>
-  <p:timing>
-    <p:tnLst>
-      <p:par>
-        <p:cTn id="1" dur="indefinite" restart="never" nodeType="tmRoot"/>
-      </p:par>
-    </p:tnLst>
-  </p:timing>
 </p:sldLayout>
 </file>
 
@@ -32299,7 +32038,7 @@
           <a:p>
             <a:fld id="{5958763E-B898-436D-883D-03711491D54A}" type="datetimeFigureOut">
               <a:rPr lang="en-US" smtClean="0"/>
-              <a:t>3/20/2020</a:t>
+              <a:t>3/18/2022</a:t>
             </a:fld>
             <a:endParaRPr lang="en-US"/>
           </a:p>
@@ -32422,13 +32161,6 @@
   <p:transition>
     <p:fade/>
   </p:transition>
-  <p:timing>
-    <p:tnLst>
-      <p:par>
-        <p:cTn id="1" dur="indefinite" restart="never" nodeType="tmRoot"/>
-      </p:par>
-    </p:tnLst>
-  </p:timing>
 </p:sldLayout>
 </file>
 
@@ -32641,7 +32373,7 @@
           <a:p>
             <a:fld id="{5958763E-B898-436D-883D-03711491D54A}" type="datetimeFigureOut">
               <a:rPr lang="en-US" smtClean="0"/>
-              <a:t>3/20/2020</a:t>
+              <a:t>3/18/2022</a:t>
             </a:fld>
             <a:endParaRPr lang="en-US"/>
           </a:p>
@@ -32714,13 +32446,6 @@
   <p:transition>
     <p:fade/>
   </p:transition>
-  <p:timing>
-    <p:tnLst>
-      <p:par>
-        <p:cTn id="1" dur="indefinite" restart="never" nodeType="tmRoot"/>
-      </p:par>
-    </p:tnLst>
-  </p:timing>
 </p:sldLayout>
 </file>
 
@@ -32878,7 +32603,7 @@
           <a:p>
             <a:fld id="{5958763E-B898-436D-883D-03711491D54A}" type="datetimeFigureOut">
               <a:rPr lang="en-US" smtClean="0"/>
-              <a:t>3/20/2020</a:t>
+              <a:t>3/18/2022</a:t>
             </a:fld>
             <a:endParaRPr lang="en-US"/>
           </a:p>
@@ -32951,13 +32676,6 @@
   <p:transition>
     <p:fade/>
   </p:transition>
-  <p:timing>
-    <p:tnLst>
-      <p:par>
-        <p:cTn id="1" dur="indefinite" restart="never" nodeType="tmRoot"/>
-      </p:par>
-    </p:tnLst>
-  </p:timing>
 </p:sldLayout>
 </file>
 
@@ -33129,7 +32847,7 @@
           <a:p>
             <a:fld id="{5958763E-B898-436D-883D-03711491D54A}" type="datetimeFigureOut">
               <a:rPr lang="en-US" smtClean="0"/>
-              <a:t>3/20/2020</a:t>
+              <a:t>3/18/2022</a:t>
             </a:fld>
             <a:endParaRPr lang="en-US"/>
           </a:p>
@@ -33275,13 +32993,6 @@
   <p:transition>
     <p:fade/>
   </p:transition>
-  <p:timing>
-    <p:tnLst>
-      <p:par>
-        <p:cTn id="1" dur="indefinite" restart="never" nodeType="tmRoot"/>
-      </p:par>
-    </p:tnLst>
-  </p:timing>
   <p:txStyles>
     <p:titleStyle>
       <a:lvl1pPr algn="l" defTabSz="914400" rtl="0" eaLnBrk="1" latinLnBrk="0" hangingPunct="1">
@@ -33586,7 +33297,7 @@
       </a:lvl9pPr>
     </p:otherStyle>
   </p:txStyles>
-  <p:extLst mod="1">
+  <p:extLst>
     <p:ext uri="{27BBF7A9-308A-43DC-89C8-2F10F3537804}">
       <p15:sldGuideLst xmlns:p15="http://schemas.microsoft.com/office/powerpoint/2012/main">
         <p15:guide id="1" orient="horz" pos="2160" userDrawn="1">
@@ -33665,10 +33376,9 @@
           <a:lstStyle/>
           <a:p>
             <a:r>
-              <a:rPr lang="en-US" sz="6600" dirty="0" smtClean="0"/>
+              <a:rPr lang="en-US" sz="6600" dirty="0"/>
               <a:t>More HTML Elements</a:t>
             </a:r>
-            <a:endParaRPr lang="en-US" sz="6600" dirty="0"/>
           </a:p>
         </p:txBody>
       </p:sp>
@@ -33693,10 +33403,9 @@
           <a:lstStyle/>
           <a:p>
             <a:r>
-              <a:rPr lang="en-US" dirty="0" smtClean="0"/>
+              <a:rPr lang="en-US" dirty="0"/>
               <a:t>Hy-Tech Club: Web 101</a:t>
             </a:r>
-            <a:endParaRPr lang="en-US" dirty="0"/>
           </a:p>
         </p:txBody>
       </p:sp>
@@ -36681,13 +36390,6 @@
   <p:transition>
     <p:fade/>
   </p:transition>
-  <p:timing>
-    <p:tnLst>
-      <p:par>
-        <p:cTn id="1" dur="indefinite" restart="never" nodeType="tmRoot"/>
-      </p:par>
-    </p:tnLst>
-  </p:timing>
 </p:sld>
 </file>
 
@@ -36724,10 +36426,9 @@
           <a:lstStyle/>
           <a:p>
             <a:r>
-              <a:rPr lang="en-US" dirty="0" smtClean="0"/>
+              <a:rPr lang="en-US" dirty="0"/>
               <a:t>Nesting activity</a:t>
             </a:r>
-            <a:endParaRPr lang="en-US" dirty="0"/>
           </a:p>
         </p:txBody>
       </p:sp>
@@ -36785,13 +36486,6 @@
   <p:transition>
     <p:fade/>
   </p:transition>
-  <p:timing>
-    <p:tnLst>
-      <p:par>
-        <p:cTn id="1" dur="indefinite" restart="never" nodeType="tmRoot"/>
-      </p:par>
-    </p:tnLst>
-  </p:timing>
 </p:sld>
 </file>
 
@@ -36828,10 +36522,9 @@
           <a:lstStyle/>
           <a:p>
             <a:r>
-              <a:rPr lang="en-US" dirty="0" smtClean="0"/>
+              <a:rPr lang="en-US" dirty="0"/>
               <a:t>List Example</a:t>
             </a:r>
-            <a:endParaRPr lang="en-US" dirty="0"/>
           </a:p>
         </p:txBody>
       </p:sp>
@@ -36859,7 +36552,7 @@
               <a:rPr lang="en-US" sz="11500" dirty="0">
                 <a:hlinkClick r:id="rId3"/>
               </a:rPr>
-              <a:t>https://repl.it/repls/HuskyIcyBuckets</a:t>
+              <a:t>https://replit.com/@HylandOutreach/ListExample</a:t>
             </a:r>
             <a:endParaRPr lang="en-US" sz="13800" dirty="0"/>
           </a:p>
@@ -36878,13 +36571,6 @@
   <p:transition>
     <p:fade/>
   </p:transition>
-  <p:timing>
-    <p:tnLst>
-      <p:par>
-        <p:cTn id="1" dur="indefinite" restart="never" nodeType="tmRoot"/>
-      </p:par>
-    </p:tnLst>
-  </p:timing>
 </p:sld>
 </file>
 
@@ -36931,7 +36617,7 @@
           <a:lstStyle/>
           <a:p>
             <a:r>
-              <a:rPr lang="en-US" dirty="0" smtClean="0">
+              <a:rPr lang="en-US" dirty="0">
                 <a:solidFill>
                   <a:schemeClr val="accent6"/>
                 </a:solidFill>
@@ -36939,7 +36625,7 @@
               <a:t>The </a:t>
             </a:r>
             <a:r>
-              <a:rPr lang="en-US" sz="4000" cap="none" dirty="0" smtClean="0">
+              <a:rPr lang="en-US" sz="4000" cap="none" dirty="0">
                 <a:solidFill>
                   <a:schemeClr val="accent1">
                     <a:lumMod val="60000"/>
@@ -36951,7 +36637,7 @@
               <a:t>input</a:t>
             </a:r>
             <a:r>
-              <a:rPr lang="en-US" dirty="0" smtClean="0">
+              <a:rPr lang="en-US" dirty="0">
                 <a:solidFill>
                   <a:schemeClr val="accent6"/>
                 </a:solidFill>
@@ -36992,7 +36678,7 @@
           <a:lstStyle/>
           <a:p>
             <a:r>
-              <a:rPr lang="en-US" sz="3200" b="1" dirty="0" smtClean="0">
+              <a:rPr lang="en-US" sz="3200" b="1" dirty="0">
                 <a:solidFill>
                   <a:schemeClr val="accent1">
                     <a:lumMod val="60000"/>
@@ -37004,7 +36690,7 @@
               <a:t>input</a:t>
             </a:r>
             <a:r>
-              <a:rPr lang="en-US" dirty="0" smtClean="0">
+              <a:rPr lang="en-US" dirty="0">
                 <a:solidFill>
                   <a:schemeClr val="bg1"/>
                 </a:solidFill>
@@ -37014,7 +36700,7 @@
           </a:p>
           <a:p>
             <a:r>
-              <a:rPr lang="en-US" dirty="0" smtClean="0">
+              <a:rPr lang="en-US" dirty="0">
                 <a:solidFill>
                   <a:schemeClr val="bg1"/>
                 </a:solidFill>
@@ -37022,7 +36708,7 @@
               <a:t>The </a:t>
             </a:r>
             <a:r>
-              <a:rPr lang="en-US" sz="3200" b="1" dirty="0" smtClean="0">
+              <a:rPr lang="en-US" sz="3200" b="1" dirty="0">
                 <a:solidFill>
                   <a:schemeClr val="accent1">
                     <a:lumMod val="60000"/>
@@ -37034,7 +36720,7 @@
               <a:t>type</a:t>
             </a:r>
             <a:r>
-              <a:rPr lang="en-US" dirty="0" smtClean="0">
+              <a:rPr lang="en-US" dirty="0">
                 <a:solidFill>
                   <a:schemeClr val="bg1"/>
                 </a:solidFill>
@@ -37042,7 +36728,7 @@
               <a:t> attribute determines how the </a:t>
             </a:r>
             <a:r>
-              <a:rPr lang="en-US" sz="3200" b="1" dirty="0" smtClean="0">
+              <a:rPr lang="en-US" sz="3200" b="1" dirty="0">
                 <a:solidFill>
                   <a:schemeClr val="accent1">
                     <a:lumMod val="60000"/>
@@ -37054,7 +36740,7 @@
               <a:t>input</a:t>
             </a:r>
             <a:r>
-              <a:rPr lang="en-US" dirty="0" smtClean="0">
+              <a:rPr lang="en-US" dirty="0">
                 <a:solidFill>
                   <a:schemeClr val="bg1"/>
                 </a:solidFill>
@@ -37064,7 +36750,7 @@
           </a:p>
           <a:p>
             <a:r>
-              <a:rPr lang="en-US" dirty="0" smtClean="0">
+              <a:rPr lang="en-US" dirty="0">
                 <a:solidFill>
                   <a:schemeClr val="bg1"/>
                 </a:solidFill>
@@ -37072,7 +36758,7 @@
               <a:t>It is a </a:t>
             </a:r>
             <a:r>
-              <a:rPr lang="en-US" i="1" dirty="0" smtClean="0">
+              <a:rPr lang="en-US" i="1" dirty="0">
                 <a:solidFill>
                   <a:schemeClr val="bg1"/>
                 </a:solidFill>
@@ -37915,7 +37601,7 @@
           <a:lstStyle/>
           <a:p>
             <a:r>
-              <a:rPr lang="en-US" dirty="0" smtClean="0">
+              <a:rPr lang="en-US" dirty="0">
                 <a:solidFill>
                   <a:schemeClr val="accent6"/>
                 </a:solidFill>
@@ -37956,7 +37642,7 @@
           <a:lstStyle/>
           <a:p>
             <a:r>
-              <a:rPr lang="en-US" sz="3200" b="1" dirty="0" err="1" smtClean="0">
+              <a:rPr lang="en-US" sz="3200" b="1" dirty="0" err="1">
                 <a:solidFill>
                   <a:schemeClr val="accent1">
                     <a:lumMod val="60000"/>
@@ -37968,7 +37654,7 @@
               <a:t>textarea</a:t>
             </a:r>
             <a:r>
-              <a:rPr lang="en-US" dirty="0" smtClean="0">
+              <a:rPr lang="en-US" dirty="0">
                 <a:solidFill>
                   <a:schemeClr val="bg1"/>
                 </a:solidFill>
@@ -37978,7 +37664,7 @@
           </a:p>
           <a:p>
             <a:r>
-              <a:rPr lang="en-US" sz="3200" b="1" dirty="0" smtClean="0">
+              <a:rPr lang="en-US" sz="3200" b="1" dirty="0">
                 <a:solidFill>
                   <a:schemeClr val="accent1">
                     <a:lumMod val="60000"/>
@@ -37990,7 +37676,7 @@
               <a:t>select</a:t>
             </a:r>
             <a:r>
-              <a:rPr lang="en-US" dirty="0" smtClean="0">
+              <a:rPr lang="en-US" dirty="0">
                 <a:solidFill>
                   <a:schemeClr val="bg1"/>
                 </a:solidFill>
@@ -37998,7 +37684,7 @@
               <a:t> and </a:t>
             </a:r>
             <a:r>
-              <a:rPr lang="en-US" sz="3200" b="1" dirty="0" smtClean="0">
+              <a:rPr lang="en-US" sz="3200" b="1" dirty="0">
                 <a:solidFill>
                   <a:srgbClr val="54C8E8">
                     <a:lumMod val="60000"/>
@@ -38015,21 +37701,8 @@
                   <a:schemeClr val="bg1"/>
                 </a:solidFill>
               </a:rPr>
-              <a:t> </a:t>
-            </a:r>
-            <a:r>
-              <a:rPr lang="en-US" dirty="0" smtClean="0">
-                <a:solidFill>
-                  <a:schemeClr val="bg1"/>
-                </a:solidFill>
-              </a:rPr>
-              <a:t>are used to create a dropdown list</a:t>
-            </a:r>
-            <a:endParaRPr lang="en-US" dirty="0">
-              <a:solidFill>
-                <a:schemeClr val="bg1"/>
-              </a:solidFill>
-            </a:endParaRPr>
+              <a:t> are used to create a dropdown list</a:t>
+            </a:r>
           </a:p>
         </p:txBody>
       </p:sp>
@@ -38617,7 +38290,7 @@
           <a:lstStyle/>
           <a:p>
             <a:r>
-              <a:rPr lang="en-US" smtClean="0"/>
+              <a:rPr lang="en-US"/>
               <a:t>input Examples</a:t>
             </a:r>
             <a:endParaRPr lang="en-US" dirty="0"/>
@@ -38648,7 +38321,13 @@
               <a:rPr lang="en-US" sz="11500" dirty="0">
                 <a:hlinkClick r:id="rId3"/>
               </a:rPr>
-              <a:t>https://repl.it/repls/RowdyPowerlessPreprocessor</a:t>
+              <a:t>https://replit.com/@HylandOutreach</a:t>
+            </a:r>
+            <a:r>
+              <a:rPr lang="en-US" sz="11500">
+                <a:hlinkClick r:id="rId3"/>
+              </a:rPr>
+              <a:t>/InputExamples</a:t>
             </a:r>
             <a:endParaRPr lang="en-US" sz="16600" dirty="0"/>
           </a:p>
@@ -38667,13 +38346,6 @@
   <p:transition>
     <p:fade/>
   </p:transition>
-  <p:timing>
-    <p:tnLst>
-      <p:par>
-        <p:cTn id="1" dur="indefinite" restart="never" nodeType="tmRoot"/>
-      </p:par>
-    </p:tnLst>
-  </p:timing>
 </p:sld>
 </file>
 
@@ -38710,10 +38382,9 @@
           <a:lstStyle/>
           <a:p>
             <a:r>
-              <a:rPr lang="en-US" dirty="0" smtClean="0"/>
+              <a:rPr lang="en-US" dirty="0"/>
               <a:t>Agenda</a:t>
             </a:r>
-            <a:endParaRPr lang="en-US" dirty="0"/>
           </a:p>
         </p:txBody>
       </p:sp>
@@ -38733,16 +38404,15 @@
           <a:lstStyle/>
           <a:p>
             <a:r>
-              <a:rPr lang="en-US" dirty="0" smtClean="0"/>
+              <a:rPr lang="en-US" dirty="0"/>
               <a:t>HTML Attributes</a:t>
             </a:r>
           </a:p>
           <a:p>
             <a:r>
-              <a:rPr lang="en-US" dirty="0" smtClean="0"/>
+              <a:rPr lang="en-US" dirty="0"/>
               <a:t>HTML Lists &amp; Inputs</a:t>
             </a:r>
-            <a:endParaRPr lang="en-US" dirty="0"/>
           </a:p>
         </p:txBody>
       </p:sp>
@@ -38759,13 +38429,6 @@
   <p:transition>
     <p:fade/>
   </p:transition>
-  <p:timing>
-    <p:tnLst>
-      <p:par>
-        <p:cTn id="1" dur="indefinite" restart="never" nodeType="tmRoot"/>
-      </p:par>
-    </p:tnLst>
-  </p:timing>
 </p:sld>
 </file>
 
@@ -38802,10 +38465,9 @@
           <a:lstStyle/>
           <a:p>
             <a:r>
-              <a:rPr lang="en-US" dirty="0" smtClean="0"/>
+              <a:rPr lang="en-US" dirty="0"/>
               <a:t>HTML Attributes</a:t>
             </a:r>
-            <a:endParaRPr lang="en-US" dirty="0"/>
           </a:p>
         </p:txBody>
       </p:sp>
@@ -38861,13 +38523,6 @@
   <p:transition>
     <p:fade/>
   </p:transition>
-  <p:timing>
-    <p:tnLst>
-      <p:par>
-        <p:cTn id="1" dur="indefinite" restart="never" nodeType="tmRoot"/>
-      </p:par>
-    </p:tnLst>
-  </p:timing>
 </p:sld>
 </file>
 
@@ -38914,10 +38569,9 @@
           <a:lstStyle/>
           <a:p>
             <a:r>
-              <a:rPr lang="en-US" dirty="0" smtClean="0"/>
+              <a:rPr lang="en-US" dirty="0"/>
               <a:t>Attribute example: The anchor element</a:t>
             </a:r>
-            <a:endParaRPr lang="en-US" dirty="0"/>
           </a:p>
         </p:txBody>
       </p:sp>
@@ -38946,7 +38600,7 @@
             <a:pPr marL="57150" indent="0" algn="ctr">
               <a:buNone/>
             </a:pPr>
-            <a:endParaRPr lang="en-US" sz="3600" dirty="0" smtClean="0">
+            <a:endParaRPr lang="en-US" sz="3600" dirty="0">
               <a:solidFill>
                 <a:srgbClr val="808080"/>
               </a:solidFill>
@@ -38958,7 +38612,7 @@
               <a:buNone/>
             </a:pPr>
             <a:r>
-              <a:rPr lang="en-US" sz="3600" dirty="0" smtClean="0">
+              <a:rPr lang="en-US" sz="3600" dirty="0">
                 <a:solidFill>
                   <a:srgbClr val="808080"/>
                 </a:solidFill>
@@ -39009,19 +38663,10 @@
                 </a:solidFill>
                 <a:latin typeface="Consolas" panose="020B0609020204030204" pitchFamily="49" charset="0"/>
               </a:rPr>
-              <a:t>"</a:t>
-            </a:r>
-            <a:r>
-              <a:rPr lang="en-US" sz="3600" dirty="0" smtClean="0">
-                <a:solidFill>
-                  <a:srgbClr val="CE9178"/>
-                </a:solidFill>
-                <a:latin typeface="Consolas" panose="020B0609020204030204" pitchFamily="49" charset="0"/>
-              </a:rPr>
-              <a:t>http://wikipedia.org/"</a:t>
-            </a:r>
-            <a:r>
-              <a:rPr lang="en-US" sz="3600" dirty="0" smtClean="0">
+              <a:t>"http://wikipedia.org/"</a:t>
+            </a:r>
+            <a:r>
+              <a:rPr lang="en-US" sz="3600" dirty="0">
                 <a:solidFill>
                   <a:srgbClr val="808080"/>
                 </a:solidFill>
@@ -39057,7 +38702,7 @@
               <a:t>a</a:t>
             </a:r>
             <a:r>
-              <a:rPr lang="en-US" sz="3600" dirty="0" smtClean="0">
+              <a:rPr lang="en-US" sz="3600" dirty="0">
                 <a:solidFill>
                   <a:srgbClr val="808080"/>
                 </a:solidFill>
@@ -39137,7 +38782,7 @@
                 <a:spcPct val="0"/>
               </a:spcAft>
             </a:pPr>
-            <a:endParaRPr lang="en-US" sz="2400" dirty="0" err="1" smtClean="0">
+            <a:endParaRPr lang="en-US" sz="2400" dirty="0" err="1">
               <a:gradFill>
                 <a:gsLst>
                   <a:gs pos="0">
@@ -39186,7 +38831,7 @@
               </a:spcAft>
             </a:pPr>
             <a:r>
-              <a:rPr lang="en-US" sz="4000" b="1" dirty="0" smtClean="0">
+              <a:rPr lang="en-US" sz="4000" b="1" dirty="0">
                 <a:solidFill>
                   <a:schemeClr val="accent6"/>
                 </a:solidFill>
@@ -39194,7 +38839,7 @@
               <a:t>Q:</a:t>
             </a:r>
             <a:r>
-              <a:rPr lang="en-US" sz="4000" dirty="0" smtClean="0">
+              <a:rPr lang="en-US" sz="4000" dirty="0">
                 <a:solidFill>
                   <a:schemeClr val="accent6"/>
                 </a:solidFill>
@@ -39211,7 +38856,7 @@
               <a:t>href</a:t>
             </a:r>
             <a:r>
-              <a:rPr lang="en-US" sz="4000" dirty="0" smtClean="0">
+              <a:rPr lang="en-US" sz="4000" dirty="0">
                 <a:solidFill>
                   <a:schemeClr val="accent6"/>
                 </a:solidFill>
@@ -39252,7 +38897,7 @@
               </a:spcAft>
             </a:pPr>
             <a:r>
-              <a:rPr lang="en-US" sz="4000" b="1" dirty="0" smtClean="0">
+              <a:rPr lang="en-US" sz="4000" b="1" dirty="0">
                 <a:solidFill>
                   <a:schemeClr val="accent6"/>
                 </a:solidFill>
@@ -39260,7 +38905,7 @@
               <a:t>A: </a:t>
             </a:r>
             <a:r>
-              <a:rPr lang="en-US" sz="4000" dirty="0" smtClean="0">
+              <a:rPr lang="en-US" sz="4000" dirty="0">
                 <a:solidFill>
                   <a:schemeClr val="accent6"/>
                 </a:solidFill>
@@ -39277,7 +38922,7 @@
               <a:t>href</a:t>
             </a:r>
             <a:r>
-              <a:rPr lang="en-US" sz="4000" dirty="0" smtClean="0">
+              <a:rPr lang="en-US" sz="4000" dirty="0">
                 <a:solidFill>
                   <a:schemeClr val="accent6"/>
                 </a:solidFill>
@@ -39285,7 +38930,7 @@
               <a:t> </a:t>
             </a:r>
             <a:r>
-              <a:rPr lang="en-US" sz="4000" i="1" dirty="0" smtClean="0">
+              <a:rPr lang="en-US" sz="4000" i="1" dirty="0">
                 <a:solidFill>
                   <a:schemeClr val="accent6"/>
                 </a:solidFill>
@@ -39293,7 +38938,7 @@
               <a:t>attribute</a:t>
             </a:r>
             <a:r>
-              <a:rPr lang="en-US" sz="4000" dirty="0" smtClean="0">
+              <a:rPr lang="en-US" sz="4000" dirty="0">
                 <a:solidFill>
                   <a:schemeClr val="accent6"/>
                 </a:solidFill>
@@ -39528,10 +39173,9 @@
           <a:lstStyle/>
           <a:p>
             <a:r>
-              <a:rPr lang="en-US" dirty="0" smtClean="0"/>
+              <a:rPr lang="en-US" dirty="0"/>
               <a:t>What are attributes?</a:t>
             </a:r>
-            <a:endParaRPr lang="en-US" dirty="0"/>
           </a:p>
         </p:txBody>
       </p:sp>
@@ -39553,14 +39197,14 @@
           <a:lstStyle/>
           <a:p>
             <a:r>
-              <a:rPr lang="en-US" dirty="0" smtClean="0"/>
+              <a:rPr lang="en-US" dirty="0"/>
               <a:t>Attributes add extra information to HTML elements</a:t>
             </a:r>
           </a:p>
           <a:p>
             <a:pPr lvl="1"/>
             <a:r>
-              <a:rPr lang="en-US" dirty="0" smtClean="0"/>
+              <a:rPr lang="en-US" dirty="0"/>
               <a:t>They allow developers to customize the behavior of elements</a:t>
             </a:r>
           </a:p>
@@ -39570,15 +39214,15 @@
           </a:p>
           <a:p>
             <a:r>
-              <a:rPr lang="en-US" dirty="0" smtClean="0"/>
+              <a:rPr lang="en-US" dirty="0"/>
               <a:t>Attributes go inside of the </a:t>
             </a:r>
             <a:r>
-              <a:rPr lang="en-US" i="1" dirty="0" smtClean="0"/>
+              <a:rPr lang="en-US" i="1" dirty="0"/>
               <a:t>opening tag</a:t>
             </a:r>
             <a:r>
-              <a:rPr lang="en-US" dirty="0" smtClean="0"/>
+              <a:rPr lang="en-US" dirty="0"/>
               <a:t> of an HTML element</a:t>
             </a:r>
           </a:p>
@@ -39647,7 +39291,7 @@
               <a:t> </a:t>
             </a:r>
             <a:r>
-              <a:rPr lang="en-US" sz="5400" dirty="0" smtClean="0">
+              <a:rPr lang="en-US" sz="5400" dirty="0">
                 <a:solidFill>
                   <a:srgbClr val="800000"/>
                 </a:solidFill>
@@ -39663,20 +39307,19 @@
             </a:endParaRPr>
           </a:p>
           <a:p>
-            <a:endParaRPr lang="en-US" dirty="0" smtClean="0"/>
-          </a:p>
-          <a:p>
-            <a:r>
-              <a:rPr lang="en-US" dirty="0" smtClean="0"/>
+            <a:endParaRPr lang="en-US" dirty="0"/>
+          </a:p>
+          <a:p>
+            <a:r>
+              <a:rPr lang="en-US" dirty="0"/>
               <a:t>Attribute name, equals sign, quotation marks, attribute value</a:t>
             </a:r>
-            <a:endParaRPr lang="en-US" dirty="0"/>
           </a:p>
           <a:p>
             <a:pPr marL="57150" indent="0">
               <a:buNone/>
             </a:pPr>
-            <a:endParaRPr lang="en-US" dirty="0" smtClean="0"/>
+            <a:endParaRPr lang="en-US" dirty="0"/>
           </a:p>
           <a:p>
             <a:endParaRPr lang="en-US" dirty="0"/>
@@ -39685,7 +39328,7 @@
             <a:pPr marL="57150" indent="0">
               <a:buNone/>
             </a:pPr>
-            <a:endParaRPr lang="en-US" dirty="0" smtClean="0"/>
+            <a:endParaRPr lang="en-US" dirty="0"/>
           </a:p>
         </p:txBody>
       </p:sp>
@@ -40058,10 +39701,9 @@
           <a:lstStyle/>
           <a:p>
             <a:r>
-              <a:rPr lang="en-US" dirty="0" smtClean="0"/>
+              <a:rPr lang="en-US" dirty="0"/>
               <a:t>Mini-quiz</a:t>
             </a:r>
-            <a:endParaRPr lang="en-US" dirty="0"/>
           </a:p>
         </p:txBody>
       </p:sp>
@@ -40084,7 +39726,7 @@
               <a:buNone/>
             </a:pPr>
             <a:r>
-              <a:rPr lang="en-US" sz="4800" dirty="0" smtClean="0">
+              <a:rPr lang="en-US" sz="4800" dirty="0">
                 <a:solidFill>
                   <a:srgbClr val="800000"/>
                 </a:solidFill>
@@ -40120,7 +39762,7 @@
               <a:t>src</a:t>
             </a:r>
             <a:r>
-              <a:rPr lang="en-US" sz="4800" dirty="0" smtClean="0">
+              <a:rPr lang="en-US" sz="4800" dirty="0">
                 <a:solidFill>
                   <a:srgbClr val="000000"/>
                 </a:solidFill>
@@ -40129,7 +39771,7 @@
               <a:t>=</a:t>
             </a:r>
             <a:r>
-              <a:rPr lang="en-US" sz="4800" dirty="0" smtClean="0">
+              <a:rPr lang="en-US" sz="4800" dirty="0">
                 <a:solidFill>
                   <a:srgbClr val="0000FF"/>
                 </a:solidFill>
@@ -40147,7 +39789,7 @@
               <a:t> </a:t>
             </a:r>
             <a:r>
-              <a:rPr lang="en-US" sz="4800" dirty="0" smtClean="0">
+              <a:rPr lang="en-US" sz="4800" dirty="0">
                 <a:solidFill>
                   <a:srgbClr val="800000"/>
                 </a:solidFill>
@@ -40162,7 +39804,7 @@
                 <a:srgbClr val="98989A"/>
               </a:buClr>
             </a:pPr>
-            <a:endParaRPr lang="en-US" dirty="0" smtClean="0">
+            <a:endParaRPr lang="en-US" dirty="0">
               <a:solidFill>
                 <a:srgbClr val="56565A"/>
               </a:solidFill>
@@ -40176,7 +39818,7 @@
               <a:buNone/>
             </a:pPr>
             <a:r>
-              <a:rPr lang="en-US" sz="4000" dirty="0" smtClean="0">
+              <a:rPr lang="en-US" sz="4000" dirty="0">
                 <a:solidFill>
                   <a:srgbClr val="56565A"/>
                 </a:solidFill>
@@ -40184,7 +39826,7 @@
               <a:t>What is the </a:t>
             </a:r>
             <a:r>
-              <a:rPr lang="en-US" sz="4000" i="1" dirty="0" smtClean="0">
+              <a:rPr lang="en-US" sz="4000" i="1" dirty="0">
                 <a:solidFill>
                   <a:srgbClr val="56565A"/>
                 </a:solidFill>
@@ -40192,7 +39834,7 @@
               <a:t>attribute name</a:t>
             </a:r>
             <a:r>
-              <a:rPr lang="en-US" sz="4000" dirty="0" smtClean="0">
+              <a:rPr lang="en-US" sz="4000" dirty="0">
                 <a:solidFill>
                   <a:srgbClr val="56565A"/>
                 </a:solidFill>
@@ -40216,7 +39858,7 @@
               </a:rPr>
               <a:t>src</a:t>
             </a:r>
-            <a:endParaRPr lang="en-US" sz="4800" dirty="0" smtClean="0">
+            <a:endParaRPr lang="en-US" sz="4800" dirty="0">
               <a:solidFill>
                 <a:srgbClr val="56565A"/>
               </a:solidFill>
@@ -40230,7 +39872,7 @@
               <a:buNone/>
             </a:pPr>
             <a:r>
-              <a:rPr lang="en-US" sz="4000" dirty="0" smtClean="0">
+              <a:rPr lang="en-US" sz="4000" dirty="0">
                 <a:solidFill>
                   <a:srgbClr val="56565A"/>
                 </a:solidFill>
@@ -40238,7 +39880,7 @@
               <a:t>What is the </a:t>
             </a:r>
             <a:r>
-              <a:rPr lang="en-US" sz="4000" i="1" dirty="0" smtClean="0">
+              <a:rPr lang="en-US" sz="4000" i="1" dirty="0">
                 <a:solidFill>
                   <a:srgbClr val="56565A"/>
                 </a:solidFill>
@@ -40246,7 +39888,7 @@
               <a:t>attribute value</a:t>
             </a:r>
             <a:r>
-              <a:rPr lang="en-US" sz="4000" dirty="0" smtClean="0">
+              <a:rPr lang="en-US" sz="4000" dirty="0">
                 <a:solidFill>
                   <a:srgbClr val="56565A"/>
                 </a:solidFill>
@@ -40270,7 +39912,7 @@
               </a:rPr>
               <a:t>dog.png</a:t>
             </a:r>
-            <a:endParaRPr lang="en-US" sz="4800" dirty="0" smtClean="0">
+            <a:endParaRPr lang="en-US" sz="4800" dirty="0">
               <a:solidFill>
                 <a:srgbClr val="56565A"/>
               </a:solidFill>
@@ -40280,7 +39922,7 @@
             <a:pPr marL="57150" indent="0" algn="ctr">
               <a:buNone/>
             </a:pPr>
-            <a:endParaRPr lang="en-US" sz="4800" dirty="0" smtClean="0">
+            <a:endParaRPr lang="en-US" sz="4800" dirty="0">
               <a:solidFill>
                 <a:srgbClr val="800000"/>
               </a:solidFill>
@@ -40693,10 +40335,9 @@
           <a:lstStyle/>
           <a:p>
             <a:r>
-              <a:rPr lang="en-US" dirty="0" smtClean="0"/>
+              <a:rPr lang="en-US" dirty="0"/>
               <a:t>Attributes Examples</a:t>
             </a:r>
-            <a:endParaRPr lang="en-US" dirty="0"/>
           </a:p>
         </p:txBody>
       </p:sp>
@@ -40713,7 +40354,7 @@
         <p:spPr/>
         <p:txBody>
           <a:bodyPr>
-            <a:normAutofit/>
+            <a:normAutofit fontScale="92500"/>
           </a:bodyPr>
           <a:lstStyle/>
           <a:p>
@@ -40724,7 +40365,7 @@
               <a:rPr lang="en-US" sz="11500" dirty="0">
                 <a:hlinkClick r:id="rId3"/>
               </a:rPr>
-              <a:t>https://repl.it/repls/CharmingMotionlessUtility</a:t>
+              <a:t>https://replit.com/@HylandOutreach/AttributesExample</a:t>
             </a:r>
             <a:endParaRPr lang="en-US" sz="11500" dirty="0"/>
           </a:p>
@@ -40743,13 +40384,6 @@
   <p:transition>
     <p:fade/>
   </p:transition>
-  <p:timing>
-    <p:tnLst>
-      <p:par>
-        <p:cTn id="1" dur="indefinite" restart="never" nodeType="tmRoot"/>
-      </p:par>
-    </p:tnLst>
-  </p:timing>
 </p:sld>
 </file>
 
@@ -40791,10 +40425,9 @@
           <a:lstStyle/>
           <a:p>
             <a:r>
-              <a:rPr lang="en-US" dirty="0" smtClean="0"/>
+              <a:rPr lang="en-US" dirty="0"/>
               <a:t>More HTML Elements</a:t>
             </a:r>
-            <a:endParaRPr lang="en-US" dirty="0"/>
           </a:p>
         </p:txBody>
       </p:sp>
@@ -40841,13 +40474,6 @@
   <p:transition>
     <p:fade/>
   </p:transition>
-  <p:timing>
-    <p:tnLst>
-      <p:par>
-        <p:cTn id="1" dur="indefinite" restart="never" nodeType="tmRoot"/>
-      </p:par>
-    </p:tnLst>
-  </p:timing>
 </p:sld>
 </file>
 
@@ -40894,7 +40520,7 @@
           <a:lstStyle/>
           <a:p>
             <a:r>
-              <a:rPr lang="en-US" dirty="0" smtClean="0">
+              <a:rPr lang="en-US" dirty="0">
                 <a:solidFill>
                   <a:schemeClr val="accent6"/>
                 </a:solidFill>
@@ -40902,7 +40528,7 @@
               <a:t>The list elements: </a:t>
             </a:r>
             <a:r>
-              <a:rPr lang="en-US" sz="4000" cap="none" dirty="0" err="1" smtClean="0">
+              <a:rPr lang="en-US" sz="4000" cap="none" dirty="0" err="1">
                 <a:solidFill>
                   <a:schemeClr val="accent1">
                     <a:lumMod val="60000"/>
@@ -40914,7 +40540,7 @@
               <a:t>ul</a:t>
             </a:r>
             <a:r>
-              <a:rPr lang="en-US" dirty="0" smtClean="0">
+              <a:rPr lang="en-US" dirty="0">
                 <a:solidFill>
                   <a:schemeClr val="accent6"/>
                 </a:solidFill>
@@ -40922,7 +40548,7 @@
               <a:t> and </a:t>
             </a:r>
             <a:r>
-              <a:rPr lang="en-US" sz="4000" cap="none" dirty="0" err="1" smtClean="0">
+              <a:rPr lang="en-US" sz="4000" cap="none" dirty="0" err="1">
                 <a:solidFill>
                   <a:schemeClr val="accent1">
                     <a:lumMod val="60000"/>
@@ -40960,7 +40586,7 @@
           <a:lstStyle/>
           <a:p>
             <a:r>
-              <a:rPr lang="en-US" dirty="0" smtClean="0">
+              <a:rPr lang="en-US" dirty="0">
                 <a:solidFill>
                   <a:schemeClr val="bg1"/>
                 </a:solidFill>
@@ -40970,7 +40596,7 @@
           </a:p>
           <a:p>
             <a:r>
-              <a:rPr lang="en-US" dirty="0" smtClean="0">
+              <a:rPr lang="en-US" dirty="0">
                 <a:solidFill>
                   <a:schemeClr val="bg1"/>
                 </a:solidFill>
@@ -40980,7 +40606,7 @@
           </a:p>
           <a:p>
             <a:r>
-              <a:rPr lang="en-US" dirty="0" smtClean="0">
+              <a:rPr lang="en-US" dirty="0">
                 <a:solidFill>
                   <a:schemeClr val="bg1"/>
                 </a:solidFill>
@@ -40988,7 +40614,7 @@
               <a:t>Each item is its own HTML element: </a:t>
             </a:r>
             <a:r>
-              <a:rPr lang="en-US" dirty="0" smtClean="0">
+              <a:rPr lang="en-US" dirty="0">
                 <a:solidFill>
                   <a:schemeClr val="accent1">
                     <a:lumMod val="20000"/>
@@ -41002,7 +40628,7 @@
           </a:p>
           <a:p>
             <a:r>
-              <a:rPr lang="en-US" dirty="0" smtClean="0">
+              <a:rPr lang="en-US" dirty="0">
                 <a:solidFill>
                   <a:schemeClr val="bg1"/>
                 </a:solidFill>
@@ -41010,7 +40636,7 @@
               <a:t>The list items are </a:t>
             </a:r>
             <a:r>
-              <a:rPr lang="en-US" i="1" dirty="0" smtClean="0">
+              <a:rPr lang="en-US" i="1" dirty="0">
                 <a:solidFill>
                   <a:schemeClr val="bg1"/>
                 </a:solidFill>
@@ -41018,7 +40644,7 @@
               <a:t>children</a:t>
             </a:r>
             <a:r>
-              <a:rPr lang="en-US" dirty="0" smtClean="0">
+              <a:rPr lang="en-US" dirty="0">
                 <a:solidFill>
                   <a:schemeClr val="bg1"/>
                 </a:solidFill>
@@ -41026,14 +40652,14 @@
               <a:t> and the list elements are the </a:t>
             </a:r>
             <a:r>
-              <a:rPr lang="en-US" i="1" dirty="0" smtClean="0">
+              <a:rPr lang="en-US" i="1" dirty="0">
                 <a:solidFill>
                   <a:schemeClr val="bg1"/>
                 </a:solidFill>
               </a:rPr>
               <a:t>parents</a:t>
             </a:r>
-            <a:endParaRPr lang="en-US" dirty="0" smtClean="0">
+            <a:endParaRPr lang="en-US" dirty="0">
               <a:solidFill>
                 <a:schemeClr val="bg1"/>
               </a:solidFill>
@@ -41277,7 +40903,7 @@
               <a:t>ul</a:t>
             </a:r>
             <a:r>
-              <a:rPr lang="it-IT" sz="3600" dirty="0" smtClean="0">
+              <a:rPr lang="it-IT" sz="3600" dirty="0">
                 <a:solidFill>
                   <a:srgbClr val="808080"/>
                 </a:solidFill>
@@ -41317,7 +40943,7 @@
           <a:lstStyle/>
           <a:p>
             <a:r>
-              <a:rPr lang="it-IT" sz="3600" dirty="0" smtClean="0">
+              <a:rPr lang="it-IT" sz="3600" dirty="0">
                 <a:solidFill>
                   <a:srgbClr val="808080"/>
                 </a:solidFill>
@@ -41332,16 +40958,7 @@
                 </a:solidFill>
                 <a:latin typeface="Consolas" panose="020B0609020204030204" pitchFamily="49" charset="0"/>
               </a:rPr>
-              <a:t>o</a:t>
-            </a:r>
-            <a:r>
-              <a:rPr lang="it-IT" sz="3600" dirty="0" smtClean="0">
-                <a:solidFill>
-                  <a:srgbClr val="569CD6"/>
-                </a:solidFill>
-                <a:latin typeface="Consolas" panose="020B0609020204030204" pitchFamily="49" charset="0"/>
-              </a:rPr>
-              <a:t>l</a:t>
+              <a:t>ol</a:t>
             </a:r>
             <a:r>
               <a:rPr lang="it-IT" sz="3600" dirty="0">
@@ -41370,49 +40987,13 @@
               <a:t>    </a:t>
             </a:r>
             <a:r>
-              <a:rPr lang="it-IT" sz="3600" dirty="0" smtClean="0">
+              <a:rPr lang="it-IT" sz="3600" dirty="0">
                 <a:solidFill>
                   <a:srgbClr val="808080"/>
                 </a:solidFill>
                 <a:latin typeface="Consolas" panose="020B0609020204030204" pitchFamily="49" charset="0"/>
               </a:rPr>
               <a:t>&lt;</a:t>
-            </a:r>
-            <a:r>
-              <a:rPr lang="it-IT" sz="3600" dirty="0" smtClean="0">
-                <a:solidFill>
-                  <a:srgbClr val="569CD6"/>
-                </a:solidFill>
-                <a:latin typeface="Consolas" panose="020B0609020204030204" pitchFamily="49" charset="0"/>
-              </a:rPr>
-              <a:t>li</a:t>
-            </a:r>
-            <a:r>
-              <a:rPr lang="it-IT" sz="3600" dirty="0" smtClean="0">
-                <a:solidFill>
-                  <a:srgbClr val="808080"/>
-                </a:solidFill>
-                <a:latin typeface="Consolas" panose="020B0609020204030204" pitchFamily="49" charset="0"/>
-              </a:rPr>
-              <a:t>&gt;</a:t>
-            </a:r>
-            <a:r>
-              <a:rPr lang="it-IT" sz="3600" dirty="0" smtClean="0">
-                <a:solidFill>
-                  <a:srgbClr val="D4D4D4"/>
-                </a:solidFill>
-                <a:latin typeface="Consolas" panose="020B0609020204030204" pitchFamily="49" charset="0"/>
-              </a:rPr>
-              <a:t>Iron Man</a:t>
-            </a:r>
-            <a:r>
-              <a:rPr lang="it-IT" sz="3600" dirty="0" smtClean="0">
-                <a:solidFill>
-                  <a:srgbClr val="808080"/>
-                </a:solidFill>
-                <a:latin typeface="Consolas" panose="020B0609020204030204" pitchFamily="49" charset="0"/>
-              </a:rPr>
-              <a:t>&lt;/</a:t>
             </a:r>
             <a:r>
               <a:rPr lang="it-IT" sz="3600" dirty="0">
@@ -41432,6 +41013,42 @@
               </a:rPr>
               <a:t>&gt;</a:t>
             </a:r>
+            <a:r>
+              <a:rPr lang="it-IT" sz="3600" dirty="0">
+                <a:solidFill>
+                  <a:srgbClr val="D4D4D4"/>
+                </a:solidFill>
+                <a:latin typeface="Consolas" panose="020B0609020204030204" pitchFamily="49" charset="0"/>
+              </a:rPr>
+              <a:t>Iron Man</a:t>
+            </a:r>
+            <a:r>
+              <a:rPr lang="it-IT" sz="3600" dirty="0">
+                <a:solidFill>
+                  <a:srgbClr val="808080"/>
+                </a:solidFill>
+                <a:latin typeface="Consolas" panose="020B0609020204030204" pitchFamily="49" charset="0"/>
+              </a:rPr>
+              <a:t>&lt;/</a:t>
+            </a:r>
+            <a:r>
+              <a:rPr lang="it-IT" sz="3600" dirty="0">
+                <a:solidFill>
+                  <a:srgbClr val="569CD6"/>
+                </a:solidFill>
+                <a:latin typeface="Consolas" panose="020B0609020204030204" pitchFamily="49" charset="0"/>
+              </a:rPr>
+              <a:t>li</a:t>
+            </a:r>
+            <a:r>
+              <a:rPr lang="it-IT" sz="3600" dirty="0">
+                <a:solidFill>
+                  <a:srgbClr val="808080"/>
+                </a:solidFill>
+                <a:latin typeface="Consolas" panose="020B0609020204030204" pitchFamily="49" charset="0"/>
+              </a:rPr>
+              <a:t>&gt;</a:t>
+            </a:r>
             <a:endParaRPr lang="it-IT" sz="3600" dirty="0">
               <a:solidFill>
                 <a:srgbClr val="D4D4D4"/>
@@ -41459,42 +41076,6 @@
               <a:t>&lt;</a:t>
             </a:r>
             <a:r>
-              <a:rPr lang="it-IT" sz="3600" dirty="0" smtClean="0">
-                <a:solidFill>
-                  <a:srgbClr val="569CD6"/>
-                </a:solidFill>
-                <a:latin typeface="Consolas" panose="020B0609020204030204" pitchFamily="49" charset="0"/>
-              </a:rPr>
-              <a:t>li</a:t>
-            </a:r>
-            <a:r>
-              <a:rPr lang="it-IT" sz="3600" dirty="0" smtClean="0">
-                <a:solidFill>
-                  <a:srgbClr val="808080"/>
-                </a:solidFill>
-                <a:latin typeface="Consolas" panose="020B0609020204030204" pitchFamily="49" charset="0"/>
-              </a:rPr>
-              <a:t>&gt;</a:t>
-            </a:r>
-            <a:r>
-              <a:rPr lang="it-IT" sz="3600" dirty="0" smtClean="0">
-                <a:solidFill>
-                  <a:srgbClr val="D4D4D4"/>
-                </a:solidFill>
-                <a:latin typeface="Consolas" panose="020B0609020204030204" pitchFamily="49" charset="0"/>
-              </a:rPr>
-              <a:t>The Hulk</a:t>
-            </a:r>
-            <a:r>
-              <a:rPr lang="it-IT" sz="3600" dirty="0" smtClean="0">
-                <a:solidFill>
-                  <a:srgbClr val="808080"/>
-                </a:solidFill>
-                <a:latin typeface="Consolas" panose="020B0609020204030204" pitchFamily="49" charset="0"/>
-              </a:rPr>
-              <a:t>&lt;/</a:t>
-            </a:r>
-            <a:r>
               <a:rPr lang="it-IT" sz="3600" dirty="0">
                 <a:solidFill>
                   <a:srgbClr val="569CD6"/>
@@ -41512,6 +41093,42 @@
               </a:rPr>
               <a:t>&gt;</a:t>
             </a:r>
+            <a:r>
+              <a:rPr lang="it-IT" sz="3600" dirty="0">
+                <a:solidFill>
+                  <a:srgbClr val="D4D4D4"/>
+                </a:solidFill>
+                <a:latin typeface="Consolas" panose="020B0609020204030204" pitchFamily="49" charset="0"/>
+              </a:rPr>
+              <a:t>The Hulk</a:t>
+            </a:r>
+            <a:r>
+              <a:rPr lang="it-IT" sz="3600" dirty="0">
+                <a:solidFill>
+                  <a:srgbClr val="808080"/>
+                </a:solidFill>
+                <a:latin typeface="Consolas" panose="020B0609020204030204" pitchFamily="49" charset="0"/>
+              </a:rPr>
+              <a:t>&lt;/</a:t>
+            </a:r>
+            <a:r>
+              <a:rPr lang="it-IT" sz="3600" dirty="0">
+                <a:solidFill>
+                  <a:srgbClr val="569CD6"/>
+                </a:solidFill>
+                <a:latin typeface="Consolas" panose="020B0609020204030204" pitchFamily="49" charset="0"/>
+              </a:rPr>
+              <a:t>li</a:t>
+            </a:r>
+            <a:r>
+              <a:rPr lang="it-IT" sz="3600" dirty="0">
+                <a:solidFill>
+                  <a:srgbClr val="808080"/>
+                </a:solidFill>
+                <a:latin typeface="Consolas" panose="020B0609020204030204" pitchFamily="49" charset="0"/>
+              </a:rPr>
+              <a:t>&gt;</a:t>
+            </a:r>
             <a:endParaRPr lang="it-IT" sz="3600" dirty="0">
               <a:solidFill>
                 <a:srgbClr val="D4D4D4"/>
@@ -41521,7 +41138,7 @@
           </a:p>
           <a:p>
             <a:r>
-              <a:rPr lang="it-IT" sz="3600" dirty="0" smtClean="0">
+              <a:rPr lang="it-IT" sz="3600" dirty="0">
                 <a:solidFill>
                   <a:srgbClr val="808080"/>
                 </a:solidFill>
@@ -41530,7 +41147,7 @@
               <a:t>&lt;/</a:t>
             </a:r>
             <a:r>
-              <a:rPr lang="it-IT" sz="3600" dirty="0" smtClean="0">
+              <a:rPr lang="it-IT" sz="3600" dirty="0">
                 <a:solidFill>
                   <a:srgbClr val="569CD6"/>
                 </a:solidFill>
@@ -41539,7 +41156,7 @@
               <a:t>ol</a:t>
             </a:r>
             <a:r>
-              <a:rPr lang="it-IT" sz="3600" dirty="0" smtClean="0">
+              <a:rPr lang="it-IT" sz="3600" dirty="0">
                 <a:solidFill>
                   <a:srgbClr val="808080"/>
                 </a:solidFill>

</xml_diff>